<commit_message>
Added some notes to the powerpoint
</commit_message>
<xml_diff>
--- a/Week 1 (Sept. 8)/{1} INFO 3135 Week 1 Intro.pptx
+++ b/Week 1 (Sept. 8)/{1} INFO 3135 Week 1 Intro.pptx
@@ -5,7 +5,7 @@
     <p:sldMasterId id="2147483648" r:id="rId1"/>
   </p:sldMasterIdLst>
   <p:notesMasterIdLst>
-    <p:notesMasterId r:id="rId21"/>
+    <p:notesMasterId r:id="rId23"/>
   </p:notesMasterIdLst>
   <p:sldIdLst>
     <p:sldId id="256" r:id="rId2"/>
@@ -16,17 +16,19 @@
     <p:sldId id="268" r:id="rId7"/>
     <p:sldId id="282" r:id="rId8"/>
     <p:sldId id="283" r:id="rId9"/>
-    <p:sldId id="257" r:id="rId10"/>
-    <p:sldId id="259" r:id="rId11"/>
-    <p:sldId id="260" r:id="rId12"/>
-    <p:sldId id="261" r:id="rId13"/>
-    <p:sldId id="258" r:id="rId14"/>
-    <p:sldId id="263" r:id="rId15"/>
-    <p:sldId id="262" r:id="rId16"/>
-    <p:sldId id="264" r:id="rId17"/>
-    <p:sldId id="265" r:id="rId18"/>
-    <p:sldId id="286" r:id="rId19"/>
-    <p:sldId id="284" r:id="rId20"/>
+    <p:sldId id="290" r:id="rId10"/>
+    <p:sldId id="257" r:id="rId11"/>
+    <p:sldId id="259" r:id="rId12"/>
+    <p:sldId id="260" r:id="rId13"/>
+    <p:sldId id="261" r:id="rId14"/>
+    <p:sldId id="291" r:id="rId15"/>
+    <p:sldId id="258" r:id="rId16"/>
+    <p:sldId id="263" r:id="rId17"/>
+    <p:sldId id="262" r:id="rId18"/>
+    <p:sldId id="264" r:id="rId19"/>
+    <p:sldId id="265" r:id="rId20"/>
+    <p:sldId id="286" r:id="rId21"/>
+    <p:sldId id="284" r:id="rId22"/>
   </p:sldIdLst>
   <p:sldSz cx="12192000" cy="6858000"/>
   <p:notesSz cx="6858000" cy="9144000"/>
@@ -548,7 +550,7 @@
           <a:p>
             <a:fld id="{FAD8D051-2F16-4010-A3B4-A332A154940A}" type="slidenum">
               <a:rPr lang="en-CA" smtClean="0"/>
-              <a:t>18</a:t>
+              <a:t>20</a:t>
             </a:fld>
             <a:endParaRPr lang="en-CA"/>
           </a:p>
@@ -3579,7 +3581,7 @@
                   <a:schemeClr val="bg1"/>
                 </a:solidFill>
               </a:rPr>
-              <a:t>Algorithms and Data structures</a:t>
+              <a:t>Introduction</a:t>
             </a:r>
           </a:p>
         </p:txBody>
@@ -3594,69 +3596,75 @@
             <p:ph idx="1"/>
           </p:nvPr>
         </p:nvSpPr>
-        <p:spPr/>
+        <p:spPr>
+          <a:xfrm>
+            <a:off x="685800" y="1508943"/>
+            <a:ext cx="10912522" cy="4554232"/>
+          </a:xfrm>
+        </p:spPr>
         <p:txBody>
           <a:bodyPr/>
           <a:lstStyle/>
           <a:p>
-            <a:r>
-              <a:rPr lang="en-CA" sz="3600" dirty="0"/>
-              <a:t>A TED talk on Algorithms</a:t>
-            </a:r>
-            <a:endParaRPr lang="en-CA" sz="3600" dirty="0">
-              <a:hlinkClick r:id="rId2"/>
-            </a:endParaRPr>
-          </a:p>
-          <a:p>
-            <a:endParaRPr lang="en-CA" dirty="0">
-              <a:hlinkClick r:id="rId2"/>
-            </a:endParaRPr>
-          </a:p>
-          <a:p>
-            <a:r>
-              <a:rPr lang="en-CA" dirty="0">
-                <a:hlinkClick r:id="rId2"/>
-              </a:rPr>
-              <a:t>https://www.youtube.com/watch?time_continue=1&amp;v=6hfOvs8pY1k</a:t>
-            </a:r>
+            <a:pPr marL="0" indent="0">
+              <a:buNone/>
+            </a:pPr>
+            <a:r>
+              <a:rPr lang="en-CA" sz="3200" u="sng" dirty="0" err="1"/>
+              <a:t>al·go·rithm</a:t>
+            </a:r>
+            <a:endParaRPr lang="en-CA" sz="3200" u="sng" dirty="0"/>
+          </a:p>
+          <a:p>
+            <a:pPr marL="0" indent="0">
+              <a:buNone/>
+            </a:pPr>
+            <a:r>
+              <a:rPr lang="en-CA" dirty="0"/>
+              <a:t>noun</a:t>
+            </a:r>
+          </a:p>
+          <a:p>
+            <a:r>
+              <a:rPr lang="en-CA" dirty="0"/>
+              <a:t>a process or set of rules to be followed in calculations or other problem-solving operations, especially by a computer.</a:t>
+            </a:r>
+          </a:p>
+          <a:p>
+            <a:pPr marL="0" indent="0">
+              <a:buNone/>
+            </a:pPr>
+            <a:r>
+              <a:rPr lang="en-CA" sz="3200" b="1" u="sng" dirty="0"/>
+              <a:t>Origin</a:t>
+            </a:r>
+          </a:p>
+          <a:p>
+            <a:r>
+              <a:rPr lang="en-CA" dirty="0"/>
+              <a:t>1890–95; variant of algorism, by association with Greek </a:t>
+            </a:r>
+            <a:r>
+              <a:rPr lang="en-CA" dirty="0" err="1"/>
+              <a:t>arithmós</a:t>
+            </a:r>
+            <a:r>
+              <a:rPr lang="en-CA" dirty="0"/>
+              <a:t> number. </a:t>
+            </a:r>
+          </a:p>
+          <a:p>
             <a:endParaRPr lang="en-CA" dirty="0"/>
           </a:p>
           <a:p>
             <a:endParaRPr lang="en-CA" dirty="0"/>
           </a:p>
-          <a:p>
-            <a:endParaRPr lang="en-CA" dirty="0"/>
-          </a:p>
-        </p:txBody>
-      </p:sp>
-      <p:pic>
-        <p:nvPicPr>
-          <p:cNvPr id="4" name="Picture 3"/>
-          <p:cNvPicPr>
-            <a:picLocks noChangeAspect="1"/>
-          </p:cNvPicPr>
-          <p:nvPr/>
-        </p:nvPicPr>
-        <p:blipFill>
-          <a:blip r:embed="rId3"/>
-          <a:stretch>
-            <a:fillRect/>
-          </a:stretch>
-        </p:blipFill>
-        <p:spPr>
-          <a:xfrm>
-            <a:off x="2868731" y="3786059"/>
-            <a:ext cx="5772150" cy="1781175"/>
-          </a:xfrm>
-          <a:prstGeom prst="rect">
-            <a:avLst/>
-          </a:prstGeom>
-        </p:spPr>
-      </p:pic>
+        </p:txBody>
+      </p:sp>
     </p:spTree>
     <p:extLst>
       <p:ext uri="{BB962C8B-B14F-4D97-AF65-F5344CB8AC3E}">
-        <p14:creationId xmlns:p14="http://schemas.microsoft.com/office/powerpoint/2010/main" val="2914200428"/>
+        <p14:creationId xmlns:p14="http://schemas.microsoft.com/office/powerpoint/2010/main" val="1389926418"/>
       </p:ext>
     </p:extLst>
   </p:cSld>
@@ -3711,7 +3719,7 @@
                   <a:schemeClr val="bg1"/>
                 </a:solidFill>
               </a:rPr>
-              <a:t>Algorithms</a:t>
+              <a:t>Algorithms and Data structures</a:t>
             </a:r>
           </a:p>
         </p:txBody>
@@ -3726,88 +3734,69 @@
             <p:ph idx="1"/>
           </p:nvPr>
         </p:nvSpPr>
-        <p:spPr>
-          <a:xfrm>
-            <a:off x="464025" y="1508943"/>
-            <a:ext cx="11136572" cy="5055630"/>
-          </a:xfrm>
-        </p:spPr>
-        <p:txBody>
-          <a:bodyPr>
-            <a:normAutofit/>
-          </a:bodyPr>
-          <a:lstStyle/>
-          <a:p>
-            <a:pPr marL="0" indent="0">
-              <a:buNone/>
-            </a:pPr>
-            <a:r>
-              <a:rPr lang="en-CA" dirty="0"/>
-              <a:t>Every Algorithm must satisfy the following properties:</a:t>
-            </a:r>
-          </a:p>
-          <a:p>
-            <a:r>
-              <a:rPr lang="en-CA" b="1" dirty="0"/>
-              <a:t>Input</a:t>
-            </a:r>
-            <a:r>
-              <a:rPr lang="en-CA" dirty="0"/>
-              <a:t>- There should be 0 or more inputs supplied externally to the algorithm.</a:t>
-            </a:r>
-          </a:p>
-          <a:p>
-            <a:r>
-              <a:rPr lang="en-CA" b="1" dirty="0"/>
-              <a:t>Output</a:t>
-            </a:r>
-            <a:r>
-              <a:rPr lang="en-CA" dirty="0"/>
-              <a:t>- There should be at least 1 output obtained.</a:t>
-            </a:r>
-          </a:p>
-          <a:p>
-            <a:r>
-              <a:rPr lang="en-CA" b="1" dirty="0"/>
-              <a:t>Definiteness</a:t>
-            </a:r>
-            <a:r>
-              <a:rPr lang="en-CA" dirty="0"/>
-              <a:t>- Every step of the algorithm should be clear and well defined.</a:t>
-            </a:r>
-          </a:p>
-          <a:p>
-            <a:r>
-              <a:rPr lang="en-CA" b="1" dirty="0"/>
-              <a:t>Finiteness</a:t>
-            </a:r>
-            <a:r>
-              <a:rPr lang="en-CA" dirty="0"/>
-              <a:t>- The algorithm should have finite number of steps. It should finish and not go on forever.</a:t>
-            </a:r>
-          </a:p>
-          <a:p>
-            <a:r>
-              <a:rPr lang="en-CA" b="1" dirty="0"/>
-              <a:t>Correctness</a:t>
-            </a:r>
-            <a:r>
-              <a:rPr lang="en-CA" dirty="0"/>
-              <a:t>- Every step of the algorithm must generate a correct output.</a:t>
-            </a:r>
-          </a:p>
-          <a:p>
-            <a:pPr marL="0" indent="0">
-              <a:buNone/>
-            </a:pPr>
+        <p:spPr/>
+        <p:txBody>
+          <a:bodyPr/>
+          <a:lstStyle/>
+          <a:p>
+            <a:r>
+              <a:rPr lang="en-CA" sz="3600" dirty="0"/>
+              <a:t>A TED talk on Algorithms</a:t>
+            </a:r>
+            <a:endParaRPr lang="en-CA" sz="3600" dirty="0">
+              <a:hlinkClick r:id="rId2"/>
+            </a:endParaRPr>
+          </a:p>
+          <a:p>
+            <a:endParaRPr lang="en-CA" dirty="0">
+              <a:hlinkClick r:id="rId2"/>
+            </a:endParaRPr>
+          </a:p>
+          <a:p>
+            <a:r>
+              <a:rPr lang="en-CA" dirty="0">
+                <a:hlinkClick r:id="rId2"/>
+              </a:rPr>
+              <a:t>https://www.youtube.com/watch?time_continue=1&amp;v=6hfOvs8pY1k</a:t>
+            </a:r>
             <a:endParaRPr lang="en-CA" dirty="0"/>
           </a:p>
-        </p:txBody>
-      </p:sp>
+          <a:p>
+            <a:endParaRPr lang="en-CA" dirty="0"/>
+          </a:p>
+          <a:p>
+            <a:endParaRPr lang="en-CA" dirty="0"/>
+          </a:p>
+        </p:txBody>
+      </p:sp>
+      <p:pic>
+        <p:nvPicPr>
+          <p:cNvPr id="4" name="Picture 3"/>
+          <p:cNvPicPr>
+            <a:picLocks noChangeAspect="1"/>
+          </p:cNvPicPr>
+          <p:nvPr/>
+        </p:nvPicPr>
+        <p:blipFill>
+          <a:blip r:embed="rId3"/>
+          <a:stretch>
+            <a:fillRect/>
+          </a:stretch>
+        </p:blipFill>
+        <p:spPr>
+          <a:xfrm>
+            <a:off x="2868731" y="3786059"/>
+            <a:ext cx="5772150" cy="1781175"/>
+          </a:xfrm>
+          <a:prstGeom prst="rect">
+            <a:avLst/>
+          </a:prstGeom>
+        </p:spPr>
+      </p:pic>
     </p:spTree>
     <p:extLst>
       <p:ext uri="{BB962C8B-B14F-4D97-AF65-F5344CB8AC3E}">
-        <p14:creationId xmlns:p14="http://schemas.microsoft.com/office/powerpoint/2010/main" val="2518543676"/>
+        <p14:creationId xmlns:p14="http://schemas.microsoft.com/office/powerpoint/2010/main" val="2914200428"/>
       </p:ext>
     </p:extLst>
   </p:cSld>
@@ -3879,122 +3868,86 @@
         </p:nvSpPr>
         <p:spPr>
           <a:xfrm>
-            <a:off x="321733" y="1354667"/>
-            <a:ext cx="11548534" cy="5266265"/>
+            <a:off x="464025" y="1508943"/>
+            <a:ext cx="11136572" cy="5055630"/>
           </a:xfrm>
         </p:spPr>
         <p:txBody>
           <a:bodyPr>
-            <a:normAutofit fontScale="92500"/>
+            <a:normAutofit/>
           </a:bodyPr>
           <a:lstStyle/>
           <a:p>
-            <a:r>
-              <a:rPr lang="en-CA" dirty="0"/>
-              <a:t>An algorithm is said to be efficient and fast, if it takes less time to execute and consumes less memory space. The performance of an algorithm is measured on the basis of following properties :</a:t>
-            </a:r>
-          </a:p>
-          <a:p>
-            <a:r>
-              <a:rPr lang="en-CA" dirty="0"/>
-              <a:t>Time Complexity</a:t>
-            </a:r>
-          </a:p>
-          <a:p>
-            <a:pPr lvl="1"/>
-            <a:r>
-              <a:rPr lang="en-CA" dirty="0"/>
-              <a:t>a way to represent the amount of time required by the algorithm to run till its completion.</a:t>
-            </a:r>
-          </a:p>
-          <a:p>
-            <a:r>
-              <a:rPr lang="en-CA" dirty="0"/>
-              <a:t>Space Complexity</a:t>
-            </a:r>
-          </a:p>
-          <a:p>
-            <a:pPr lvl="1"/>
-            <a:r>
-              <a:rPr lang="en-CA" dirty="0"/>
-              <a:t>the amount of memory space required by the algorithm, during the course of its execution.</a:t>
-            </a:r>
-          </a:p>
-          <a:p>
-            <a:pPr lvl="1"/>
-            <a:r>
-              <a:rPr lang="en-CA" b="1" dirty="0">
-                <a:solidFill>
-                  <a:schemeClr val="accent5">
-                    <a:lumMod val="75000"/>
-                  </a:schemeClr>
-                </a:solidFill>
-              </a:rPr>
-              <a:t>Instruction Space</a:t>
-            </a:r>
+            <a:pPr marL="0" indent="0">
+              <a:buNone/>
+            </a:pPr>
+            <a:r>
+              <a:rPr lang="en-CA" dirty="0"/>
+              <a:t>Every Algorithm must satisfy the following properties:</a:t>
+            </a:r>
+          </a:p>
+          <a:p>
             <a:r>
               <a:rPr lang="en-CA" b="1" dirty="0"/>
-              <a:t>:</a:t>
-            </a:r>
-            <a:r>
-              <a:rPr lang="en-CA" dirty="0"/>
-              <a:t> the space required to store the executable version of the program. This space is fixed, but varies depending upon the number of lines of code in the program.</a:t>
-            </a:r>
-          </a:p>
-          <a:p>
-            <a:pPr lvl="1"/>
-            <a:r>
-              <a:rPr lang="en-CA" b="1" dirty="0">
-                <a:solidFill>
-                  <a:schemeClr val="accent5">
-                    <a:lumMod val="75000"/>
-                  </a:schemeClr>
-                </a:solidFill>
-              </a:rPr>
-              <a:t>Data Space</a:t>
-            </a:r>
+              <a:t>Input</a:t>
+            </a:r>
+            <a:r>
+              <a:rPr lang="en-CA" dirty="0"/>
+              <a:t>- There should be 0 or more inputs supplied externally to the algorithm.</a:t>
+            </a:r>
+          </a:p>
+          <a:p>
             <a:r>
               <a:rPr lang="en-CA" b="1" dirty="0"/>
-              <a:t>:</a:t>
-            </a:r>
-            <a:r>
-              <a:rPr lang="en-CA" dirty="0"/>
-              <a:t> the space required to store all the constants and variables value.</a:t>
-            </a:r>
-          </a:p>
-          <a:p>
-            <a:pPr lvl="1"/>
-            <a:r>
-              <a:rPr lang="en-CA" b="1" dirty="0">
-                <a:solidFill>
-                  <a:schemeClr val="accent5">
-                    <a:lumMod val="75000"/>
-                  </a:schemeClr>
-                </a:solidFill>
-              </a:rPr>
-              <a:t>Environment Space</a:t>
-            </a:r>
+              <a:t>Output</a:t>
+            </a:r>
+            <a:r>
+              <a:rPr lang="en-CA" dirty="0"/>
+              <a:t>- There should be at least 1 output obtained.</a:t>
+            </a:r>
+          </a:p>
+          <a:p>
             <a:r>
               <a:rPr lang="en-CA" b="1" dirty="0"/>
-              <a:t>:</a:t>
-            </a:r>
-            <a:r>
-              <a:rPr lang="en-CA" dirty="0"/>
-              <a:t> the space required to store the environment information needed</a:t>
-            </a:r>
-          </a:p>
-          <a:p>
-            <a:r>
-              <a:rPr lang="en-CA" sz="2600" dirty="0"/>
-              <a:t>while calculating the Space Complexity of any algorithm, we usually consider only Data Space and we neglect the Instruction Space and Environmental Stack</a:t>
-            </a:r>
+              <a:t>Definiteness</a:t>
+            </a:r>
+            <a:r>
+              <a:rPr lang="en-CA" dirty="0"/>
+              <a:t>- Every step of the algorithm should be clear and well defined.</a:t>
+            </a:r>
+          </a:p>
+          <a:p>
+            <a:r>
+              <a:rPr lang="en-CA" b="1" dirty="0"/>
+              <a:t>Finiteness</a:t>
+            </a:r>
+            <a:r>
+              <a:rPr lang="en-CA" dirty="0"/>
+              <a:t>- The algorithm should have finite number of steps. It should finish and not go on forever.</a:t>
+            </a:r>
+          </a:p>
+          <a:p>
+            <a:r>
+              <a:rPr lang="en-CA" b="1" dirty="0"/>
+              <a:t>Correctness</a:t>
+            </a:r>
+            <a:r>
+              <a:rPr lang="en-CA" dirty="0"/>
+              <a:t>- Every step of the algorithm must generate a correct output.</a:t>
+            </a:r>
+          </a:p>
+          <a:p>
+            <a:pPr marL="0" indent="0">
+              <a:buNone/>
+            </a:pPr>
+            <a:endParaRPr lang="en-CA" dirty="0"/>
           </a:p>
         </p:txBody>
       </p:sp>
     </p:spTree>
     <p:extLst>
       <p:ext uri="{BB962C8B-B14F-4D97-AF65-F5344CB8AC3E}">
-        <p14:creationId xmlns:p14="http://schemas.microsoft.com/office/powerpoint/2010/main" val="2796991752"/>
+        <p14:creationId xmlns:p14="http://schemas.microsoft.com/office/powerpoint/2010/main" val="2518543676"/>
       </p:ext>
     </p:extLst>
   </p:cSld>
@@ -4049,7 +4002,7 @@
                   <a:schemeClr val="bg1"/>
                 </a:solidFill>
               </a:rPr>
-              <a:t>Data Structures</a:t>
+              <a:t>Algorithms</a:t>
             </a:r>
           </a:p>
         </p:txBody>
@@ -4066,66 +4019,114 @@
         </p:nvSpPr>
         <p:spPr>
           <a:xfrm>
-            <a:off x="474133" y="1508942"/>
-            <a:ext cx="11276589" cy="5111991"/>
+            <a:off x="321733" y="1354667"/>
+            <a:ext cx="11548534" cy="5266265"/>
           </a:xfrm>
         </p:spPr>
         <p:txBody>
           <a:bodyPr>
-            <a:normAutofit fontScale="92500" lnSpcReduction="20000"/>
+            <a:normAutofit fontScale="92500"/>
           </a:bodyPr>
           <a:lstStyle/>
           <a:p>
-            <a:pPr marL="0" indent="0">
-              <a:buNone/>
-            </a:pPr>
-            <a:r>
-              <a:rPr lang="en-CA" b="1" u="sng" dirty="0">
+            <a:r>
+              <a:rPr lang="en-CA" dirty="0"/>
+              <a:t>An algorithm is said to be efficient and fast, if it takes less time to execute and consumes less memory space. The performance of an algorithm is measured on the basis of following properties :</a:t>
+            </a:r>
+          </a:p>
+          <a:p>
+            <a:r>
+              <a:rPr lang="en-CA" dirty="0"/>
+              <a:t>Time Complexity</a:t>
+            </a:r>
+          </a:p>
+          <a:p>
+            <a:pPr lvl="1"/>
+            <a:r>
+              <a:rPr lang="en-CA" dirty="0"/>
+              <a:t>a way to represent the amount of time required by the algorithm to run till its completion.</a:t>
+            </a:r>
+          </a:p>
+          <a:p>
+            <a:r>
+              <a:rPr lang="en-CA" dirty="0"/>
+              <a:t>Space Complexity</a:t>
+            </a:r>
+          </a:p>
+          <a:p>
+            <a:pPr lvl="1"/>
+            <a:r>
+              <a:rPr lang="en-CA" dirty="0"/>
+              <a:t>the amount of memory space required by the algorithm, during the course of its execution.</a:t>
+            </a:r>
+          </a:p>
+          <a:p>
+            <a:pPr lvl="1"/>
+            <a:r>
+              <a:rPr lang="en-CA" b="1" dirty="0">
                 <a:solidFill>
-                  <a:schemeClr val="tx2"/>
+                  <a:schemeClr val="accent5">
+                    <a:lumMod val="75000"/>
+                  </a:schemeClr>
                 </a:solidFill>
               </a:rPr>
-              <a:t>Data structure </a:t>
-            </a:r>
-          </a:p>
-          <a:p>
-            <a:r>
-              <a:rPr lang="en-CA" dirty="0"/>
-              <a:t>Is a data organization, management, and storage format that enables efficient access and modification. </a:t>
-            </a:r>
-          </a:p>
-          <a:p>
-            <a:r>
-              <a:rPr lang="en-CA" dirty="0"/>
-              <a:t>A data structure is a collection of data values, the relationships among them, and the functions or operations that can be applied to the data.  </a:t>
-            </a:r>
-          </a:p>
-          <a:p>
-            <a:r>
-              <a:rPr lang="en-CA" dirty="0"/>
-              <a:t>Different types of data structures are suited to different kinds of applications, and some are highly specialized to specific tasks. </a:t>
-            </a:r>
-            <a:br>
-              <a:rPr lang="en-CA" dirty="0"/>
-            </a:br>
-            <a:r>
-              <a:rPr lang="en-CA" dirty="0"/>
-              <a:t>For example, relational databases commonly use B-tree indexes for data retrieval, while compiler implementations usually use hash tables to look up identifiers</a:t>
-            </a:r>
-          </a:p>
-          <a:p>
-            <a:r>
-              <a:rPr lang="en-CA" dirty="0"/>
-              <a:t>Usually, efficient data structures are key to designing efficient algorithms. Some formal design methods and programming languages emphasize data structures, rather than algorithms, as the key organizing factor in software design</a:t>
-            </a:r>
-          </a:p>
-          <a:p>
-            <a:pPr marL="0" indent="0">
-              <a:buNone/>
-            </a:pPr>
-            <a:r>
-              <a:rPr lang="en-CA" dirty="0"/>
-              <a:t>[Wikipedia]</a:t>
+              <a:t>Instruction Space</a:t>
+            </a:r>
+            <a:r>
+              <a:rPr lang="en-CA" b="1" dirty="0"/>
+              <a:t>:</a:t>
+            </a:r>
+            <a:r>
+              <a:rPr lang="en-CA" dirty="0"/>
+              <a:t> the space required to store the executable version of the program. This space is fixed, but varies depending upon the number of lines of code in the program.</a:t>
+            </a:r>
+          </a:p>
+          <a:p>
+            <a:pPr lvl="1"/>
+            <a:r>
+              <a:rPr lang="en-CA" b="1" dirty="0">
+                <a:solidFill>
+                  <a:schemeClr val="accent5">
+                    <a:lumMod val="75000"/>
+                  </a:schemeClr>
+                </a:solidFill>
+              </a:rPr>
+              <a:t>Data Space</a:t>
+            </a:r>
+            <a:r>
+              <a:rPr lang="en-CA" b="1" dirty="0"/>
+              <a:t>:</a:t>
+            </a:r>
+            <a:r>
+              <a:rPr lang="en-CA" dirty="0"/>
+              <a:t> the space required to store all the constants and variables value.</a:t>
+            </a:r>
+          </a:p>
+          <a:p>
+            <a:pPr lvl="1"/>
+            <a:r>
+              <a:rPr lang="en-CA" b="1" dirty="0">
+                <a:solidFill>
+                  <a:schemeClr val="accent5">
+                    <a:lumMod val="75000"/>
+                  </a:schemeClr>
+                </a:solidFill>
+              </a:rPr>
+              <a:t>Environment Space</a:t>
+            </a:r>
+            <a:r>
+              <a:rPr lang="en-CA" b="1" dirty="0"/>
+              <a:t>:</a:t>
+            </a:r>
+            <a:r>
+              <a:rPr lang="en-CA" dirty="0"/>
+              <a:t> the space required to store the environment information needed</a:t>
+            </a:r>
+          </a:p>
+          <a:p>
+            <a:r>
+              <a:rPr lang="en-CA" sz="2600" dirty="0"/>
+              <a:t>while calculating the Space Complexity of any algorithm, we usually consider only Data Space and we neglect the Instruction Space and Environmental Stack</a:t>
             </a:r>
           </a:p>
         </p:txBody>
@@ -4133,7 +4134,7 @@
     </p:spTree>
     <p:extLst>
       <p:ext uri="{BB962C8B-B14F-4D97-AF65-F5344CB8AC3E}">
-        <p14:creationId xmlns:p14="http://schemas.microsoft.com/office/powerpoint/2010/main" val="1716578441"/>
+        <p14:creationId xmlns:p14="http://schemas.microsoft.com/office/powerpoint/2010/main" val="2796991752"/>
       </p:ext>
     </p:extLst>
   </p:cSld>
@@ -4188,7 +4189,7 @@
                   <a:schemeClr val="bg1"/>
                 </a:solidFill>
               </a:rPr>
-              <a:t>Primitive Data Structures</a:t>
+              <a:t>Complexity over time</a:t>
             </a:r>
           </a:p>
         </p:txBody>
@@ -4203,45 +4204,82 @@
             <p:ph idx="1"/>
           </p:nvPr>
         </p:nvSpPr>
-        <p:spPr/>
+        <p:spPr>
+          <a:xfrm>
+            <a:off x="321733" y="1354667"/>
+            <a:ext cx="11548534" cy="5266265"/>
+          </a:xfrm>
+        </p:spPr>
         <p:txBody>
           <a:bodyPr>
-            <a:normAutofit lnSpcReduction="10000"/>
+            <a:normAutofit fontScale="92500"/>
           </a:bodyPr>
           <a:lstStyle/>
           <a:p>
-            <a:pPr fontAlgn="base"/>
-            <a:r>
-              <a:rPr lang="en-CA" dirty="0"/>
-              <a:t>The simplest data structures are primitive variables. They hold a single value, and beyond that, are of limited use. When many related values need to be stored, an array is used. </a:t>
-            </a:r>
-          </a:p>
-          <a:p>
-            <a:pPr fontAlgn="base"/>
-            <a:r>
-              <a:rPr lang="en-CA" dirty="0"/>
-              <a:t>Another example of a basic data structure is an array, in which multiple data bits are coordinated into a group sharing a common label. This helps programs call these data bits or perform other work on the data set as a whole. </a:t>
-            </a:r>
-          </a:p>
-          <a:p>
-            <a:pPr fontAlgn="base"/>
-            <a:r>
-              <a:rPr lang="en-CA" dirty="0"/>
-              <a:t>Another example is a stack, which places data units in relative hierarchies, allowing functions to work on the data in coordinated ways, such as pushing new data onto a stack, or popping data off the top of a stack</a:t>
-            </a:r>
-          </a:p>
-          <a:p>
-            <a:pPr marL="0" indent="0">
-              <a:buNone/>
-            </a:pPr>
-            <a:endParaRPr lang="en-CA" dirty="0"/>
+            <a:r>
+              <a:rPr lang="en-CA" sz="3900" dirty="0"/>
+              <a:t>In the past:</a:t>
+            </a:r>
+          </a:p>
+          <a:p>
+            <a:pPr lvl="1"/>
+            <a:r>
+              <a:rPr lang="en-CA" sz="3000" dirty="0"/>
+              <a:t>486/(Pentium, maybe): “CPU bound” (100 MHz)</a:t>
+            </a:r>
+          </a:p>
+          <a:p>
+            <a:pPr lvl="1"/>
+            <a:r>
+              <a:rPr lang="en-CA" sz="3000" dirty="0"/>
+              <a:t>Memory access took “0 time” (was not considered)</a:t>
+            </a:r>
+          </a:p>
+          <a:p>
+            <a:r>
+              <a:rPr lang="en-CA" sz="3400" dirty="0"/>
+              <a:t>Now, it’s the complete opposite</a:t>
+            </a:r>
+          </a:p>
+          <a:p>
+            <a:pPr lvl="1"/>
+            <a:r>
+              <a:rPr lang="en-CA" sz="3000" dirty="0"/>
+              <a:t>CPUs are WAAAAAAAAY faster than memory</a:t>
+            </a:r>
+          </a:p>
+          <a:p>
+            <a:pPr lvl="1"/>
+            <a:r>
+              <a:rPr lang="en-CA" sz="3000" dirty="0"/>
+              <a:t>If you have a cache miss, it’s 500-1000 cycles</a:t>
+            </a:r>
+          </a:p>
+          <a:p>
+            <a:pPr lvl="1"/>
+            <a:r>
+              <a:rPr lang="en-CA" sz="3000" dirty="0"/>
+              <a:t>8-16 cores (aka “other CPUs”)</a:t>
+            </a:r>
+          </a:p>
+          <a:p>
+            <a:r>
+              <a:rPr lang="en-CA" sz="3400" dirty="0"/>
+              <a:t>++x is faster than x++ (maybe the 386)</a:t>
+            </a:r>
+          </a:p>
+          <a:p>
+            <a:r>
+              <a:rPr lang="en-CA" sz="3400" dirty="0"/>
+              <a:t>sqrt()</a:t>
+            </a:r>
           </a:p>
         </p:txBody>
       </p:sp>
     </p:spTree>
     <p:extLst>
       <p:ext uri="{BB962C8B-B14F-4D97-AF65-F5344CB8AC3E}">
-        <p14:creationId xmlns:p14="http://schemas.microsoft.com/office/powerpoint/2010/main" val="4116026934"/>
+        <p14:creationId xmlns:p14="http://schemas.microsoft.com/office/powerpoint/2010/main" val="1221503553"/>
       </p:ext>
     </p:extLst>
   </p:cSld>
@@ -4296,7 +4334,7 @@
                   <a:schemeClr val="bg1"/>
                 </a:solidFill>
               </a:rPr>
-              <a:t>Primitive Data Structures C++</a:t>
+              <a:t>Data Structures</a:t>
             </a:r>
           </a:p>
         </p:txBody>
@@ -4313,55 +4351,74 @@
         </p:nvSpPr>
         <p:spPr>
           <a:xfrm>
-            <a:off x="346881" y="1508943"/>
-            <a:ext cx="4047698" cy="4554232"/>
-          </a:xfrm>
-        </p:spPr>
-        <p:txBody>
-          <a:bodyPr/>
-          <a:lstStyle/>
-          <a:p>
-            <a:r>
-              <a:rPr lang="en-CA" dirty="0"/>
-              <a:t>These primitive structures will be used to create more complex structures.</a:t>
-            </a:r>
-          </a:p>
-          <a:p>
-            <a:r>
-              <a:rPr lang="en-CA" dirty="0"/>
-              <a:t>These almost always correspond to a CPU/GPUs “registers”</a:t>
-            </a:r>
-          </a:p>
-        </p:txBody>
-      </p:sp>
-      <p:pic>
-        <p:nvPicPr>
-          <p:cNvPr id="4" name="Picture 3"/>
-          <p:cNvPicPr>
-            <a:picLocks noChangeAspect="1"/>
-          </p:cNvPicPr>
-          <p:nvPr/>
-        </p:nvPicPr>
-        <p:blipFill>
-          <a:blip r:embed="rId2"/>
-          <a:stretch>
-            <a:fillRect/>
-          </a:stretch>
-        </p:blipFill>
-        <p:spPr>
-          <a:xfrm>
-            <a:off x="4577615" y="1330881"/>
-            <a:ext cx="6776185" cy="5527119"/>
-          </a:xfrm>
-          <a:prstGeom prst="rect">
-            <a:avLst/>
-          </a:prstGeom>
-        </p:spPr>
-      </p:pic>
+            <a:off x="474133" y="1508942"/>
+            <a:ext cx="11276589" cy="5111991"/>
+          </a:xfrm>
+        </p:spPr>
+        <p:txBody>
+          <a:bodyPr>
+            <a:normAutofit fontScale="92500" lnSpcReduction="20000"/>
+          </a:bodyPr>
+          <a:lstStyle/>
+          <a:p>
+            <a:pPr marL="0" indent="0">
+              <a:buNone/>
+            </a:pPr>
+            <a:r>
+              <a:rPr lang="en-CA" b="1" u="sng" dirty="0">
+                <a:solidFill>
+                  <a:schemeClr val="tx2"/>
+                </a:solidFill>
+              </a:rPr>
+              <a:t>Data structure </a:t>
+            </a:r>
+          </a:p>
+          <a:p>
+            <a:r>
+              <a:rPr lang="en-CA" dirty="0"/>
+              <a:t>Is a data organization, management, and storage format that enables efficient access and modification. </a:t>
+            </a:r>
+          </a:p>
+          <a:p>
+            <a:r>
+              <a:rPr lang="en-CA" dirty="0"/>
+              <a:t>A data structure is a collection of data values, the relationships among them, and the functions or operations that can be applied to the data.  </a:t>
+            </a:r>
+          </a:p>
+          <a:p>
+            <a:r>
+              <a:rPr lang="en-CA" dirty="0"/>
+              <a:t>Different types of data structures are suited to different kinds of applications, and some are highly specialized to specific tasks. </a:t>
+            </a:r>
+            <a:br>
+              <a:rPr lang="en-CA" dirty="0"/>
+            </a:br>
+            <a:r>
+              <a:rPr lang="en-CA" dirty="0"/>
+              <a:t>For example, relational databases commonly use B-tree indexes for data retrieval, while compiler implementations usually use hash tables to look up identifiers</a:t>
+            </a:r>
+          </a:p>
+          <a:p>
+            <a:r>
+              <a:rPr lang="en-CA" dirty="0"/>
+              <a:t>Usually, efficient data structures are key to designing efficient algorithms. Some formal design methods and programming languages emphasize data structures, rather than algorithms, as the key organizing factor in software design</a:t>
+            </a:r>
+          </a:p>
+          <a:p>
+            <a:pPr marL="0" indent="0">
+              <a:buNone/>
+            </a:pPr>
+            <a:r>
+              <a:rPr lang="en-CA" dirty="0"/>
+              <a:t>[Wikipedia]</a:t>
+            </a:r>
+          </a:p>
+        </p:txBody>
+      </p:sp>
     </p:spTree>
     <p:extLst>
       <p:ext uri="{BB962C8B-B14F-4D97-AF65-F5344CB8AC3E}">
-        <p14:creationId xmlns:p14="http://schemas.microsoft.com/office/powerpoint/2010/main" val="995191618"/>
+        <p14:creationId xmlns:p14="http://schemas.microsoft.com/office/powerpoint/2010/main" val="1716578441"/>
       </p:ext>
     </p:extLst>
   </p:cSld>
@@ -4416,7 +4473,7 @@
                   <a:schemeClr val="bg1"/>
                 </a:solidFill>
               </a:rPr>
-              <a:t>Non-primitive Data structures</a:t>
+              <a:t>Primitive Data Structures</a:t>
             </a:r>
           </a:p>
         </p:txBody>
@@ -4431,135 +4488,45 @@
             <p:ph idx="1"/>
           </p:nvPr>
         </p:nvSpPr>
-        <p:spPr>
-          <a:xfrm>
-            <a:off x="838200" y="1337481"/>
-            <a:ext cx="10515600" cy="5349921"/>
-          </a:xfrm>
-        </p:spPr>
+        <p:spPr/>
         <p:txBody>
           <a:bodyPr>
             <a:normAutofit lnSpcReduction="10000"/>
           </a:bodyPr>
           <a:lstStyle/>
           <a:p>
-            <a:r>
-              <a:rPr lang="en-CA" dirty="0"/>
-              <a:t>The non-primitive data structures cannot be created without primitive data structures.</a:t>
-            </a:r>
-          </a:p>
-          <a:p>
-            <a:r>
-              <a:rPr lang="en-CA" dirty="0"/>
-              <a:t>The Non-primitive data structures are further divided into the following categories:</a:t>
-            </a:r>
-          </a:p>
-          <a:p>
-            <a:r>
-              <a:rPr lang="en-CA" dirty="0">
-                <a:solidFill>
-                  <a:srgbClr val="0070C0"/>
-                </a:solidFill>
-              </a:rPr>
-              <a:t>Arrays</a:t>
-            </a:r>
-            <a:r>
-              <a:rPr lang="en-CA" dirty="0"/>
-              <a:t> - </a:t>
-            </a:r>
-            <a:r>
-              <a:rPr lang="en-CA" sz="2400" dirty="0"/>
-              <a:t>a homogeneous and contiguous collection of same data types. They have a static memory allocation technique</a:t>
-            </a:r>
+            <a:pPr fontAlgn="base"/>
+            <a:r>
+              <a:rPr lang="en-CA" dirty="0"/>
+              <a:t>The simplest data structures are primitive variables. They hold a single value, and beyond that, are of limited use. When many related values need to be stored, an array is used. </a:t>
+            </a:r>
+          </a:p>
+          <a:p>
+            <a:pPr fontAlgn="base"/>
+            <a:r>
+              <a:rPr lang="en-CA" dirty="0"/>
+              <a:t>Another example of a basic data structure is an array, in which multiple data bits are coordinated into a group sharing a common label. This helps programs call these data bits or perform other work on the data set as a whole. </a:t>
+            </a:r>
+          </a:p>
+          <a:p>
+            <a:pPr fontAlgn="base"/>
+            <a:r>
+              <a:rPr lang="en-CA" dirty="0"/>
+              <a:t>Another example is a stack, which places data units in relative hierarchies, allowing functions to work on the data in coordinated ways, such as pushing new data onto a stack, or popping data off the top of a stack</a:t>
+            </a:r>
+          </a:p>
+          <a:p>
+            <a:pPr marL="0" indent="0">
+              <a:buNone/>
+            </a:pPr>
             <a:endParaRPr lang="en-CA" dirty="0"/>
-          </a:p>
-          <a:p>
-            <a:r>
-              <a:rPr lang="en-CA" dirty="0">
-                <a:solidFill>
-                  <a:srgbClr val="0070C0"/>
-                </a:solidFill>
-              </a:rPr>
-              <a:t>Files </a:t>
-            </a:r>
-            <a:r>
-              <a:rPr lang="en-CA" sz="2400" dirty="0"/>
-              <a:t>- A file is a collection of records. The file data structure is primarily used for managing large amounts of data which is not in the primary storage of the system.</a:t>
-            </a:r>
-          </a:p>
-          <a:p>
-            <a:r>
-              <a:rPr lang="en-CA" dirty="0">
-                <a:solidFill>
-                  <a:srgbClr val="0070C0"/>
-                </a:solidFill>
-              </a:rPr>
-              <a:t>Lists</a:t>
-            </a:r>
-            <a:r>
-              <a:rPr lang="en-CA" dirty="0"/>
-              <a:t> - </a:t>
-            </a:r>
-            <a:r>
-              <a:rPr lang="en-CA" sz="2400" dirty="0"/>
-              <a:t>lists support dynamic memory allocation.</a:t>
-            </a:r>
-            <a:endParaRPr lang="en-CA" sz="2400" dirty="0">
-              <a:solidFill>
-                <a:srgbClr val="0070C0"/>
-              </a:solidFill>
-            </a:endParaRPr>
-          </a:p>
-          <a:p>
-            <a:pPr lvl="1"/>
-            <a:r>
-              <a:rPr lang="en-CA" dirty="0">
-                <a:solidFill>
-                  <a:srgbClr val="0070C0"/>
-                </a:solidFill>
-              </a:rPr>
-              <a:t>Linear Lists </a:t>
-            </a:r>
-            <a:r>
-              <a:rPr lang="en-CA" dirty="0"/>
-              <a:t>– stacks, queues</a:t>
-            </a:r>
-          </a:p>
-          <a:p>
-            <a:pPr lvl="2"/>
-            <a:r>
-              <a:rPr lang="en-CA" dirty="0"/>
-              <a:t>The linear lists are those which have the elements stored in a sequential order. </a:t>
-            </a:r>
-          </a:p>
-          <a:p>
-            <a:pPr lvl="1"/>
-            <a:r>
-              <a:rPr lang="en-CA" dirty="0">
-                <a:solidFill>
-                  <a:srgbClr val="0070C0"/>
-                </a:solidFill>
-              </a:rPr>
-              <a:t>Non-linear Lists </a:t>
-            </a:r>
-            <a:r>
-              <a:rPr lang="en-CA" dirty="0"/>
-              <a:t>– graphs, trees, hash based</a:t>
-            </a:r>
-          </a:p>
-          <a:p>
-            <a:pPr lvl="2"/>
-            <a:r>
-              <a:rPr lang="en-CA" dirty="0"/>
-              <a:t>non linear lists do not have elements stored in a certain manner.</a:t>
-            </a:r>
           </a:p>
         </p:txBody>
       </p:sp>
     </p:spTree>
     <p:extLst>
       <p:ext uri="{BB962C8B-B14F-4D97-AF65-F5344CB8AC3E}">
-        <p14:creationId xmlns:p14="http://schemas.microsoft.com/office/powerpoint/2010/main" val="3562463711"/>
+        <p14:creationId xmlns:p14="http://schemas.microsoft.com/office/powerpoint/2010/main" val="4116026934"/>
       </p:ext>
     </p:extLst>
   </p:cSld>
@@ -4614,7 +4581,7 @@
                   <a:schemeClr val="bg1"/>
                 </a:solidFill>
               </a:rPr>
-              <a:t>Derived Types and Data Structures</a:t>
+              <a:t>Primitive Data Structures C++</a:t>
             </a:r>
           </a:p>
         </p:txBody>
@@ -4629,24 +4596,26 @@
             <p:ph idx="1"/>
           </p:nvPr>
         </p:nvSpPr>
-        <p:spPr/>
+        <p:spPr>
+          <a:xfrm>
+            <a:off x="346881" y="1508943"/>
+            <a:ext cx="4047698" cy="4554232"/>
+          </a:xfrm>
+        </p:spPr>
         <p:txBody>
           <a:bodyPr/>
           <a:lstStyle/>
           <a:p>
             <a:r>
               <a:rPr lang="en-CA" dirty="0"/>
-              <a:t>As C++ is an object oriented languages and supports the concept of classes we can also use these “derived” types to create data structures.</a:t>
-            </a:r>
-          </a:p>
-          <a:p>
-            <a:r>
-              <a:rPr lang="en-CA" dirty="0"/>
-              <a:t>Using derived types will provide more flexibility and power in creating data structures but can also add complexity.</a:t>
-            </a:r>
-          </a:p>
-          <a:p>
-            <a:endParaRPr lang="en-CA" dirty="0"/>
+              <a:t>These primitive structures will be used to create more complex structures.</a:t>
+            </a:r>
+          </a:p>
+          <a:p>
+            <a:r>
+              <a:rPr lang="en-CA" dirty="0"/>
+              <a:t>These almost always correspond to a CPU/GPUs “registers”</a:t>
+            </a:r>
           </a:p>
         </p:txBody>
       </p:sp>
@@ -4666,8 +4635,8 @@
         </p:blipFill>
         <p:spPr>
           <a:xfrm>
-            <a:off x="1754022" y="3619500"/>
-            <a:ext cx="7810500" cy="3238500"/>
+            <a:off x="4577615" y="1330881"/>
+            <a:ext cx="6776185" cy="5527119"/>
           </a:xfrm>
           <a:prstGeom prst="rect">
             <a:avLst/>
@@ -4677,7 +4646,7 @@
     </p:spTree>
     <p:extLst>
       <p:ext uri="{BB962C8B-B14F-4D97-AF65-F5344CB8AC3E}">
-        <p14:creationId xmlns:p14="http://schemas.microsoft.com/office/powerpoint/2010/main" val="3625698372"/>
+        <p14:creationId xmlns:p14="http://schemas.microsoft.com/office/powerpoint/2010/main" val="995191618"/>
       </p:ext>
     </p:extLst>
   </p:cSld>
@@ -4732,7 +4701,7 @@
                   <a:schemeClr val="bg1"/>
                 </a:solidFill>
               </a:rPr>
-              <a:t>Derived Types and Data Structures</a:t>
+              <a:t>Non-primitive Data structures</a:t>
             </a:r>
           </a:p>
         </p:txBody>
@@ -4747,100 +4716,135 @@
             <p:ph idx="1"/>
           </p:nvPr>
         </p:nvSpPr>
-        <p:spPr/>
-        <p:txBody>
-          <a:bodyPr/>
-          <a:lstStyle/>
-          <a:p>
-            <a:r>
-              <a:rPr lang="en-CA" b="1" dirty="0"/>
-              <a:t>Giant Note: </a:t>
-            </a:r>
-            <a:r>
-              <a:rPr lang="en-CA" dirty="0"/>
-              <a:t>Object Oriented is Not:</a:t>
-            </a:r>
+        <p:spPr>
+          <a:xfrm>
+            <a:off x="838200" y="1337481"/>
+            <a:ext cx="10515600" cy="5349921"/>
+          </a:xfrm>
+        </p:spPr>
+        <p:txBody>
+          <a:bodyPr>
+            <a:normAutofit lnSpcReduction="10000"/>
+          </a:bodyPr>
+          <a:lstStyle/>
+          <a:p>
+            <a:r>
+              <a:rPr lang="en-CA" dirty="0"/>
+              <a:t>The non-primitive data structures cannot be created without primitive data structures.</a:t>
+            </a:r>
+          </a:p>
+          <a:p>
+            <a:r>
+              <a:rPr lang="en-CA" dirty="0"/>
+              <a:t>The Non-primitive data structures are further divided into the following categories:</a:t>
+            </a:r>
+          </a:p>
+          <a:p>
+            <a:r>
+              <a:rPr lang="en-CA" dirty="0">
+                <a:solidFill>
+                  <a:srgbClr val="0070C0"/>
+                </a:solidFill>
+              </a:rPr>
+              <a:t>Arrays</a:t>
+            </a:r>
+            <a:r>
+              <a:rPr lang="en-CA" dirty="0"/>
+              <a:t> - </a:t>
+            </a:r>
+            <a:r>
+              <a:rPr lang="en-CA" sz="2400" dirty="0"/>
+              <a:t>a homogeneous and contiguous collection of same data types. They have a static memory allocation technique</a:t>
+            </a:r>
+            <a:endParaRPr lang="en-CA" dirty="0"/>
+          </a:p>
+          <a:p>
+            <a:r>
+              <a:rPr lang="en-CA" dirty="0">
+                <a:solidFill>
+                  <a:srgbClr val="0070C0"/>
+                </a:solidFill>
+              </a:rPr>
+              <a:t>Files </a:t>
+            </a:r>
+            <a:r>
+              <a:rPr lang="en-CA" sz="2400" dirty="0"/>
+              <a:t>- A file is a collection of records. The file data structure is primarily used for managing large amounts of data which is not in the primary storage of the system.</a:t>
+            </a:r>
+          </a:p>
+          <a:p>
+            <a:r>
+              <a:rPr lang="en-CA" dirty="0">
+                <a:solidFill>
+                  <a:srgbClr val="0070C0"/>
+                </a:solidFill>
+              </a:rPr>
+              <a:t>Lists</a:t>
+            </a:r>
+            <a:r>
+              <a:rPr lang="en-CA" dirty="0"/>
+              <a:t> - </a:t>
+            </a:r>
+            <a:r>
+              <a:rPr lang="en-CA" sz="2400" dirty="0"/>
+              <a:t>lists support dynamic memory allocation.</a:t>
+            </a:r>
+            <a:endParaRPr lang="en-CA" sz="2400" dirty="0">
+              <a:solidFill>
+                <a:srgbClr val="0070C0"/>
+              </a:solidFill>
+            </a:endParaRPr>
           </a:p>
           <a:p>
             <a:pPr lvl="1"/>
             <a:r>
-              <a:rPr lang="en-CA" dirty="0"/>
-              <a:t>The only way to “skin a cat”</a:t>
+              <a:rPr lang="en-CA" dirty="0">
+                <a:solidFill>
+                  <a:srgbClr val="0070C0"/>
+                </a:solidFill>
+              </a:rPr>
+              <a:t>Linear Lists </a:t>
+            </a:r>
+            <a:r>
+              <a:rPr lang="en-CA" dirty="0"/>
+              <a:t>– stacks, queues</a:t>
+            </a:r>
+          </a:p>
+          <a:p>
+            <a:pPr lvl="2"/>
+            <a:r>
+              <a:rPr lang="en-CA" dirty="0"/>
+              <a:t>The linear lists are those which have the elements stored in a sequential order. </a:t>
             </a:r>
           </a:p>
           <a:p>
             <a:pPr lvl="1"/>
             <a:r>
-              <a:rPr lang="en-CA" dirty="0"/>
-              <a:t>Is *NOT* how computers actually work</a:t>
-            </a:r>
-          </a:p>
-          <a:p>
-            <a:pPr lvl="1"/>
-            <a:r>
-              <a:rPr lang="en-CA" dirty="0"/>
-              <a:t>It’s a helpful abstraction for us humble humans</a:t>
-            </a:r>
-          </a:p>
-          <a:p>
-            <a:pPr lvl="1"/>
-            <a:r>
-              <a:rPr lang="en-CA" dirty="0"/>
-              <a:t>May not be the best way, or even a good way</a:t>
-            </a:r>
-          </a:p>
-          <a:p>
-            <a:r>
-              <a:rPr lang="en-CA" dirty="0"/>
-              <a:t>Mike Acton’s “3 big lies”:</a:t>
-            </a:r>
-          </a:p>
-          <a:p>
-            <a:pPr lvl="1"/>
-            <a:r>
               <a:rPr lang="en-CA" dirty="0">
-                <a:hlinkClick r:id="rId3"/>
+                <a:solidFill>
+                  <a:srgbClr val="0070C0"/>
+                </a:solidFill>
               </a:rPr>
-              <a:t>https://cellperformance.beyond3d.com/articles/2008/03/three-big-lies.html</a:t>
-            </a:r>
-            <a:endParaRPr lang="en-CA" dirty="0"/>
-          </a:p>
-          <a:p>
-            <a:pPr marL="457200" lvl="1" indent="0">
-              <a:buNone/>
-            </a:pPr>
-            <a:endParaRPr lang="en-CA" dirty="0"/>
-          </a:p>
-        </p:txBody>
-      </p:sp>
-      <p:pic>
-        <p:nvPicPr>
-          <p:cNvPr id="4" name="Picture 3"/>
-          <p:cNvPicPr>
-            <a:picLocks noChangeAspect="1"/>
-          </p:cNvPicPr>
-          <p:nvPr/>
-        </p:nvPicPr>
-        <p:blipFill>
-          <a:blip r:embed="rId4"/>
-          <a:stretch>
-            <a:fillRect/>
-          </a:stretch>
-        </p:blipFill>
-        <p:spPr>
-          <a:xfrm>
-            <a:off x="7627122" y="1870598"/>
-            <a:ext cx="4245593" cy="1760368"/>
-          </a:xfrm>
-          <a:prstGeom prst="rect">
-            <a:avLst/>
-          </a:prstGeom>
-        </p:spPr>
-      </p:pic>
+              <a:t>Non-linear Lists </a:t>
+            </a:r>
+            <a:r>
+              <a:rPr lang="en-CA" dirty="0"/>
+              <a:t>– graphs, trees, hash based</a:t>
+            </a:r>
+          </a:p>
+          <a:p>
+            <a:pPr lvl="2"/>
+            <a:r>
+              <a:rPr lang="en-CA" dirty="0"/>
+              <a:t>non linear lists do not have elements stored in a certain manner.</a:t>
+            </a:r>
+          </a:p>
+        </p:txBody>
+      </p:sp>
     </p:spTree>
     <p:extLst>
       <p:ext uri="{BB962C8B-B14F-4D97-AF65-F5344CB8AC3E}">
-        <p14:creationId xmlns:p14="http://schemas.microsoft.com/office/powerpoint/2010/main" val="857484025"/>
+        <p14:creationId xmlns:p14="http://schemas.microsoft.com/office/powerpoint/2010/main" val="3562463711"/>
       </p:ext>
     </p:extLst>
   </p:cSld>
@@ -4869,13 +4873,7 @@
       </p:grpSpPr>
       <p:sp>
         <p:nvSpPr>
-          <p:cNvPr id="2" name="Title 1">
-            <a:extLst>
-              <a:ext uri="{FF2B5EF4-FFF2-40B4-BE49-F238E27FC236}">
-                <a16:creationId xmlns:a16="http://schemas.microsoft.com/office/drawing/2014/main" id="{B06092A6-64C4-40B1-B90B-ADCCCB67629D}"/>
-              </a:ext>
-            </a:extLst>
-          </p:cNvPr>
+          <p:cNvPr id="2" name="Title 1"/>
           <p:cNvSpPr>
             <a:spLocks noGrp="1"/>
           </p:cNvSpPr>
@@ -4883,44 +4881,88 @@
             <p:ph type="title"/>
           </p:nvPr>
         </p:nvSpPr>
+        <p:spPr>
+          <a:xfrm>
+            <a:off x="2039815" y="182245"/>
+            <a:ext cx="9710907" cy="830629"/>
+          </a:xfrm>
+        </p:spPr>
+        <p:txBody>
+          <a:bodyPr>
+            <a:normAutofit/>
+          </a:bodyPr>
+          <a:lstStyle/>
+          <a:p>
+            <a:r>
+              <a:rPr lang="en-CA" dirty="0">
+                <a:solidFill>
+                  <a:schemeClr val="bg1"/>
+                </a:solidFill>
+              </a:rPr>
+              <a:t>Derived Types and Data Structures</a:t>
+            </a:r>
+          </a:p>
+        </p:txBody>
+      </p:sp>
+      <p:sp>
+        <p:nvSpPr>
+          <p:cNvPr id="3" name="Content Placeholder 2"/>
+          <p:cNvSpPr>
+            <a:spLocks noGrp="1"/>
+          </p:cNvSpPr>
+          <p:nvPr>
+            <p:ph idx="1"/>
+          </p:nvPr>
+        </p:nvSpPr>
         <p:spPr/>
         <p:txBody>
           <a:bodyPr/>
           <a:lstStyle/>
           <a:p>
+            <a:r>
+              <a:rPr lang="en-CA" dirty="0"/>
+              <a:t>As C++ is an object oriented languages and supports the concept of classes we can also use these “derived” types to create data structures.</a:t>
+            </a:r>
+          </a:p>
+          <a:p>
+            <a:r>
+              <a:rPr lang="en-CA" dirty="0"/>
+              <a:t>Using derived types will provide more flexibility and power in creating data structures but can also add complexity.</a:t>
+            </a:r>
+          </a:p>
+          <a:p>
             <a:endParaRPr lang="en-CA" dirty="0"/>
           </a:p>
         </p:txBody>
       </p:sp>
-      <p:sp>
-        <p:nvSpPr>
-          <p:cNvPr id="3" name="Content Placeholder 2">
-            <a:extLst>
-              <a:ext uri="{FF2B5EF4-FFF2-40B4-BE49-F238E27FC236}">
-                <a16:creationId xmlns:a16="http://schemas.microsoft.com/office/drawing/2014/main" id="{9ECB68CD-19B8-438A-9D91-F26C5D653EB4}"/>
-              </a:ext>
-            </a:extLst>
-          </p:cNvPr>
-          <p:cNvSpPr>
-            <a:spLocks noGrp="1"/>
-          </p:cNvSpPr>
-          <p:nvPr>
-            <p:ph idx="1"/>
-          </p:nvPr>
-        </p:nvSpPr>
-        <p:spPr/>
-        <p:txBody>
-          <a:bodyPr/>
-          <a:lstStyle/>
-          <a:p>
-            <a:endParaRPr lang="en-CA" dirty="0"/>
-          </a:p>
-        </p:txBody>
-      </p:sp>
+      <p:pic>
+        <p:nvPicPr>
+          <p:cNvPr id="4" name="Picture 3"/>
+          <p:cNvPicPr>
+            <a:picLocks noChangeAspect="1"/>
+          </p:cNvPicPr>
+          <p:nvPr/>
+        </p:nvPicPr>
+        <p:blipFill>
+          <a:blip r:embed="rId2"/>
+          <a:stretch>
+            <a:fillRect/>
+          </a:stretch>
+        </p:blipFill>
+        <p:spPr>
+          <a:xfrm>
+            <a:off x="1754022" y="3619500"/>
+            <a:ext cx="7810500" cy="3238500"/>
+          </a:xfrm>
+          <a:prstGeom prst="rect">
+            <a:avLst/>
+          </a:prstGeom>
+        </p:spPr>
+      </p:pic>
     </p:spTree>
     <p:extLst>
       <p:ext uri="{BB962C8B-B14F-4D97-AF65-F5344CB8AC3E}">
-        <p14:creationId xmlns:p14="http://schemas.microsoft.com/office/powerpoint/2010/main" val="2256487074"/>
+        <p14:creationId xmlns:p14="http://schemas.microsoft.com/office/powerpoint/2010/main" val="3625698372"/>
       </p:ext>
     </p:extLst>
   </p:cSld>
@@ -5139,6 +5181,280 @@
     <p:extLst>
       <p:ext uri="{BB962C8B-B14F-4D97-AF65-F5344CB8AC3E}">
         <p14:creationId xmlns:p14="http://schemas.microsoft.com/office/powerpoint/2010/main" val="710590374"/>
+      </p:ext>
+    </p:extLst>
+  </p:cSld>
+  <p:clrMapOvr>
+    <a:masterClrMapping/>
+  </p:clrMapOvr>
+</p:sld>
+</file>
+
+<file path=ppt/slides/slide20.xml><?xml version="1.0" encoding="utf-8"?>
+<p:sld xmlns:a="http://schemas.openxmlformats.org/drawingml/2006/main" xmlns:r="http://schemas.openxmlformats.org/officeDocument/2006/relationships" xmlns:p="http://schemas.openxmlformats.org/presentationml/2006/main">
+  <p:cSld>
+    <p:spTree>
+      <p:nvGrpSpPr>
+        <p:cNvPr id="1" name=""/>
+        <p:cNvGrpSpPr/>
+        <p:nvPr/>
+      </p:nvGrpSpPr>
+      <p:grpSpPr>
+        <a:xfrm>
+          <a:off x="0" y="0"/>
+          <a:ext cx="0" cy="0"/>
+          <a:chOff x="0" y="0"/>
+          <a:chExt cx="0" cy="0"/>
+        </a:xfrm>
+      </p:grpSpPr>
+      <p:sp>
+        <p:nvSpPr>
+          <p:cNvPr id="2" name="Title 1"/>
+          <p:cNvSpPr>
+            <a:spLocks noGrp="1"/>
+          </p:cNvSpPr>
+          <p:nvPr>
+            <p:ph type="title"/>
+          </p:nvPr>
+        </p:nvSpPr>
+        <p:spPr>
+          <a:xfrm>
+            <a:off x="2039815" y="182245"/>
+            <a:ext cx="9710907" cy="830629"/>
+          </a:xfrm>
+        </p:spPr>
+        <p:txBody>
+          <a:bodyPr>
+            <a:normAutofit/>
+          </a:bodyPr>
+          <a:lstStyle/>
+          <a:p>
+            <a:r>
+              <a:rPr lang="en-CA" dirty="0">
+                <a:solidFill>
+                  <a:schemeClr val="bg1"/>
+                </a:solidFill>
+              </a:rPr>
+              <a:t>Derived Types and Data Structures</a:t>
+            </a:r>
+          </a:p>
+        </p:txBody>
+      </p:sp>
+      <p:sp>
+        <p:nvSpPr>
+          <p:cNvPr id="3" name="Content Placeholder 2"/>
+          <p:cNvSpPr>
+            <a:spLocks noGrp="1"/>
+          </p:cNvSpPr>
+          <p:nvPr>
+            <p:ph idx="1"/>
+          </p:nvPr>
+        </p:nvSpPr>
+        <p:spPr>
+          <a:xfrm>
+            <a:off x="393290" y="1508943"/>
+            <a:ext cx="10960510" cy="4554232"/>
+          </a:xfrm>
+        </p:spPr>
+        <p:txBody>
+          <a:bodyPr/>
+          <a:lstStyle/>
+          <a:p>
+            <a:r>
+              <a:rPr lang="en-CA" b="1" dirty="0"/>
+              <a:t>Giant Note: </a:t>
+            </a:r>
+            <a:r>
+              <a:rPr lang="en-CA" dirty="0"/>
+              <a:t>Object Oriented is Not:</a:t>
+            </a:r>
+          </a:p>
+          <a:p>
+            <a:pPr lvl="1"/>
+            <a:r>
+              <a:rPr lang="en-CA" dirty="0"/>
+              <a:t>The only way to “skin a cat”</a:t>
+            </a:r>
+          </a:p>
+          <a:p>
+            <a:pPr lvl="1"/>
+            <a:r>
+              <a:rPr lang="en-CA" dirty="0"/>
+              <a:t>Is *NOT* how computers actually work</a:t>
+            </a:r>
+          </a:p>
+          <a:p>
+            <a:pPr lvl="1"/>
+            <a:r>
+              <a:rPr lang="en-CA" dirty="0"/>
+              <a:t>It’s a helpful abstraction for us humble humans</a:t>
+            </a:r>
+          </a:p>
+          <a:p>
+            <a:pPr lvl="1"/>
+            <a:r>
+              <a:rPr lang="en-CA" dirty="0"/>
+              <a:t>May not be the best way, or even a good way</a:t>
+            </a:r>
+          </a:p>
+          <a:p>
+            <a:r>
+              <a:rPr lang="en-CA" dirty="0"/>
+              <a:t>Mike Acton’s “3 big lies”:</a:t>
+            </a:r>
+          </a:p>
+          <a:p>
+            <a:pPr lvl="1"/>
+            <a:r>
+              <a:rPr lang="en-CA" dirty="0">
+                <a:hlinkClick r:id="rId3"/>
+              </a:rPr>
+              <a:t>https://cellperformance.beyond3d.com/articles/2008/03/three-big-lies.html</a:t>
+            </a:r>
+            <a:endParaRPr lang="en-CA" dirty="0"/>
+          </a:p>
+          <a:p>
+            <a:pPr lvl="1"/>
+            <a:r>
+              <a:rPr lang="en-CA" dirty="0"/>
+              <a:t>Software is the platform</a:t>
+            </a:r>
+          </a:p>
+          <a:p>
+            <a:pPr lvl="1"/>
+            <a:r>
+              <a:rPr lang="en-CA" dirty="0"/>
+              <a:t>Code should be designed around a model of the world</a:t>
+            </a:r>
+          </a:p>
+          <a:p>
+            <a:pPr lvl="1"/>
+            <a:r>
+              <a:rPr lang="en-CA" dirty="0"/>
+              <a:t>Code is more </a:t>
+            </a:r>
+            <a:r>
+              <a:rPr lang="en-CA"/>
+              <a:t>important than data</a:t>
+            </a:r>
+            <a:endParaRPr lang="en-CA" dirty="0"/>
+          </a:p>
+          <a:p>
+            <a:pPr marL="457200" lvl="1" indent="0">
+              <a:buNone/>
+            </a:pPr>
+            <a:endParaRPr lang="en-CA" dirty="0"/>
+          </a:p>
+        </p:txBody>
+      </p:sp>
+      <p:pic>
+        <p:nvPicPr>
+          <p:cNvPr id="4" name="Picture 3"/>
+          <p:cNvPicPr>
+            <a:picLocks noChangeAspect="1"/>
+          </p:cNvPicPr>
+          <p:nvPr/>
+        </p:nvPicPr>
+        <p:blipFill>
+          <a:blip r:embed="rId4"/>
+          <a:stretch>
+            <a:fillRect/>
+          </a:stretch>
+        </p:blipFill>
+        <p:spPr>
+          <a:xfrm>
+            <a:off x="7627122" y="1870598"/>
+            <a:ext cx="4245593" cy="1760368"/>
+          </a:xfrm>
+          <a:prstGeom prst="rect">
+            <a:avLst/>
+          </a:prstGeom>
+        </p:spPr>
+      </p:pic>
+    </p:spTree>
+    <p:extLst>
+      <p:ext uri="{BB962C8B-B14F-4D97-AF65-F5344CB8AC3E}">
+        <p14:creationId xmlns:p14="http://schemas.microsoft.com/office/powerpoint/2010/main" val="857484025"/>
+      </p:ext>
+    </p:extLst>
+  </p:cSld>
+  <p:clrMapOvr>
+    <a:masterClrMapping/>
+  </p:clrMapOvr>
+</p:sld>
+</file>
+
+<file path=ppt/slides/slide21.xml><?xml version="1.0" encoding="utf-8"?>
+<p:sld xmlns:a="http://schemas.openxmlformats.org/drawingml/2006/main" xmlns:r="http://schemas.openxmlformats.org/officeDocument/2006/relationships" xmlns:p="http://schemas.openxmlformats.org/presentationml/2006/main">
+  <p:cSld>
+    <p:spTree>
+      <p:nvGrpSpPr>
+        <p:cNvPr id="1" name=""/>
+        <p:cNvGrpSpPr/>
+        <p:nvPr/>
+      </p:nvGrpSpPr>
+      <p:grpSpPr>
+        <a:xfrm>
+          <a:off x="0" y="0"/>
+          <a:ext cx="0" cy="0"/>
+          <a:chOff x="0" y="0"/>
+          <a:chExt cx="0" cy="0"/>
+        </a:xfrm>
+      </p:grpSpPr>
+      <p:sp>
+        <p:nvSpPr>
+          <p:cNvPr id="2" name="Title 1">
+            <a:extLst>
+              <a:ext uri="{FF2B5EF4-FFF2-40B4-BE49-F238E27FC236}">
+                <a16:creationId xmlns:a16="http://schemas.microsoft.com/office/drawing/2014/main" id="{B06092A6-64C4-40B1-B90B-ADCCCB67629D}"/>
+              </a:ext>
+            </a:extLst>
+          </p:cNvPr>
+          <p:cNvSpPr>
+            <a:spLocks noGrp="1"/>
+          </p:cNvSpPr>
+          <p:nvPr>
+            <p:ph type="title"/>
+          </p:nvPr>
+        </p:nvSpPr>
+        <p:spPr/>
+        <p:txBody>
+          <a:bodyPr/>
+          <a:lstStyle/>
+          <a:p>
+            <a:endParaRPr lang="en-CA" dirty="0"/>
+          </a:p>
+        </p:txBody>
+      </p:sp>
+      <p:sp>
+        <p:nvSpPr>
+          <p:cNvPr id="3" name="Content Placeholder 2">
+            <a:extLst>
+              <a:ext uri="{FF2B5EF4-FFF2-40B4-BE49-F238E27FC236}">
+                <a16:creationId xmlns:a16="http://schemas.microsoft.com/office/drawing/2014/main" id="{9ECB68CD-19B8-438A-9D91-F26C5D653EB4}"/>
+              </a:ext>
+            </a:extLst>
+          </p:cNvPr>
+          <p:cNvSpPr>
+            <a:spLocks noGrp="1"/>
+          </p:cNvSpPr>
+          <p:nvPr>
+            <p:ph idx="1"/>
+          </p:nvPr>
+        </p:nvSpPr>
+        <p:spPr/>
+        <p:txBody>
+          <a:bodyPr/>
+          <a:lstStyle/>
+          <a:p>
+            <a:endParaRPr lang="en-CA" dirty="0"/>
+          </a:p>
+        </p:txBody>
+      </p:sp>
+    </p:spTree>
+    <p:extLst>
+      <p:ext uri="{BB962C8B-B14F-4D97-AF65-F5344CB8AC3E}">
+        <p14:creationId xmlns:p14="http://schemas.microsoft.com/office/powerpoint/2010/main" val="2256487074"/>
       </p:ext>
     </p:extLst>
   </p:cSld>
@@ -5575,11 +5891,11 @@
             </a:pPr>
             <a:r>
               <a:rPr lang="en-CA" dirty="0"/>
-              <a:t> git clone https://github.com/FeeneyCodes/INFO3135Fall2025</a:t>
+              <a:t> “git clone https://github.com/FeeneyCodes/INFO3135Fall2025</a:t>
             </a:r>
             <a:r>
               <a:rPr lang="en-CA" b="1" dirty="0"/>
-              <a:t>.git</a:t>
+              <a:t>.git”</a:t>
             </a:r>
           </a:p>
           <a:p>
@@ -5589,6 +5905,24 @@
             <a:r>
               <a:rPr lang="en-CA" sz="3200" dirty="0"/>
               <a:t>Do  this all the time:</a:t>
+            </a:r>
+          </a:p>
+          <a:p>
+            <a:pPr marL="457200" lvl="1" indent="0">
+              <a:buNone/>
+            </a:pPr>
+            <a:r>
+              <a:rPr lang="en-CA" sz="2800" dirty="0"/>
+              <a:t>Right-click on your repo</a:t>
+            </a:r>
+          </a:p>
+          <a:p>
+            <a:pPr marL="457200" lvl="1" indent="0">
+              <a:buNone/>
+            </a:pPr>
+            <a:r>
+              <a:rPr lang="en-CA" sz="2800" dirty="0"/>
+              <a:t>In the console/bash: “git pull” </a:t>
             </a:r>
           </a:p>
           <a:p>
@@ -6054,7 +6388,13 @@
       </p:grpSpPr>
       <p:sp>
         <p:nvSpPr>
-          <p:cNvPr id="2" name="Title 1"/>
+          <p:cNvPr id="2" name="Title 1">
+            <a:extLst>
+              <a:ext uri="{FF2B5EF4-FFF2-40B4-BE49-F238E27FC236}">
+                <a16:creationId xmlns:a16="http://schemas.microsoft.com/office/drawing/2014/main" id="{558739B7-F71A-ADB9-F1AE-03098E154EC1}"/>
+              </a:ext>
+            </a:extLst>
+          </p:cNvPr>
           <p:cNvSpPr>
             <a:spLocks noGrp="1"/>
           </p:cNvSpPr>
@@ -6062,108 +6402,166 @@
             <p:ph type="title"/>
           </p:nvPr>
         </p:nvSpPr>
-        <p:spPr>
-          <a:xfrm>
-            <a:off x="2039815" y="182245"/>
-            <a:ext cx="9710907" cy="830629"/>
-          </a:xfrm>
-        </p:spPr>
-        <p:txBody>
-          <a:bodyPr>
-            <a:normAutofit/>
-          </a:bodyPr>
-          <a:lstStyle/>
-          <a:p>
-            <a:r>
-              <a:rPr lang="en-CA" dirty="0">
-                <a:solidFill>
-                  <a:schemeClr val="bg1"/>
-                </a:solidFill>
-              </a:rPr>
-              <a:t>Introduction</a:t>
-            </a:r>
-          </a:p>
-        </p:txBody>
-      </p:sp>
-      <p:sp>
-        <p:nvSpPr>
-          <p:cNvPr id="3" name="Content Placeholder 2"/>
-          <p:cNvSpPr>
-            <a:spLocks noGrp="1"/>
-          </p:cNvSpPr>
-          <p:nvPr>
-            <p:ph idx="1"/>
-          </p:nvPr>
-        </p:nvSpPr>
-        <p:spPr>
-          <a:xfrm>
-            <a:off x="685800" y="1508943"/>
-            <a:ext cx="10912522" cy="4554232"/>
-          </a:xfrm>
-        </p:spPr>
+        <p:spPr/>
         <p:txBody>
           <a:bodyPr/>
           <a:lstStyle/>
           <a:p>
-            <a:pPr marL="0" indent="0">
-              <a:buNone/>
-            </a:pPr>
-            <a:r>
-              <a:rPr lang="en-CA" sz="3200" u="sng" dirty="0" err="1"/>
-              <a:t>al·go·rithm</a:t>
-            </a:r>
-            <a:endParaRPr lang="en-CA" sz="3200" u="sng" dirty="0"/>
-          </a:p>
-          <a:p>
-            <a:pPr marL="0" indent="0">
-              <a:buNone/>
-            </a:pPr>
-            <a:r>
-              <a:rPr lang="en-CA" dirty="0"/>
-              <a:t>noun</a:t>
-            </a:r>
-          </a:p>
-          <a:p>
-            <a:r>
-              <a:rPr lang="en-CA" dirty="0"/>
-              <a:t>a process or set of rules to be followed in calculations or other problem-solving operations, especially by a computer.</a:t>
-            </a:r>
-          </a:p>
-          <a:p>
-            <a:pPr marL="0" indent="0">
-              <a:buNone/>
-            </a:pPr>
-            <a:r>
-              <a:rPr lang="en-CA" sz="3200" b="1" u="sng" dirty="0"/>
-              <a:t>Origin</a:t>
-            </a:r>
-          </a:p>
-          <a:p>
-            <a:r>
-              <a:rPr lang="en-CA" dirty="0"/>
-              <a:t>1890–95; variant of algorism, by association with Greek </a:t>
-            </a:r>
-            <a:r>
-              <a:rPr lang="en-CA" dirty="0" err="1"/>
-              <a:t>arithmós</a:t>
-            </a:r>
-            <a:r>
-              <a:rPr lang="en-CA" dirty="0"/>
-              <a:t> number. </a:t>
-            </a:r>
-          </a:p>
-          <a:p>
-            <a:endParaRPr lang="en-CA" dirty="0"/>
-          </a:p>
-          <a:p>
-            <a:endParaRPr lang="en-CA" dirty="0"/>
+            <a:endParaRPr lang="en-CA"/>
+          </a:p>
+        </p:txBody>
+      </p:sp>
+      <p:sp>
+        <p:nvSpPr>
+          <p:cNvPr id="4" name="Rectangle: Rounded Corners 3">
+            <a:extLst>
+              <a:ext uri="{FF2B5EF4-FFF2-40B4-BE49-F238E27FC236}">
+                <a16:creationId xmlns:a16="http://schemas.microsoft.com/office/drawing/2014/main" id="{F13D8EC1-760D-E26C-F5E8-F8C043D073B2}"/>
+              </a:ext>
+            </a:extLst>
+          </p:cNvPr>
+          <p:cNvSpPr/>
+          <p:nvPr/>
+        </p:nvSpPr>
+        <p:spPr>
+          <a:xfrm>
+            <a:off x="717376" y="2507226"/>
+            <a:ext cx="2644877" cy="1612490"/>
+          </a:xfrm>
+          <a:prstGeom prst="roundRect">
+            <a:avLst/>
+          </a:prstGeom>
+        </p:spPr>
+        <p:style>
+          <a:lnRef idx="2">
+            <a:schemeClr val="accent1">
+              <a:shade val="15000"/>
+            </a:schemeClr>
+          </a:lnRef>
+          <a:fillRef idx="1">
+            <a:schemeClr val="accent1"/>
+          </a:fillRef>
+          <a:effectRef idx="0">
+            <a:schemeClr val="accent1"/>
+          </a:effectRef>
+          <a:fontRef idx="minor">
+            <a:schemeClr val="lt1"/>
+          </a:fontRef>
+        </p:style>
+        <p:txBody>
+          <a:bodyPr rtlCol="0" anchor="ctr"/>
+          <a:lstStyle/>
+          <a:p>
+            <a:pPr algn="ctr"/>
+            <a:r>
+              <a:rPr lang="en-CA" sz="4000" dirty="0"/>
+              <a:t>Data</a:t>
+            </a:r>
+          </a:p>
+        </p:txBody>
+      </p:sp>
+      <p:sp>
+        <p:nvSpPr>
+          <p:cNvPr id="5" name="Rectangle: Rounded Corners 4">
+            <a:extLst>
+              <a:ext uri="{FF2B5EF4-FFF2-40B4-BE49-F238E27FC236}">
+                <a16:creationId xmlns:a16="http://schemas.microsoft.com/office/drawing/2014/main" id="{DA2B35B4-5BF4-8BCA-D985-D677252606C1}"/>
+              </a:ext>
+            </a:extLst>
+          </p:cNvPr>
+          <p:cNvSpPr/>
+          <p:nvPr/>
+        </p:nvSpPr>
+        <p:spPr>
+          <a:xfrm>
+            <a:off x="8554444" y="2576051"/>
+            <a:ext cx="2644877" cy="1612490"/>
+          </a:xfrm>
+          <a:prstGeom prst="roundRect">
+            <a:avLst/>
+          </a:prstGeom>
+        </p:spPr>
+        <p:style>
+          <a:lnRef idx="2">
+            <a:schemeClr val="accent1">
+              <a:shade val="15000"/>
+            </a:schemeClr>
+          </a:lnRef>
+          <a:fillRef idx="1">
+            <a:schemeClr val="accent1"/>
+          </a:fillRef>
+          <a:effectRef idx="0">
+            <a:schemeClr val="accent1"/>
+          </a:effectRef>
+          <a:fontRef idx="minor">
+            <a:schemeClr val="lt1"/>
+          </a:fontRef>
+        </p:style>
+        <p:txBody>
+          <a:bodyPr rtlCol="0" anchor="ctr"/>
+          <a:lstStyle/>
+          <a:p>
+            <a:pPr algn="ctr"/>
+            <a:r>
+              <a:rPr lang="en-CA" sz="4000" dirty="0"/>
+              <a:t>Data</a:t>
+            </a:r>
+          </a:p>
+        </p:txBody>
+      </p:sp>
+      <p:sp>
+        <p:nvSpPr>
+          <p:cNvPr id="6" name="Arrow: Right 5">
+            <a:extLst>
+              <a:ext uri="{FF2B5EF4-FFF2-40B4-BE49-F238E27FC236}">
+                <a16:creationId xmlns:a16="http://schemas.microsoft.com/office/drawing/2014/main" id="{98CB8958-2086-E36B-43AF-AA64A2ECF1CC}"/>
+              </a:ext>
+            </a:extLst>
+          </p:cNvPr>
+          <p:cNvSpPr/>
+          <p:nvPr/>
+        </p:nvSpPr>
+        <p:spPr>
+          <a:xfrm>
+            <a:off x="3588774" y="2644877"/>
+            <a:ext cx="4739149" cy="1474839"/>
+          </a:xfrm>
+          <a:prstGeom prst="rightArrow">
+            <a:avLst/>
+          </a:prstGeom>
+        </p:spPr>
+        <p:style>
+          <a:lnRef idx="2">
+            <a:schemeClr val="accent1">
+              <a:shade val="15000"/>
+            </a:schemeClr>
+          </a:lnRef>
+          <a:fillRef idx="1">
+            <a:schemeClr val="accent1"/>
+          </a:fillRef>
+          <a:effectRef idx="0">
+            <a:schemeClr val="accent1"/>
+          </a:effectRef>
+          <a:fontRef idx="minor">
+            <a:schemeClr val="lt1"/>
+          </a:fontRef>
+        </p:style>
+        <p:txBody>
+          <a:bodyPr rtlCol="0" anchor="ctr"/>
+          <a:lstStyle/>
+          <a:p>
+            <a:pPr algn="ctr"/>
+            <a:r>
+              <a:rPr lang="en-CA" sz="3200" dirty="0"/>
+              <a:t>Your code</a:t>
+            </a:r>
           </a:p>
         </p:txBody>
       </p:sp>
     </p:spTree>
     <p:extLst>
       <p:ext uri="{BB962C8B-B14F-4D97-AF65-F5344CB8AC3E}">
-        <p14:creationId xmlns:p14="http://schemas.microsoft.com/office/powerpoint/2010/main" val="1389926418"/>
+        <p14:creationId xmlns:p14="http://schemas.microsoft.com/office/powerpoint/2010/main" val="3534032551"/>
       </p:ext>
     </p:extLst>
   </p:cSld>

</xml_diff>

<commit_message>
Start of stack array thing
</commit_message>
<xml_diff>
--- a/Week 1 (Sept. 8)/{1} INFO 3135 Week 1 Intro.pptx
+++ b/Week 1 (Sept. 8)/{1} INFO 3135 Week 1 Intro.pptx
@@ -14,21 +14,21 @@
     <p:sldId id="288" r:id="rId5"/>
     <p:sldId id="289" r:id="rId6"/>
     <p:sldId id="268" r:id="rId7"/>
-    <p:sldId id="282" r:id="rId8"/>
-    <p:sldId id="283" r:id="rId9"/>
-    <p:sldId id="290" r:id="rId10"/>
-    <p:sldId id="257" r:id="rId11"/>
-    <p:sldId id="259" r:id="rId12"/>
-    <p:sldId id="260" r:id="rId13"/>
-    <p:sldId id="261" r:id="rId14"/>
-    <p:sldId id="291" r:id="rId15"/>
-    <p:sldId id="258" r:id="rId16"/>
-    <p:sldId id="263" r:id="rId17"/>
-    <p:sldId id="262" r:id="rId18"/>
-    <p:sldId id="264" r:id="rId19"/>
-    <p:sldId id="265" r:id="rId20"/>
-    <p:sldId id="286" r:id="rId21"/>
-    <p:sldId id="284" r:id="rId22"/>
+    <p:sldId id="292" r:id="rId8"/>
+    <p:sldId id="282" r:id="rId9"/>
+    <p:sldId id="283" r:id="rId10"/>
+    <p:sldId id="290" r:id="rId11"/>
+    <p:sldId id="257" r:id="rId12"/>
+    <p:sldId id="259" r:id="rId13"/>
+    <p:sldId id="260" r:id="rId14"/>
+    <p:sldId id="261" r:id="rId15"/>
+    <p:sldId id="291" r:id="rId16"/>
+    <p:sldId id="258" r:id="rId17"/>
+    <p:sldId id="263" r:id="rId18"/>
+    <p:sldId id="262" r:id="rId19"/>
+    <p:sldId id="264" r:id="rId20"/>
+    <p:sldId id="265" r:id="rId21"/>
+    <p:sldId id="286" r:id="rId22"/>
   </p:sldIdLst>
   <p:sldSz cx="12192000" cy="6858000"/>
   <p:notesSz cx="6858000" cy="9144000"/>
@@ -129,7 +129,7 @@
   </p:defaultTextStyle>
   <p:extLst>
     <p:ext uri="{EFAFB233-063F-42B5-8137-9DF3F51BA10A}">
-      <p15:sldGuideLst xmlns:p15="http://schemas.microsoft.com/office/powerpoint/2012/main"/>
+      <p15:sldGuideLst xmlns:p15="http://schemas.microsoft.com/office/powerpoint/2012/main" xmlns=""/>
     </p:ext>
   </p:extLst>
 </p:presentation>
@@ -217,7 +217,8 @@
           <a:p>
             <a:fld id="{C4DCF24A-4E93-4358-992A-A6381ABFBE3A}" type="datetimeFigureOut">
               <a:rPr lang="en-CA" smtClean="0"/>
-              <a:t>2025-09-08</a:t>
+              <a:pPr/>
+              <a:t>2025-09-15</a:t>
             </a:fld>
             <a:endParaRPr lang="en-CA"/>
           </a:p>
@@ -376,6 +377,7 @@
           <a:p>
             <a:fld id="{FAD8D051-2F16-4010-A3B4-A332A154940A}" type="slidenum">
               <a:rPr lang="en-CA" smtClean="0"/>
+              <a:pPr/>
               <a:t>‹#›</a:t>
             </a:fld>
             <a:endParaRPr lang="en-CA"/>
@@ -385,7 +387,7 @@
     </p:spTree>
     <p:extLst>
       <p:ext uri="{BB962C8B-B14F-4D97-AF65-F5344CB8AC3E}">
-        <p14:creationId xmlns:p14="http://schemas.microsoft.com/office/powerpoint/2010/main" val="4072749440"/>
+        <p14:creationId xmlns:p14="http://schemas.microsoft.com/office/powerpoint/2010/main" xmlns="" val="4072749440"/>
       </p:ext>
     </p:extLst>
   </p:cSld>
@@ -550,7 +552,8 @@
           <a:p>
             <a:fld id="{FAD8D051-2F16-4010-A3B4-A332A154940A}" type="slidenum">
               <a:rPr lang="en-CA" smtClean="0"/>
-              <a:t>20</a:t>
+              <a:pPr/>
+              <a:t>21</a:t>
             </a:fld>
             <a:endParaRPr lang="en-CA"/>
           </a:p>
@@ -559,7 +562,7 @@
     </p:spTree>
     <p:extLst>
       <p:ext uri="{BB962C8B-B14F-4D97-AF65-F5344CB8AC3E}">
-        <p14:creationId xmlns:p14="http://schemas.microsoft.com/office/powerpoint/2010/main" val="1143318969"/>
+        <p14:creationId xmlns:p14="http://schemas.microsoft.com/office/powerpoint/2010/main" xmlns="" val="1143318969"/>
       </p:ext>
     </p:extLst>
   </p:cSld>
@@ -700,7 +703,8 @@
           <a:p>
             <a:fld id="{1E4A8252-26A2-422C-8021-53F2FA7F3083}" type="datetimeFigureOut">
               <a:rPr lang="en-CA" smtClean="0"/>
-              <a:t>2025-09-08</a:t>
+              <a:pPr/>
+              <a:t>2025-09-15</a:t>
             </a:fld>
             <a:endParaRPr lang="en-CA"/>
           </a:p>
@@ -742,6 +746,7 @@
           <a:p>
             <a:fld id="{ADD8DDE3-37DC-4FC1-86DE-98D0EA336BFE}" type="slidenum">
               <a:rPr lang="en-CA" smtClean="0"/>
+              <a:pPr/>
               <a:t>‹#›</a:t>
             </a:fld>
             <a:endParaRPr lang="en-CA"/>
@@ -751,7 +756,7 @@
     </p:spTree>
     <p:extLst>
       <p:ext uri="{BB962C8B-B14F-4D97-AF65-F5344CB8AC3E}">
-        <p14:creationId xmlns:p14="http://schemas.microsoft.com/office/powerpoint/2010/main" val="2077059326"/>
+        <p14:creationId xmlns:p14="http://schemas.microsoft.com/office/powerpoint/2010/main" xmlns="" val="2077059326"/>
       </p:ext>
     </p:extLst>
   </p:cSld>
@@ -870,7 +875,8 @@
           <a:p>
             <a:fld id="{1E4A8252-26A2-422C-8021-53F2FA7F3083}" type="datetimeFigureOut">
               <a:rPr lang="en-CA" smtClean="0"/>
-              <a:t>2025-09-08</a:t>
+              <a:pPr/>
+              <a:t>2025-09-15</a:t>
             </a:fld>
             <a:endParaRPr lang="en-CA"/>
           </a:p>
@@ -912,6 +918,7 @@
           <a:p>
             <a:fld id="{ADD8DDE3-37DC-4FC1-86DE-98D0EA336BFE}" type="slidenum">
               <a:rPr lang="en-CA" smtClean="0"/>
+              <a:pPr/>
               <a:t>‹#›</a:t>
             </a:fld>
             <a:endParaRPr lang="en-CA"/>
@@ -921,7 +928,7 @@
     </p:spTree>
     <p:extLst>
       <p:ext uri="{BB962C8B-B14F-4D97-AF65-F5344CB8AC3E}">
-        <p14:creationId xmlns:p14="http://schemas.microsoft.com/office/powerpoint/2010/main" val="4179238904"/>
+        <p14:creationId xmlns:p14="http://schemas.microsoft.com/office/powerpoint/2010/main" xmlns="" val="4179238904"/>
       </p:ext>
     </p:extLst>
   </p:cSld>
@@ -1050,7 +1057,8 @@
           <a:p>
             <a:fld id="{1E4A8252-26A2-422C-8021-53F2FA7F3083}" type="datetimeFigureOut">
               <a:rPr lang="en-CA" smtClean="0"/>
-              <a:t>2025-09-08</a:t>
+              <a:pPr/>
+              <a:t>2025-09-15</a:t>
             </a:fld>
             <a:endParaRPr lang="en-CA"/>
           </a:p>
@@ -1092,6 +1100,7 @@
           <a:p>
             <a:fld id="{ADD8DDE3-37DC-4FC1-86DE-98D0EA336BFE}" type="slidenum">
               <a:rPr lang="en-CA" smtClean="0"/>
+              <a:pPr/>
               <a:t>‹#›</a:t>
             </a:fld>
             <a:endParaRPr lang="en-CA"/>
@@ -1101,7 +1110,7 @@
     </p:spTree>
     <p:extLst>
       <p:ext uri="{BB962C8B-B14F-4D97-AF65-F5344CB8AC3E}">
-        <p14:creationId xmlns:p14="http://schemas.microsoft.com/office/powerpoint/2010/main" val="3697055811"/>
+        <p14:creationId xmlns:p14="http://schemas.microsoft.com/office/powerpoint/2010/main" xmlns="" val="3697055811"/>
       </p:ext>
     </p:extLst>
   </p:cSld>
@@ -1220,7 +1229,8 @@
           <a:p>
             <a:fld id="{1E4A8252-26A2-422C-8021-53F2FA7F3083}" type="datetimeFigureOut">
               <a:rPr lang="en-CA" smtClean="0"/>
-              <a:t>2025-09-08</a:t>
+              <a:pPr/>
+              <a:t>2025-09-15</a:t>
             </a:fld>
             <a:endParaRPr lang="en-CA"/>
           </a:p>
@@ -1262,6 +1272,7 @@
           <a:p>
             <a:fld id="{ADD8DDE3-37DC-4FC1-86DE-98D0EA336BFE}" type="slidenum">
               <a:rPr lang="en-CA" smtClean="0"/>
+              <a:pPr/>
               <a:t>‹#›</a:t>
             </a:fld>
             <a:endParaRPr lang="en-CA"/>
@@ -1271,7 +1282,7 @@
     </p:spTree>
     <p:extLst>
       <p:ext uri="{BB962C8B-B14F-4D97-AF65-F5344CB8AC3E}">
-        <p14:creationId xmlns:p14="http://schemas.microsoft.com/office/powerpoint/2010/main" val="2963017691"/>
+        <p14:creationId xmlns:p14="http://schemas.microsoft.com/office/powerpoint/2010/main" xmlns="" val="2963017691"/>
       </p:ext>
     </p:extLst>
   </p:cSld>
@@ -1466,7 +1477,8 @@
           <a:p>
             <a:fld id="{1E4A8252-26A2-422C-8021-53F2FA7F3083}" type="datetimeFigureOut">
               <a:rPr lang="en-CA" smtClean="0"/>
-              <a:t>2025-09-08</a:t>
+              <a:pPr/>
+              <a:t>2025-09-15</a:t>
             </a:fld>
             <a:endParaRPr lang="en-CA"/>
           </a:p>
@@ -1508,6 +1520,7 @@
           <a:p>
             <a:fld id="{ADD8DDE3-37DC-4FC1-86DE-98D0EA336BFE}" type="slidenum">
               <a:rPr lang="en-CA" smtClean="0"/>
+              <a:pPr/>
               <a:t>‹#›</a:t>
             </a:fld>
             <a:endParaRPr lang="en-CA"/>
@@ -1517,7 +1530,7 @@
     </p:spTree>
     <p:extLst>
       <p:ext uri="{BB962C8B-B14F-4D97-AF65-F5344CB8AC3E}">
-        <p14:creationId xmlns:p14="http://schemas.microsoft.com/office/powerpoint/2010/main" val="1255086877"/>
+        <p14:creationId xmlns:p14="http://schemas.microsoft.com/office/powerpoint/2010/main" xmlns="" val="1255086877"/>
       </p:ext>
     </p:extLst>
   </p:cSld>
@@ -1698,7 +1711,8 @@
           <a:p>
             <a:fld id="{1E4A8252-26A2-422C-8021-53F2FA7F3083}" type="datetimeFigureOut">
               <a:rPr lang="en-CA" smtClean="0"/>
-              <a:t>2025-09-08</a:t>
+              <a:pPr/>
+              <a:t>2025-09-15</a:t>
             </a:fld>
             <a:endParaRPr lang="en-CA"/>
           </a:p>
@@ -1740,6 +1754,7 @@
           <a:p>
             <a:fld id="{ADD8DDE3-37DC-4FC1-86DE-98D0EA336BFE}" type="slidenum">
               <a:rPr lang="en-CA" smtClean="0"/>
+              <a:pPr/>
               <a:t>‹#›</a:t>
             </a:fld>
             <a:endParaRPr lang="en-CA"/>
@@ -1749,7 +1764,7 @@
     </p:spTree>
     <p:extLst>
       <p:ext uri="{BB962C8B-B14F-4D97-AF65-F5344CB8AC3E}">
-        <p14:creationId xmlns:p14="http://schemas.microsoft.com/office/powerpoint/2010/main" val="3034710184"/>
+        <p14:creationId xmlns:p14="http://schemas.microsoft.com/office/powerpoint/2010/main" xmlns="" val="3034710184"/>
       </p:ext>
     </p:extLst>
   </p:cSld>
@@ -2065,7 +2080,8 @@
           <a:p>
             <a:fld id="{1E4A8252-26A2-422C-8021-53F2FA7F3083}" type="datetimeFigureOut">
               <a:rPr lang="en-CA" smtClean="0"/>
-              <a:t>2025-09-08</a:t>
+              <a:pPr/>
+              <a:t>2025-09-15</a:t>
             </a:fld>
             <a:endParaRPr lang="en-CA"/>
           </a:p>
@@ -2107,6 +2123,7 @@
           <a:p>
             <a:fld id="{ADD8DDE3-37DC-4FC1-86DE-98D0EA336BFE}" type="slidenum">
               <a:rPr lang="en-CA" smtClean="0"/>
+              <a:pPr/>
               <a:t>‹#›</a:t>
             </a:fld>
             <a:endParaRPr lang="en-CA"/>
@@ -2116,7 +2133,7 @@
     </p:spTree>
     <p:extLst>
       <p:ext uri="{BB962C8B-B14F-4D97-AF65-F5344CB8AC3E}">
-        <p14:creationId xmlns:p14="http://schemas.microsoft.com/office/powerpoint/2010/main" val="3894773758"/>
+        <p14:creationId xmlns:p14="http://schemas.microsoft.com/office/powerpoint/2010/main" xmlns="" val="3894773758"/>
       </p:ext>
     </p:extLst>
   </p:cSld>
@@ -2183,7 +2200,8 @@
           <a:p>
             <a:fld id="{1E4A8252-26A2-422C-8021-53F2FA7F3083}" type="datetimeFigureOut">
               <a:rPr lang="en-CA" smtClean="0"/>
-              <a:t>2025-09-08</a:t>
+              <a:pPr/>
+              <a:t>2025-09-15</a:t>
             </a:fld>
             <a:endParaRPr lang="en-CA"/>
           </a:p>
@@ -2225,6 +2243,7 @@
           <a:p>
             <a:fld id="{ADD8DDE3-37DC-4FC1-86DE-98D0EA336BFE}" type="slidenum">
               <a:rPr lang="en-CA" smtClean="0"/>
+              <a:pPr/>
               <a:t>‹#›</a:t>
             </a:fld>
             <a:endParaRPr lang="en-CA"/>
@@ -2234,7 +2253,7 @@
     </p:spTree>
     <p:extLst>
       <p:ext uri="{BB962C8B-B14F-4D97-AF65-F5344CB8AC3E}">
-        <p14:creationId xmlns:p14="http://schemas.microsoft.com/office/powerpoint/2010/main" val="1678366413"/>
+        <p14:creationId xmlns:p14="http://schemas.microsoft.com/office/powerpoint/2010/main" xmlns="" val="1678366413"/>
       </p:ext>
     </p:extLst>
   </p:cSld>
@@ -2278,7 +2297,8 @@
           <a:p>
             <a:fld id="{1E4A8252-26A2-422C-8021-53F2FA7F3083}" type="datetimeFigureOut">
               <a:rPr lang="en-CA" smtClean="0"/>
-              <a:t>2025-09-08</a:t>
+              <a:pPr/>
+              <a:t>2025-09-15</a:t>
             </a:fld>
             <a:endParaRPr lang="en-CA"/>
           </a:p>
@@ -2320,6 +2340,7 @@
           <a:p>
             <a:fld id="{ADD8DDE3-37DC-4FC1-86DE-98D0EA336BFE}" type="slidenum">
               <a:rPr lang="en-CA" smtClean="0"/>
+              <a:pPr/>
               <a:t>‹#›</a:t>
             </a:fld>
             <a:endParaRPr lang="en-CA"/>
@@ -2329,7 +2350,7 @@
     </p:spTree>
     <p:extLst>
       <p:ext uri="{BB962C8B-B14F-4D97-AF65-F5344CB8AC3E}">
-        <p14:creationId xmlns:p14="http://schemas.microsoft.com/office/powerpoint/2010/main" val="4280413222"/>
+        <p14:creationId xmlns:p14="http://schemas.microsoft.com/office/powerpoint/2010/main" xmlns="" val="4280413222"/>
       </p:ext>
     </p:extLst>
   </p:cSld>
@@ -2555,7 +2576,8 @@
           <a:p>
             <a:fld id="{1E4A8252-26A2-422C-8021-53F2FA7F3083}" type="datetimeFigureOut">
               <a:rPr lang="en-CA" smtClean="0"/>
-              <a:t>2025-09-08</a:t>
+              <a:pPr/>
+              <a:t>2025-09-15</a:t>
             </a:fld>
             <a:endParaRPr lang="en-CA"/>
           </a:p>
@@ -2597,6 +2619,7 @@
           <a:p>
             <a:fld id="{ADD8DDE3-37DC-4FC1-86DE-98D0EA336BFE}" type="slidenum">
               <a:rPr lang="en-CA" smtClean="0"/>
+              <a:pPr/>
               <a:t>‹#›</a:t>
             </a:fld>
             <a:endParaRPr lang="en-CA"/>
@@ -2606,7 +2629,7 @@
     </p:spTree>
     <p:extLst>
       <p:ext uri="{BB962C8B-B14F-4D97-AF65-F5344CB8AC3E}">
-        <p14:creationId xmlns:p14="http://schemas.microsoft.com/office/powerpoint/2010/main" val="3439465259"/>
+        <p14:creationId xmlns:p14="http://schemas.microsoft.com/office/powerpoint/2010/main" xmlns="" val="3439465259"/>
       </p:ext>
     </p:extLst>
   </p:cSld>
@@ -2808,7 +2831,8 @@
           <a:p>
             <a:fld id="{1E4A8252-26A2-422C-8021-53F2FA7F3083}" type="datetimeFigureOut">
               <a:rPr lang="en-CA" smtClean="0"/>
-              <a:t>2025-09-08</a:t>
+              <a:pPr/>
+              <a:t>2025-09-15</a:t>
             </a:fld>
             <a:endParaRPr lang="en-CA"/>
           </a:p>
@@ -2850,6 +2874,7 @@
           <a:p>
             <a:fld id="{ADD8DDE3-37DC-4FC1-86DE-98D0EA336BFE}" type="slidenum">
               <a:rPr lang="en-CA" smtClean="0"/>
+              <a:pPr/>
               <a:t>‹#›</a:t>
             </a:fld>
             <a:endParaRPr lang="en-CA"/>
@@ -2859,7 +2884,7 @@
     </p:spTree>
     <p:extLst>
       <p:ext uri="{BB962C8B-B14F-4D97-AF65-F5344CB8AC3E}">
-        <p14:creationId xmlns:p14="http://schemas.microsoft.com/office/powerpoint/2010/main" val="1493598593"/>
+        <p14:creationId xmlns:p14="http://schemas.microsoft.com/office/powerpoint/2010/main" xmlns="" val="1493598593"/>
       </p:ext>
     </p:extLst>
   </p:cSld>
@@ -2875,7 +2900,7 @@
     <p:bg>
       <p:bgPr>
         <a:blipFill dpi="0" rotWithShape="1">
-          <a:blip r:embed="rId13">
+          <a:blip r:embed="rId13" cstate="print">
             <a:lum/>
           </a:blip>
           <a:srcRect/>
@@ -3030,7 +3055,8 @@
           <a:p>
             <a:fld id="{1E4A8252-26A2-422C-8021-53F2FA7F3083}" type="datetimeFigureOut">
               <a:rPr lang="en-CA" smtClean="0"/>
-              <a:t>2025-09-08</a:t>
+              <a:pPr/>
+              <a:t>2025-09-15</a:t>
             </a:fld>
             <a:endParaRPr lang="en-CA"/>
           </a:p>
@@ -3108,6 +3134,7 @@
           <a:p>
             <a:fld id="{ADD8DDE3-37DC-4FC1-86DE-98D0EA336BFE}" type="slidenum">
               <a:rPr lang="en-CA" smtClean="0"/>
+              <a:pPr/>
               <a:t>‹#›</a:t>
             </a:fld>
             <a:endParaRPr lang="en-CA"/>
@@ -3117,7 +3144,7 @@
     </p:spTree>
     <p:extLst>
       <p:ext uri="{BB962C8B-B14F-4D97-AF65-F5344CB8AC3E}">
-        <p14:creationId xmlns:p14="http://schemas.microsoft.com/office/powerpoint/2010/main" val="1771977269"/>
+        <p14:creationId xmlns:p14="http://schemas.microsoft.com/office/powerpoint/2010/main" xmlns="" val="1771977269"/>
       </p:ext>
     </p:extLst>
   </p:cSld>
@@ -3526,7 +3553,7 @@
     </p:spTree>
     <p:extLst>
       <p:ext uri="{BB962C8B-B14F-4D97-AF65-F5344CB8AC3E}">
-        <p14:creationId xmlns:p14="http://schemas.microsoft.com/office/powerpoint/2010/main" val="15809616"/>
+        <p14:creationId xmlns:p14="http://schemas.microsoft.com/office/powerpoint/2010/main" xmlns="" val="15809616"/>
       </p:ext>
     </p:extLst>
   </p:cSld>
@@ -3555,7 +3582,13 @@
       </p:grpSpPr>
       <p:sp>
         <p:nvSpPr>
-          <p:cNvPr id="2" name="Title 1"/>
+          <p:cNvPr id="2" name="Title 1">
+            <a:extLst>
+              <a:ext uri="{FF2B5EF4-FFF2-40B4-BE49-F238E27FC236}">
+                <a16:creationId xmlns:a16="http://schemas.microsoft.com/office/drawing/2014/main" xmlns="" id="{558739B7-F71A-ADB9-F1AE-03098E154EC1}"/>
+              </a:ext>
+            </a:extLst>
+          </p:cNvPr>
           <p:cNvSpPr>
             <a:spLocks noGrp="1"/>
           </p:cNvSpPr>
@@ -3563,108 +3596,166 @@
             <p:ph type="title"/>
           </p:nvPr>
         </p:nvSpPr>
-        <p:spPr>
-          <a:xfrm>
-            <a:off x="2039815" y="182245"/>
-            <a:ext cx="9710907" cy="830629"/>
-          </a:xfrm>
-        </p:spPr>
-        <p:txBody>
-          <a:bodyPr>
-            <a:normAutofit/>
-          </a:bodyPr>
-          <a:lstStyle/>
-          <a:p>
-            <a:r>
-              <a:rPr lang="en-CA" dirty="0">
-                <a:solidFill>
-                  <a:schemeClr val="bg1"/>
-                </a:solidFill>
-              </a:rPr>
-              <a:t>Introduction</a:t>
-            </a:r>
-          </a:p>
-        </p:txBody>
-      </p:sp>
-      <p:sp>
-        <p:nvSpPr>
-          <p:cNvPr id="3" name="Content Placeholder 2"/>
-          <p:cNvSpPr>
-            <a:spLocks noGrp="1"/>
-          </p:cNvSpPr>
-          <p:nvPr>
-            <p:ph idx="1"/>
-          </p:nvPr>
-        </p:nvSpPr>
-        <p:spPr>
-          <a:xfrm>
-            <a:off x="685800" y="1508943"/>
-            <a:ext cx="10912522" cy="4554232"/>
-          </a:xfrm>
-        </p:spPr>
+        <p:spPr/>
         <p:txBody>
           <a:bodyPr/>
           <a:lstStyle/>
           <a:p>
-            <a:pPr marL="0" indent="0">
-              <a:buNone/>
-            </a:pPr>
-            <a:r>
-              <a:rPr lang="en-CA" sz="3200" u="sng" dirty="0" err="1"/>
-              <a:t>al·go·rithm</a:t>
-            </a:r>
-            <a:endParaRPr lang="en-CA" sz="3200" u="sng" dirty="0"/>
-          </a:p>
-          <a:p>
-            <a:pPr marL="0" indent="0">
-              <a:buNone/>
-            </a:pPr>
-            <a:r>
-              <a:rPr lang="en-CA" dirty="0"/>
-              <a:t>noun</a:t>
-            </a:r>
-          </a:p>
-          <a:p>
-            <a:r>
-              <a:rPr lang="en-CA" dirty="0"/>
-              <a:t>a process or set of rules to be followed in calculations or other problem-solving operations, especially by a computer.</a:t>
-            </a:r>
-          </a:p>
-          <a:p>
-            <a:pPr marL="0" indent="0">
-              <a:buNone/>
-            </a:pPr>
-            <a:r>
-              <a:rPr lang="en-CA" sz="3200" b="1" u="sng" dirty="0"/>
-              <a:t>Origin</a:t>
-            </a:r>
-          </a:p>
-          <a:p>
-            <a:r>
-              <a:rPr lang="en-CA" dirty="0"/>
-              <a:t>1890–95; variant of algorism, by association with Greek </a:t>
-            </a:r>
-            <a:r>
-              <a:rPr lang="en-CA" dirty="0" err="1"/>
-              <a:t>arithmós</a:t>
-            </a:r>
-            <a:r>
-              <a:rPr lang="en-CA" dirty="0"/>
-              <a:t> number. </a:t>
-            </a:r>
-          </a:p>
-          <a:p>
-            <a:endParaRPr lang="en-CA" dirty="0"/>
-          </a:p>
-          <a:p>
-            <a:endParaRPr lang="en-CA" dirty="0"/>
+            <a:endParaRPr lang="en-CA"/>
+          </a:p>
+        </p:txBody>
+      </p:sp>
+      <p:sp>
+        <p:nvSpPr>
+          <p:cNvPr id="4" name="Rectangle: Rounded Corners 3">
+            <a:extLst>
+              <a:ext uri="{FF2B5EF4-FFF2-40B4-BE49-F238E27FC236}">
+                <a16:creationId xmlns:a16="http://schemas.microsoft.com/office/drawing/2014/main" xmlns="" id="{F13D8EC1-760D-E26C-F5E8-F8C043D073B2}"/>
+              </a:ext>
+            </a:extLst>
+          </p:cNvPr>
+          <p:cNvSpPr/>
+          <p:nvPr/>
+        </p:nvSpPr>
+        <p:spPr>
+          <a:xfrm>
+            <a:off x="717376" y="2507226"/>
+            <a:ext cx="2644877" cy="1612490"/>
+          </a:xfrm>
+          <a:prstGeom prst="roundRect">
+            <a:avLst/>
+          </a:prstGeom>
+        </p:spPr>
+        <p:style>
+          <a:lnRef idx="2">
+            <a:schemeClr val="accent1">
+              <a:shade val="15000"/>
+            </a:schemeClr>
+          </a:lnRef>
+          <a:fillRef idx="1">
+            <a:schemeClr val="accent1"/>
+          </a:fillRef>
+          <a:effectRef idx="0">
+            <a:schemeClr val="accent1"/>
+          </a:effectRef>
+          <a:fontRef idx="minor">
+            <a:schemeClr val="lt1"/>
+          </a:fontRef>
+        </p:style>
+        <p:txBody>
+          <a:bodyPr rtlCol="0" anchor="ctr"/>
+          <a:lstStyle/>
+          <a:p>
+            <a:pPr algn="ctr"/>
+            <a:r>
+              <a:rPr lang="en-CA" sz="4000" dirty="0"/>
+              <a:t>Data</a:t>
+            </a:r>
+          </a:p>
+        </p:txBody>
+      </p:sp>
+      <p:sp>
+        <p:nvSpPr>
+          <p:cNvPr id="5" name="Rectangle: Rounded Corners 4">
+            <a:extLst>
+              <a:ext uri="{FF2B5EF4-FFF2-40B4-BE49-F238E27FC236}">
+                <a16:creationId xmlns:a16="http://schemas.microsoft.com/office/drawing/2014/main" xmlns="" id="{DA2B35B4-5BF4-8BCA-D985-D677252606C1}"/>
+              </a:ext>
+            </a:extLst>
+          </p:cNvPr>
+          <p:cNvSpPr/>
+          <p:nvPr/>
+        </p:nvSpPr>
+        <p:spPr>
+          <a:xfrm>
+            <a:off x="8554444" y="2576051"/>
+            <a:ext cx="2644877" cy="1612490"/>
+          </a:xfrm>
+          <a:prstGeom prst="roundRect">
+            <a:avLst/>
+          </a:prstGeom>
+        </p:spPr>
+        <p:style>
+          <a:lnRef idx="2">
+            <a:schemeClr val="accent1">
+              <a:shade val="15000"/>
+            </a:schemeClr>
+          </a:lnRef>
+          <a:fillRef idx="1">
+            <a:schemeClr val="accent1"/>
+          </a:fillRef>
+          <a:effectRef idx="0">
+            <a:schemeClr val="accent1"/>
+          </a:effectRef>
+          <a:fontRef idx="minor">
+            <a:schemeClr val="lt1"/>
+          </a:fontRef>
+        </p:style>
+        <p:txBody>
+          <a:bodyPr rtlCol="0" anchor="ctr"/>
+          <a:lstStyle/>
+          <a:p>
+            <a:pPr algn="ctr"/>
+            <a:r>
+              <a:rPr lang="en-CA" sz="4000" dirty="0"/>
+              <a:t>Data</a:t>
+            </a:r>
+          </a:p>
+        </p:txBody>
+      </p:sp>
+      <p:sp>
+        <p:nvSpPr>
+          <p:cNvPr id="6" name="Arrow: Right 5">
+            <a:extLst>
+              <a:ext uri="{FF2B5EF4-FFF2-40B4-BE49-F238E27FC236}">
+                <a16:creationId xmlns:a16="http://schemas.microsoft.com/office/drawing/2014/main" xmlns="" id="{98CB8958-2086-E36B-43AF-AA64A2ECF1CC}"/>
+              </a:ext>
+            </a:extLst>
+          </p:cNvPr>
+          <p:cNvSpPr/>
+          <p:nvPr/>
+        </p:nvSpPr>
+        <p:spPr>
+          <a:xfrm>
+            <a:off x="3588774" y="2644877"/>
+            <a:ext cx="4739149" cy="1474839"/>
+          </a:xfrm>
+          <a:prstGeom prst="rightArrow">
+            <a:avLst/>
+          </a:prstGeom>
+        </p:spPr>
+        <p:style>
+          <a:lnRef idx="2">
+            <a:schemeClr val="accent1">
+              <a:shade val="15000"/>
+            </a:schemeClr>
+          </a:lnRef>
+          <a:fillRef idx="1">
+            <a:schemeClr val="accent1"/>
+          </a:fillRef>
+          <a:effectRef idx="0">
+            <a:schemeClr val="accent1"/>
+          </a:effectRef>
+          <a:fontRef idx="minor">
+            <a:schemeClr val="lt1"/>
+          </a:fontRef>
+        </p:style>
+        <p:txBody>
+          <a:bodyPr rtlCol="0" anchor="ctr"/>
+          <a:lstStyle/>
+          <a:p>
+            <a:pPr algn="ctr"/>
+            <a:r>
+              <a:rPr lang="en-CA" sz="3200" dirty="0"/>
+              <a:t>Your code</a:t>
+            </a:r>
           </a:p>
         </p:txBody>
       </p:sp>
     </p:spTree>
     <p:extLst>
       <p:ext uri="{BB962C8B-B14F-4D97-AF65-F5344CB8AC3E}">
-        <p14:creationId xmlns:p14="http://schemas.microsoft.com/office/powerpoint/2010/main" val="1389926418"/>
+        <p14:creationId xmlns:p14="http://schemas.microsoft.com/office/powerpoint/2010/main" xmlns="" val="3534032551"/>
       </p:ext>
     </p:extLst>
   </p:cSld>
@@ -3719,7 +3810,7 @@
                   <a:schemeClr val="bg1"/>
                 </a:solidFill>
               </a:rPr>
-              <a:t>Algorithms and Data structures</a:t>
+              <a:t>Introduction</a:t>
             </a:r>
           </a:p>
         </p:txBody>
@@ -3734,69 +3825,75 @@
             <p:ph idx="1"/>
           </p:nvPr>
         </p:nvSpPr>
-        <p:spPr/>
+        <p:spPr>
+          <a:xfrm>
+            <a:off x="685800" y="1508943"/>
+            <a:ext cx="10912522" cy="4554232"/>
+          </a:xfrm>
+        </p:spPr>
         <p:txBody>
           <a:bodyPr/>
           <a:lstStyle/>
           <a:p>
-            <a:r>
-              <a:rPr lang="en-CA" sz="3600" dirty="0"/>
-              <a:t>A TED talk on Algorithms</a:t>
-            </a:r>
-            <a:endParaRPr lang="en-CA" sz="3600" dirty="0">
-              <a:hlinkClick r:id="rId2"/>
-            </a:endParaRPr>
-          </a:p>
-          <a:p>
-            <a:endParaRPr lang="en-CA" dirty="0">
-              <a:hlinkClick r:id="rId2"/>
-            </a:endParaRPr>
-          </a:p>
-          <a:p>
-            <a:r>
-              <a:rPr lang="en-CA" dirty="0">
-                <a:hlinkClick r:id="rId2"/>
-              </a:rPr>
-              <a:t>https://www.youtube.com/watch?time_continue=1&amp;v=6hfOvs8pY1k</a:t>
-            </a:r>
+            <a:pPr marL="0" indent="0">
+              <a:buNone/>
+            </a:pPr>
+            <a:r>
+              <a:rPr lang="en-CA" sz="3200" u="sng" dirty="0" err="1"/>
+              <a:t>al·go·rithm</a:t>
+            </a:r>
+            <a:endParaRPr lang="en-CA" sz="3200" u="sng" dirty="0"/>
+          </a:p>
+          <a:p>
+            <a:pPr marL="0" indent="0">
+              <a:buNone/>
+            </a:pPr>
+            <a:r>
+              <a:rPr lang="en-CA" dirty="0"/>
+              <a:t>noun</a:t>
+            </a:r>
+          </a:p>
+          <a:p>
+            <a:r>
+              <a:rPr lang="en-CA" dirty="0"/>
+              <a:t>a process or set of rules to be followed in calculations or other problem-solving operations, especially by a computer.</a:t>
+            </a:r>
+          </a:p>
+          <a:p>
+            <a:pPr marL="0" indent="0">
+              <a:buNone/>
+            </a:pPr>
+            <a:r>
+              <a:rPr lang="en-CA" sz="3200" b="1" u="sng" dirty="0"/>
+              <a:t>Origin</a:t>
+            </a:r>
+          </a:p>
+          <a:p>
+            <a:r>
+              <a:rPr lang="en-CA" dirty="0"/>
+              <a:t>1890–95; variant of algorism, by association with Greek </a:t>
+            </a:r>
+            <a:r>
+              <a:rPr lang="en-CA" dirty="0" err="1"/>
+              <a:t>arithmós</a:t>
+            </a:r>
+            <a:r>
+              <a:rPr lang="en-CA" dirty="0"/>
+              <a:t> number. </a:t>
+            </a:r>
+          </a:p>
+          <a:p>
             <a:endParaRPr lang="en-CA" dirty="0"/>
           </a:p>
           <a:p>
             <a:endParaRPr lang="en-CA" dirty="0"/>
           </a:p>
-          <a:p>
-            <a:endParaRPr lang="en-CA" dirty="0"/>
-          </a:p>
-        </p:txBody>
-      </p:sp>
-      <p:pic>
-        <p:nvPicPr>
-          <p:cNvPr id="4" name="Picture 3"/>
-          <p:cNvPicPr>
-            <a:picLocks noChangeAspect="1"/>
-          </p:cNvPicPr>
-          <p:nvPr/>
-        </p:nvPicPr>
-        <p:blipFill>
-          <a:blip r:embed="rId3"/>
-          <a:stretch>
-            <a:fillRect/>
-          </a:stretch>
-        </p:blipFill>
-        <p:spPr>
-          <a:xfrm>
-            <a:off x="2868731" y="3786059"/>
-            <a:ext cx="5772150" cy="1781175"/>
-          </a:xfrm>
-          <a:prstGeom prst="rect">
-            <a:avLst/>
-          </a:prstGeom>
-        </p:spPr>
-      </p:pic>
+        </p:txBody>
+      </p:sp>
     </p:spTree>
     <p:extLst>
       <p:ext uri="{BB962C8B-B14F-4D97-AF65-F5344CB8AC3E}">
-        <p14:creationId xmlns:p14="http://schemas.microsoft.com/office/powerpoint/2010/main" val="2914200428"/>
+        <p14:creationId xmlns:p14="http://schemas.microsoft.com/office/powerpoint/2010/main" xmlns="" val="1389926418"/>
       </p:ext>
     </p:extLst>
   </p:cSld>
@@ -3851,7 +3948,7 @@
                   <a:schemeClr val="bg1"/>
                 </a:solidFill>
               </a:rPr>
-              <a:t>Algorithms</a:t>
+              <a:t>Algorithms and Data structures</a:t>
             </a:r>
           </a:p>
         </p:txBody>
@@ -3866,88 +3963,69 @@
             <p:ph idx="1"/>
           </p:nvPr>
         </p:nvSpPr>
-        <p:spPr>
-          <a:xfrm>
-            <a:off x="464025" y="1508943"/>
-            <a:ext cx="11136572" cy="5055630"/>
-          </a:xfrm>
-        </p:spPr>
-        <p:txBody>
-          <a:bodyPr>
-            <a:normAutofit/>
-          </a:bodyPr>
-          <a:lstStyle/>
-          <a:p>
-            <a:pPr marL="0" indent="0">
-              <a:buNone/>
-            </a:pPr>
-            <a:r>
-              <a:rPr lang="en-CA" dirty="0"/>
-              <a:t>Every Algorithm must satisfy the following properties:</a:t>
-            </a:r>
-          </a:p>
-          <a:p>
-            <a:r>
-              <a:rPr lang="en-CA" b="1" dirty="0"/>
-              <a:t>Input</a:t>
-            </a:r>
-            <a:r>
-              <a:rPr lang="en-CA" dirty="0"/>
-              <a:t>- There should be 0 or more inputs supplied externally to the algorithm.</a:t>
-            </a:r>
-          </a:p>
-          <a:p>
-            <a:r>
-              <a:rPr lang="en-CA" b="1" dirty="0"/>
-              <a:t>Output</a:t>
-            </a:r>
-            <a:r>
-              <a:rPr lang="en-CA" dirty="0"/>
-              <a:t>- There should be at least 1 output obtained.</a:t>
-            </a:r>
-          </a:p>
-          <a:p>
-            <a:r>
-              <a:rPr lang="en-CA" b="1" dirty="0"/>
-              <a:t>Definiteness</a:t>
-            </a:r>
-            <a:r>
-              <a:rPr lang="en-CA" dirty="0"/>
-              <a:t>- Every step of the algorithm should be clear and well defined.</a:t>
-            </a:r>
-          </a:p>
-          <a:p>
-            <a:r>
-              <a:rPr lang="en-CA" b="1" dirty="0"/>
-              <a:t>Finiteness</a:t>
-            </a:r>
-            <a:r>
-              <a:rPr lang="en-CA" dirty="0"/>
-              <a:t>- The algorithm should have finite number of steps. It should finish and not go on forever.</a:t>
-            </a:r>
-          </a:p>
-          <a:p>
-            <a:r>
-              <a:rPr lang="en-CA" b="1" dirty="0"/>
-              <a:t>Correctness</a:t>
-            </a:r>
-            <a:r>
-              <a:rPr lang="en-CA" dirty="0"/>
-              <a:t>- Every step of the algorithm must generate a correct output.</a:t>
-            </a:r>
-          </a:p>
-          <a:p>
-            <a:pPr marL="0" indent="0">
-              <a:buNone/>
-            </a:pPr>
+        <p:spPr/>
+        <p:txBody>
+          <a:bodyPr/>
+          <a:lstStyle/>
+          <a:p>
+            <a:r>
+              <a:rPr lang="en-CA" sz="3600" dirty="0"/>
+              <a:t>A TED talk on Algorithms</a:t>
+            </a:r>
+            <a:endParaRPr lang="en-CA" sz="3600" dirty="0">
+              <a:hlinkClick r:id="rId2"/>
+            </a:endParaRPr>
+          </a:p>
+          <a:p>
+            <a:endParaRPr lang="en-CA" dirty="0">
+              <a:hlinkClick r:id="rId2"/>
+            </a:endParaRPr>
+          </a:p>
+          <a:p>
+            <a:r>
+              <a:rPr lang="en-CA" dirty="0">
+                <a:hlinkClick r:id="rId2"/>
+              </a:rPr>
+              <a:t>https://www.youtube.com/watch?time_continue=1&amp;v=6hfOvs8pY1k</a:t>
+            </a:r>
             <a:endParaRPr lang="en-CA" dirty="0"/>
           </a:p>
-        </p:txBody>
-      </p:sp>
+          <a:p>
+            <a:endParaRPr lang="en-CA" dirty="0"/>
+          </a:p>
+          <a:p>
+            <a:endParaRPr lang="en-CA" dirty="0"/>
+          </a:p>
+        </p:txBody>
+      </p:sp>
+      <p:pic>
+        <p:nvPicPr>
+          <p:cNvPr id="4" name="Picture 3"/>
+          <p:cNvPicPr>
+            <a:picLocks noChangeAspect="1"/>
+          </p:cNvPicPr>
+          <p:nvPr/>
+        </p:nvPicPr>
+        <p:blipFill>
+          <a:blip r:embed="rId3" cstate="print"/>
+          <a:stretch>
+            <a:fillRect/>
+          </a:stretch>
+        </p:blipFill>
+        <p:spPr>
+          <a:xfrm>
+            <a:off x="2868731" y="3786059"/>
+            <a:ext cx="5772150" cy="1781175"/>
+          </a:xfrm>
+          <a:prstGeom prst="rect">
+            <a:avLst/>
+          </a:prstGeom>
+        </p:spPr>
+      </p:pic>
     </p:spTree>
     <p:extLst>
       <p:ext uri="{BB962C8B-B14F-4D97-AF65-F5344CB8AC3E}">
-        <p14:creationId xmlns:p14="http://schemas.microsoft.com/office/powerpoint/2010/main" val="2518543676"/>
+        <p14:creationId xmlns:p14="http://schemas.microsoft.com/office/powerpoint/2010/main" xmlns="" val="2914200428"/>
       </p:ext>
     </p:extLst>
   </p:cSld>
@@ -4019,122 +4097,86 @@
         </p:nvSpPr>
         <p:spPr>
           <a:xfrm>
-            <a:off x="321733" y="1354667"/>
-            <a:ext cx="11548534" cy="5266265"/>
+            <a:off x="464025" y="1508943"/>
+            <a:ext cx="11136572" cy="5055630"/>
           </a:xfrm>
         </p:spPr>
         <p:txBody>
           <a:bodyPr>
-            <a:normAutofit fontScale="92500"/>
+            <a:normAutofit/>
           </a:bodyPr>
           <a:lstStyle/>
           <a:p>
-            <a:r>
-              <a:rPr lang="en-CA" dirty="0"/>
-              <a:t>An algorithm is said to be efficient and fast, if it takes less time to execute and consumes less memory space. The performance of an algorithm is measured on the basis of following properties :</a:t>
-            </a:r>
-          </a:p>
-          <a:p>
-            <a:r>
-              <a:rPr lang="en-CA" dirty="0"/>
-              <a:t>Time Complexity</a:t>
-            </a:r>
-          </a:p>
-          <a:p>
-            <a:pPr lvl="1"/>
-            <a:r>
-              <a:rPr lang="en-CA" dirty="0"/>
-              <a:t>a way to represent the amount of time required by the algorithm to run till its completion.</a:t>
-            </a:r>
-          </a:p>
-          <a:p>
-            <a:r>
-              <a:rPr lang="en-CA" dirty="0"/>
-              <a:t>Space Complexity</a:t>
-            </a:r>
-          </a:p>
-          <a:p>
-            <a:pPr lvl="1"/>
-            <a:r>
-              <a:rPr lang="en-CA" dirty="0"/>
-              <a:t>the amount of memory space required by the algorithm, during the course of its execution.</a:t>
-            </a:r>
-          </a:p>
-          <a:p>
-            <a:pPr lvl="1"/>
-            <a:r>
-              <a:rPr lang="en-CA" b="1" dirty="0">
-                <a:solidFill>
-                  <a:schemeClr val="accent5">
-                    <a:lumMod val="75000"/>
-                  </a:schemeClr>
-                </a:solidFill>
-              </a:rPr>
-              <a:t>Instruction Space</a:t>
-            </a:r>
+            <a:pPr marL="0" indent="0">
+              <a:buNone/>
+            </a:pPr>
+            <a:r>
+              <a:rPr lang="en-CA" dirty="0"/>
+              <a:t>Every Algorithm must satisfy the following properties:</a:t>
+            </a:r>
+          </a:p>
+          <a:p>
             <a:r>
               <a:rPr lang="en-CA" b="1" dirty="0"/>
-              <a:t>:</a:t>
-            </a:r>
-            <a:r>
-              <a:rPr lang="en-CA" dirty="0"/>
-              <a:t> the space required to store the executable version of the program. This space is fixed, but varies depending upon the number of lines of code in the program.</a:t>
-            </a:r>
-          </a:p>
-          <a:p>
-            <a:pPr lvl="1"/>
-            <a:r>
-              <a:rPr lang="en-CA" b="1" dirty="0">
-                <a:solidFill>
-                  <a:schemeClr val="accent5">
-                    <a:lumMod val="75000"/>
-                  </a:schemeClr>
-                </a:solidFill>
-              </a:rPr>
-              <a:t>Data Space</a:t>
-            </a:r>
+              <a:t>Input</a:t>
+            </a:r>
+            <a:r>
+              <a:rPr lang="en-CA" dirty="0"/>
+              <a:t>- There should be 0 or more inputs supplied externally to the algorithm.</a:t>
+            </a:r>
+          </a:p>
+          <a:p>
             <a:r>
               <a:rPr lang="en-CA" b="1" dirty="0"/>
-              <a:t>:</a:t>
-            </a:r>
-            <a:r>
-              <a:rPr lang="en-CA" dirty="0"/>
-              <a:t> the space required to store all the constants and variables value.</a:t>
-            </a:r>
-          </a:p>
-          <a:p>
-            <a:pPr lvl="1"/>
-            <a:r>
-              <a:rPr lang="en-CA" b="1" dirty="0">
-                <a:solidFill>
-                  <a:schemeClr val="accent5">
-                    <a:lumMod val="75000"/>
-                  </a:schemeClr>
-                </a:solidFill>
-              </a:rPr>
-              <a:t>Environment Space</a:t>
-            </a:r>
+              <a:t>Output</a:t>
+            </a:r>
+            <a:r>
+              <a:rPr lang="en-CA" dirty="0"/>
+              <a:t>- There should be at least 1 output obtained.</a:t>
+            </a:r>
+          </a:p>
+          <a:p>
             <a:r>
               <a:rPr lang="en-CA" b="1" dirty="0"/>
-              <a:t>:</a:t>
-            </a:r>
-            <a:r>
-              <a:rPr lang="en-CA" dirty="0"/>
-              <a:t> the space required to store the environment information needed</a:t>
-            </a:r>
-          </a:p>
-          <a:p>
-            <a:r>
-              <a:rPr lang="en-CA" sz="2600" dirty="0"/>
-              <a:t>while calculating the Space Complexity of any algorithm, we usually consider only Data Space and we neglect the Instruction Space and Environmental Stack</a:t>
-            </a:r>
+              <a:t>Definiteness</a:t>
+            </a:r>
+            <a:r>
+              <a:rPr lang="en-CA" dirty="0"/>
+              <a:t>- Every step of the algorithm should be clear and well defined.</a:t>
+            </a:r>
+          </a:p>
+          <a:p>
+            <a:r>
+              <a:rPr lang="en-CA" b="1" dirty="0"/>
+              <a:t>Finiteness</a:t>
+            </a:r>
+            <a:r>
+              <a:rPr lang="en-CA" dirty="0"/>
+              <a:t>- The algorithm should have finite number of steps. It should finish and not go on forever.</a:t>
+            </a:r>
+          </a:p>
+          <a:p>
+            <a:r>
+              <a:rPr lang="en-CA" b="1" dirty="0"/>
+              <a:t>Correctness</a:t>
+            </a:r>
+            <a:r>
+              <a:rPr lang="en-CA" dirty="0"/>
+              <a:t>- Every step of the algorithm must generate a correct output.</a:t>
+            </a:r>
+          </a:p>
+          <a:p>
+            <a:pPr marL="0" indent="0">
+              <a:buNone/>
+            </a:pPr>
+            <a:endParaRPr lang="en-CA" dirty="0"/>
           </a:p>
         </p:txBody>
       </p:sp>
     </p:spTree>
     <p:extLst>
       <p:ext uri="{BB962C8B-B14F-4D97-AF65-F5344CB8AC3E}">
-        <p14:creationId xmlns:p14="http://schemas.microsoft.com/office/powerpoint/2010/main" val="2796991752"/>
+        <p14:creationId xmlns:p14="http://schemas.microsoft.com/office/powerpoint/2010/main" xmlns="" val="2518543676"/>
       </p:ext>
     </p:extLst>
   </p:cSld>
@@ -4189,7 +4231,7 @@
                   <a:schemeClr val="bg1"/>
                 </a:solidFill>
               </a:rPr>
-              <a:t>Complexity over time</a:t>
+              <a:t>Algorithms</a:t>
             </a:r>
           </a:p>
         </p:txBody>
@@ -4217,61 +4259,103 @@
           <a:lstStyle/>
           <a:p>
             <a:r>
-              <a:rPr lang="en-CA" sz="3900" dirty="0"/>
-              <a:t>In the past:</a:t>
+              <a:rPr lang="en-CA" dirty="0"/>
+              <a:t>An algorithm is said to be efficient and fast, if it takes less time to execute and consumes less memory space. The performance of an algorithm is measured on the basis of following properties :</a:t>
+            </a:r>
+          </a:p>
+          <a:p>
+            <a:r>
+              <a:rPr lang="en-CA" dirty="0"/>
+              <a:t>Time Complexity</a:t>
             </a:r>
           </a:p>
           <a:p>
             <a:pPr lvl="1"/>
             <a:r>
-              <a:rPr lang="en-CA" sz="3000" dirty="0"/>
-              <a:t>486/(Pentium, maybe): “CPU bound” (100 MHz)</a:t>
+              <a:rPr lang="en-CA" dirty="0"/>
+              <a:t>a way to represent the amount of time required by the algorithm to run till its completion.</a:t>
+            </a:r>
+          </a:p>
+          <a:p>
+            <a:r>
+              <a:rPr lang="en-CA" dirty="0"/>
+              <a:t>Space Complexity</a:t>
             </a:r>
           </a:p>
           <a:p>
             <a:pPr lvl="1"/>
             <a:r>
-              <a:rPr lang="en-CA" sz="3000" dirty="0"/>
-              <a:t>Memory access took “0 time” (was not considered)</a:t>
-            </a:r>
-          </a:p>
-          <a:p>
-            <a:r>
-              <a:rPr lang="en-CA" sz="3400" dirty="0"/>
-              <a:t>Now, it’s the complete opposite</a:t>
+              <a:rPr lang="en-CA" dirty="0"/>
+              <a:t>the amount of memory space required by the algorithm, during the course of its execution.</a:t>
             </a:r>
           </a:p>
           <a:p>
             <a:pPr lvl="1"/>
             <a:r>
-              <a:rPr lang="en-CA" sz="3000" dirty="0"/>
-              <a:t>CPUs are WAAAAAAAAY faster than memory</a:t>
+              <a:rPr lang="en-CA" b="1" dirty="0">
+                <a:solidFill>
+                  <a:schemeClr val="accent5">
+                    <a:lumMod val="75000"/>
+                  </a:schemeClr>
+                </a:solidFill>
+              </a:rPr>
+              <a:t>Instruction Space</a:t>
+            </a:r>
+            <a:r>
+              <a:rPr lang="en-CA" b="1" dirty="0"/>
+              <a:t>:</a:t>
+            </a:r>
+            <a:r>
+              <a:rPr lang="en-CA" dirty="0"/>
+              <a:t> the space required to store the executable version of the program. This space is fixed, but varies depending upon the number of lines of code in the program.</a:t>
             </a:r>
           </a:p>
           <a:p>
             <a:pPr lvl="1"/>
             <a:r>
-              <a:rPr lang="en-CA" sz="3000" dirty="0"/>
-              <a:t>If you have a cache miss, it’s 500-1000 cycles</a:t>
+              <a:rPr lang="en-CA" b="1" dirty="0">
+                <a:solidFill>
+                  <a:schemeClr val="accent5">
+                    <a:lumMod val="75000"/>
+                  </a:schemeClr>
+                </a:solidFill>
+              </a:rPr>
+              <a:t>Data Space</a:t>
+            </a:r>
+            <a:r>
+              <a:rPr lang="en-CA" b="1" dirty="0"/>
+              <a:t>:</a:t>
+            </a:r>
+            <a:r>
+              <a:rPr lang="en-CA" dirty="0"/>
+              <a:t> the space required to store all the constants and variables value.</a:t>
             </a:r>
           </a:p>
           <a:p>
             <a:pPr lvl="1"/>
             <a:r>
-              <a:rPr lang="en-CA" sz="3000" dirty="0"/>
-              <a:t>8-16 cores (aka “other CPUs”)</a:t>
-            </a:r>
-          </a:p>
-          <a:p>
-            <a:r>
-              <a:rPr lang="en-CA" sz="3400" dirty="0"/>
-              <a:t>++x is faster than x++ (maybe the 386)</a:t>
-            </a:r>
-          </a:p>
-          <a:p>
-            <a:r>
-              <a:rPr lang="en-CA" sz="3400" dirty="0"/>
-              <a:t>sqrt()</a:t>
+              <a:rPr lang="en-CA" b="1" dirty="0">
+                <a:solidFill>
+                  <a:schemeClr val="accent5">
+                    <a:lumMod val="75000"/>
+                  </a:schemeClr>
+                </a:solidFill>
+              </a:rPr>
+              <a:t>Environment Space</a:t>
+            </a:r>
+            <a:r>
+              <a:rPr lang="en-CA" b="1" dirty="0"/>
+              <a:t>:</a:t>
+            </a:r>
+            <a:r>
+              <a:rPr lang="en-CA" dirty="0"/>
+              <a:t> the space required to store the environment information needed</a:t>
+            </a:r>
+          </a:p>
+          <a:p>
+            <a:r>
+              <a:rPr lang="en-CA" sz="2600" dirty="0"/>
+              <a:t>while calculating the Space Complexity of any algorithm, we usually consider only Data Space and we neglect the Instruction Space and Environmental Stack</a:t>
             </a:r>
           </a:p>
         </p:txBody>
@@ -4279,7 +4363,7 @@
     </p:spTree>
     <p:extLst>
       <p:ext uri="{BB962C8B-B14F-4D97-AF65-F5344CB8AC3E}">
-        <p14:creationId xmlns:p14="http://schemas.microsoft.com/office/powerpoint/2010/main" val="1221503553"/>
+        <p14:creationId xmlns:p14="http://schemas.microsoft.com/office/powerpoint/2010/main" xmlns="" val="2796991752"/>
       </p:ext>
     </p:extLst>
   </p:cSld>
@@ -4334,7 +4418,7 @@
                   <a:schemeClr val="bg1"/>
                 </a:solidFill>
               </a:rPr>
-              <a:t>Data Structures</a:t>
+              <a:t>Complexity over time</a:t>
             </a:r>
           </a:p>
         </p:txBody>
@@ -4351,66 +4435,72 @@
         </p:nvSpPr>
         <p:spPr>
           <a:xfrm>
-            <a:off x="474133" y="1508942"/>
-            <a:ext cx="11276589" cy="5111991"/>
+            <a:off x="321733" y="1354667"/>
+            <a:ext cx="11548534" cy="5266265"/>
           </a:xfrm>
         </p:spPr>
         <p:txBody>
           <a:bodyPr>
-            <a:normAutofit fontScale="92500" lnSpcReduction="20000"/>
+            <a:normAutofit/>
           </a:bodyPr>
           <a:lstStyle/>
           <a:p>
-            <a:pPr marL="0" indent="0">
-              <a:buNone/>
-            </a:pPr>
-            <a:r>
-              <a:rPr lang="en-CA" b="1" u="sng" dirty="0">
-                <a:solidFill>
-                  <a:schemeClr val="tx2"/>
-                </a:solidFill>
-              </a:rPr>
-              <a:t>Data structure </a:t>
-            </a:r>
-          </a:p>
-          <a:p>
-            <a:r>
-              <a:rPr lang="en-CA" dirty="0"/>
-              <a:t>Is a data organization, management, and storage format that enables efficient access and modification. </a:t>
-            </a:r>
-          </a:p>
-          <a:p>
-            <a:r>
-              <a:rPr lang="en-CA" dirty="0"/>
-              <a:t>A data structure is a collection of data values, the relationships among them, and the functions or operations that can be applied to the data.  </a:t>
-            </a:r>
-          </a:p>
-          <a:p>
-            <a:r>
-              <a:rPr lang="en-CA" dirty="0"/>
-              <a:t>Different types of data structures are suited to different kinds of applications, and some are highly specialized to specific tasks. </a:t>
-            </a:r>
-            <a:br>
-              <a:rPr lang="en-CA" dirty="0"/>
-            </a:br>
-            <a:r>
-              <a:rPr lang="en-CA" dirty="0"/>
-              <a:t>For example, relational databases commonly use B-tree indexes for data retrieval, while compiler implementations usually use hash tables to look up identifiers</a:t>
-            </a:r>
-          </a:p>
-          <a:p>
-            <a:r>
-              <a:rPr lang="en-CA" dirty="0"/>
-              <a:t>Usually, efficient data structures are key to designing efficient algorithms. Some formal design methods and programming languages emphasize data structures, rather than algorithms, as the key organizing factor in software design</a:t>
-            </a:r>
-          </a:p>
-          <a:p>
-            <a:pPr marL="0" indent="0">
-              <a:buNone/>
-            </a:pPr>
-            <a:r>
-              <a:rPr lang="en-CA" dirty="0"/>
-              <a:t>[Wikipedia]</a:t>
+            <a:r>
+              <a:rPr lang="en-CA" sz="3900" dirty="0"/>
+              <a:t>In the past:</a:t>
+            </a:r>
+          </a:p>
+          <a:p>
+            <a:pPr lvl="1"/>
+            <a:r>
+              <a:rPr lang="en-CA" sz="3000" dirty="0"/>
+              <a:t>486/(Pentium, maybe): “CPU bound” (100 MHz)</a:t>
+            </a:r>
+          </a:p>
+          <a:p>
+            <a:pPr lvl="1"/>
+            <a:r>
+              <a:rPr lang="en-CA" sz="3000" dirty="0"/>
+              <a:t>Memory access took “0 time” (was not considered)</a:t>
+            </a:r>
+          </a:p>
+          <a:p>
+            <a:r>
+              <a:rPr lang="en-CA" sz="3400" dirty="0"/>
+              <a:t>Now, it’s the complete opposite</a:t>
+            </a:r>
+          </a:p>
+          <a:p>
+            <a:pPr lvl="1"/>
+            <a:r>
+              <a:rPr lang="en-CA" sz="3000" dirty="0"/>
+              <a:t>CPUs are WAAAAAAAAY faster than memory</a:t>
+            </a:r>
+          </a:p>
+          <a:p>
+            <a:pPr lvl="1"/>
+            <a:r>
+              <a:rPr lang="en-CA" sz="3000" dirty="0"/>
+              <a:t>If you have a cache miss, it’s 500-1000 cycles</a:t>
+            </a:r>
+          </a:p>
+          <a:p>
+            <a:pPr lvl="1"/>
+            <a:r>
+              <a:rPr lang="en-CA" sz="3000" dirty="0"/>
+              <a:t>8-16 cores (aka “other CPUs”)</a:t>
+            </a:r>
+          </a:p>
+          <a:p>
+            <a:r>
+              <a:rPr lang="en-CA" sz="3400" dirty="0"/>
+              <a:t>++x is faster than x++ (maybe the 386)</a:t>
+            </a:r>
+          </a:p>
+          <a:p>
+            <a:r>
+              <a:rPr lang="en-CA" sz="3400" dirty="0"/>
+              <a:t>sqrt()</a:t>
             </a:r>
           </a:p>
         </p:txBody>
@@ -4418,7 +4508,7 @@
     </p:spTree>
     <p:extLst>
       <p:ext uri="{BB962C8B-B14F-4D97-AF65-F5344CB8AC3E}">
-        <p14:creationId xmlns:p14="http://schemas.microsoft.com/office/powerpoint/2010/main" val="1716578441"/>
+        <p14:creationId xmlns:p14="http://schemas.microsoft.com/office/powerpoint/2010/main" xmlns="" val="1221503553"/>
       </p:ext>
     </p:extLst>
   </p:cSld>
@@ -4473,7 +4563,7 @@
                   <a:schemeClr val="bg1"/>
                 </a:solidFill>
               </a:rPr>
-              <a:t>Primitive Data Structures</a:t>
+              <a:t>Data Structures</a:t>
             </a:r>
           </a:p>
         </p:txBody>
@@ -4488,45 +4578,76 @@
             <p:ph idx="1"/>
           </p:nvPr>
         </p:nvSpPr>
-        <p:spPr/>
+        <p:spPr>
+          <a:xfrm>
+            <a:off x="474133" y="1508942"/>
+            <a:ext cx="11276589" cy="5111991"/>
+          </a:xfrm>
+        </p:spPr>
         <p:txBody>
           <a:bodyPr>
-            <a:normAutofit lnSpcReduction="10000"/>
+            <a:normAutofit fontScale="92500" lnSpcReduction="20000"/>
           </a:bodyPr>
           <a:lstStyle/>
           <a:p>
-            <a:pPr fontAlgn="base"/>
-            <a:r>
-              <a:rPr lang="en-CA" dirty="0"/>
-              <a:t>The simplest data structures are primitive variables. They hold a single value, and beyond that, are of limited use. When many related values need to be stored, an array is used. </a:t>
-            </a:r>
-          </a:p>
-          <a:p>
-            <a:pPr fontAlgn="base"/>
-            <a:r>
-              <a:rPr lang="en-CA" dirty="0"/>
-              <a:t>Another example of a basic data structure is an array, in which multiple data bits are coordinated into a group sharing a common label. This helps programs call these data bits or perform other work on the data set as a whole. </a:t>
-            </a:r>
-          </a:p>
-          <a:p>
-            <a:pPr fontAlgn="base"/>
-            <a:r>
-              <a:rPr lang="en-CA" dirty="0"/>
-              <a:t>Another example is a stack, which places data units in relative hierarchies, allowing functions to work on the data in coordinated ways, such as pushing new data onto a stack, or popping data off the top of a stack</a:t>
-            </a:r>
-          </a:p>
-          <a:p>
             <a:pPr marL="0" indent="0">
               <a:buNone/>
             </a:pPr>
-            <a:endParaRPr lang="en-CA" dirty="0"/>
+            <a:r>
+              <a:rPr lang="en-CA" b="1" u="sng" dirty="0">
+                <a:solidFill>
+                  <a:schemeClr val="tx2"/>
+                </a:solidFill>
+              </a:rPr>
+              <a:t>Data structure </a:t>
+            </a:r>
+          </a:p>
+          <a:p>
+            <a:r>
+              <a:rPr lang="en-CA" dirty="0"/>
+              <a:t>Is a data organization, management, and storage format that enables efficient access and modification. </a:t>
+            </a:r>
+          </a:p>
+          <a:p>
+            <a:r>
+              <a:rPr lang="en-CA" dirty="0"/>
+              <a:t>A data structure is a collection of data values, the relationships among them, and the functions or operations that can be applied to the data.  </a:t>
+            </a:r>
+          </a:p>
+          <a:p>
+            <a:r>
+              <a:rPr lang="en-CA" dirty="0"/>
+              <a:t>Different types of data structures are suited to different kinds of applications, and some are highly specialized to specific tasks. </a:t>
+            </a:r>
+            <a:br>
+              <a:rPr lang="en-CA" dirty="0"/>
+            </a:br>
+            <a:r>
+              <a:rPr lang="en-CA" dirty="0"/>
+              <a:t>For example, relational databases commonly use B-tree indexes for data retrieval, while compiler implementations usually use hash tables to look up identifiers</a:t>
+            </a:r>
+          </a:p>
+          <a:p>
+            <a:r>
+              <a:rPr lang="en-CA" dirty="0"/>
+              <a:t>Usually, efficient data structures are key to designing efficient algorithms. Some formal design methods and programming languages emphasize data structures, rather than algorithms, as the key organizing factor in software design</a:t>
+            </a:r>
+          </a:p>
+          <a:p>
+            <a:pPr marL="0" indent="0">
+              <a:buNone/>
+            </a:pPr>
+            <a:r>
+              <a:rPr lang="en-CA" dirty="0"/>
+              <a:t>[Wikipedia]</a:t>
+            </a:r>
           </a:p>
         </p:txBody>
       </p:sp>
     </p:spTree>
     <p:extLst>
       <p:ext uri="{BB962C8B-B14F-4D97-AF65-F5344CB8AC3E}">
-        <p14:creationId xmlns:p14="http://schemas.microsoft.com/office/powerpoint/2010/main" val="4116026934"/>
+        <p14:creationId xmlns:p14="http://schemas.microsoft.com/office/powerpoint/2010/main" xmlns="" val="1716578441"/>
       </p:ext>
     </p:extLst>
   </p:cSld>
@@ -4581,7 +4702,7 @@
                   <a:schemeClr val="bg1"/>
                 </a:solidFill>
               </a:rPr>
-              <a:t>Primitive Data Structures C++</a:t>
+              <a:t>Primitive Data Structures</a:t>
             </a:r>
           </a:p>
         </p:txBody>
@@ -4596,57 +4717,45 @@
             <p:ph idx="1"/>
           </p:nvPr>
         </p:nvSpPr>
-        <p:spPr>
-          <a:xfrm>
-            <a:off x="346881" y="1508943"/>
-            <a:ext cx="4047698" cy="4554232"/>
-          </a:xfrm>
-        </p:spPr>
-        <p:txBody>
-          <a:bodyPr/>
-          <a:lstStyle/>
-          <a:p>
-            <a:r>
-              <a:rPr lang="en-CA" dirty="0"/>
-              <a:t>These primitive structures will be used to create more complex structures.</a:t>
-            </a:r>
-          </a:p>
-          <a:p>
-            <a:r>
-              <a:rPr lang="en-CA" dirty="0"/>
-              <a:t>These almost always correspond to a CPU/GPUs “registers”</a:t>
-            </a:r>
-          </a:p>
-        </p:txBody>
-      </p:sp>
-      <p:pic>
-        <p:nvPicPr>
-          <p:cNvPr id="4" name="Picture 3"/>
-          <p:cNvPicPr>
-            <a:picLocks noChangeAspect="1"/>
-          </p:cNvPicPr>
-          <p:nvPr/>
-        </p:nvPicPr>
-        <p:blipFill>
-          <a:blip r:embed="rId2"/>
-          <a:stretch>
-            <a:fillRect/>
-          </a:stretch>
-        </p:blipFill>
-        <p:spPr>
-          <a:xfrm>
-            <a:off x="4577615" y="1330881"/>
-            <a:ext cx="6776185" cy="5527119"/>
-          </a:xfrm>
-          <a:prstGeom prst="rect">
-            <a:avLst/>
-          </a:prstGeom>
-        </p:spPr>
-      </p:pic>
+        <p:spPr/>
+        <p:txBody>
+          <a:bodyPr>
+            <a:normAutofit lnSpcReduction="10000"/>
+          </a:bodyPr>
+          <a:lstStyle/>
+          <a:p>
+            <a:pPr fontAlgn="base"/>
+            <a:r>
+              <a:rPr lang="en-CA" dirty="0"/>
+              <a:t>The simplest data structures are primitive variables. They hold a single value, and beyond that, are of limited use. When many related values need to be stored, an array is used. </a:t>
+            </a:r>
+          </a:p>
+          <a:p>
+            <a:pPr fontAlgn="base"/>
+            <a:r>
+              <a:rPr lang="en-CA" dirty="0"/>
+              <a:t>Another example of a basic data structure is an array, in which multiple data bits are coordinated into a group sharing a common label. This helps programs call these data bits or perform other work on the data set as a whole. </a:t>
+            </a:r>
+          </a:p>
+          <a:p>
+            <a:pPr fontAlgn="base"/>
+            <a:r>
+              <a:rPr lang="en-CA" dirty="0"/>
+              <a:t>Another example is a stack, which places data units in relative hierarchies, allowing functions to work on the data in coordinated ways, such as pushing new data onto a stack, or popping data off the top of a stack</a:t>
+            </a:r>
+          </a:p>
+          <a:p>
+            <a:pPr marL="0" indent="0">
+              <a:buNone/>
+            </a:pPr>
+            <a:endParaRPr lang="en-CA" dirty="0"/>
+          </a:p>
+        </p:txBody>
+      </p:sp>
     </p:spTree>
     <p:extLst>
       <p:ext uri="{BB962C8B-B14F-4D97-AF65-F5344CB8AC3E}">
-        <p14:creationId xmlns:p14="http://schemas.microsoft.com/office/powerpoint/2010/main" val="995191618"/>
+        <p14:creationId xmlns:p14="http://schemas.microsoft.com/office/powerpoint/2010/main" xmlns="" val="4116026934"/>
       </p:ext>
     </p:extLst>
   </p:cSld>
@@ -4701,7 +4810,7 @@
                   <a:schemeClr val="bg1"/>
                 </a:solidFill>
               </a:rPr>
-              <a:t>Non-primitive Data structures</a:t>
+              <a:t>Primitive Data Structures C++</a:t>
             </a:r>
           </a:p>
         </p:txBody>
@@ -4718,133 +4827,55 @@
         </p:nvSpPr>
         <p:spPr>
           <a:xfrm>
-            <a:off x="838200" y="1337481"/>
-            <a:ext cx="10515600" cy="5349921"/>
-          </a:xfrm>
-        </p:spPr>
-        <p:txBody>
-          <a:bodyPr>
-            <a:normAutofit lnSpcReduction="10000"/>
-          </a:bodyPr>
-          <a:lstStyle/>
-          <a:p>
-            <a:r>
-              <a:rPr lang="en-CA" dirty="0"/>
-              <a:t>The non-primitive data structures cannot be created without primitive data structures.</a:t>
-            </a:r>
-          </a:p>
-          <a:p>
-            <a:r>
-              <a:rPr lang="en-CA" dirty="0"/>
-              <a:t>The Non-primitive data structures are further divided into the following categories:</a:t>
-            </a:r>
-          </a:p>
-          <a:p>
-            <a:r>
-              <a:rPr lang="en-CA" dirty="0">
-                <a:solidFill>
-                  <a:srgbClr val="0070C0"/>
-                </a:solidFill>
-              </a:rPr>
-              <a:t>Arrays</a:t>
-            </a:r>
-            <a:r>
-              <a:rPr lang="en-CA" dirty="0"/>
-              <a:t> - </a:t>
-            </a:r>
-            <a:r>
-              <a:rPr lang="en-CA" sz="2400" dirty="0"/>
-              <a:t>a homogeneous and contiguous collection of same data types. They have a static memory allocation technique</a:t>
-            </a:r>
-            <a:endParaRPr lang="en-CA" dirty="0"/>
-          </a:p>
-          <a:p>
-            <a:r>
-              <a:rPr lang="en-CA" dirty="0">
-                <a:solidFill>
-                  <a:srgbClr val="0070C0"/>
-                </a:solidFill>
-              </a:rPr>
-              <a:t>Files </a:t>
-            </a:r>
-            <a:r>
-              <a:rPr lang="en-CA" sz="2400" dirty="0"/>
-              <a:t>- A file is a collection of records. The file data structure is primarily used for managing large amounts of data which is not in the primary storage of the system.</a:t>
-            </a:r>
-          </a:p>
-          <a:p>
-            <a:r>
-              <a:rPr lang="en-CA" dirty="0">
-                <a:solidFill>
-                  <a:srgbClr val="0070C0"/>
-                </a:solidFill>
-              </a:rPr>
-              <a:t>Lists</a:t>
-            </a:r>
-            <a:r>
-              <a:rPr lang="en-CA" dirty="0"/>
-              <a:t> - </a:t>
-            </a:r>
-            <a:r>
-              <a:rPr lang="en-CA" sz="2400" dirty="0"/>
-              <a:t>lists support dynamic memory allocation.</a:t>
-            </a:r>
-            <a:endParaRPr lang="en-CA" sz="2400" dirty="0">
-              <a:solidFill>
-                <a:srgbClr val="0070C0"/>
-              </a:solidFill>
-            </a:endParaRPr>
-          </a:p>
-          <a:p>
-            <a:pPr lvl="1"/>
-            <a:r>
-              <a:rPr lang="en-CA" dirty="0">
-                <a:solidFill>
-                  <a:srgbClr val="0070C0"/>
-                </a:solidFill>
-              </a:rPr>
-              <a:t>Linear Lists </a:t>
-            </a:r>
-            <a:r>
-              <a:rPr lang="en-CA" dirty="0"/>
-              <a:t>– stacks, queues</a:t>
-            </a:r>
-          </a:p>
-          <a:p>
-            <a:pPr lvl="2"/>
-            <a:r>
-              <a:rPr lang="en-CA" dirty="0"/>
-              <a:t>The linear lists are those which have the elements stored in a sequential order. </a:t>
-            </a:r>
-          </a:p>
-          <a:p>
-            <a:pPr lvl="1"/>
-            <a:r>
-              <a:rPr lang="en-CA" dirty="0">
-                <a:solidFill>
-                  <a:srgbClr val="0070C0"/>
-                </a:solidFill>
-              </a:rPr>
-              <a:t>Non-linear Lists </a:t>
-            </a:r>
-            <a:r>
-              <a:rPr lang="en-CA" dirty="0"/>
-              <a:t>– graphs, trees, hash based</a:t>
-            </a:r>
-          </a:p>
-          <a:p>
-            <a:pPr lvl="2"/>
-            <a:r>
-              <a:rPr lang="en-CA" dirty="0"/>
-              <a:t>non linear lists do not have elements stored in a certain manner.</a:t>
-            </a:r>
-          </a:p>
-        </p:txBody>
-      </p:sp>
+            <a:off x="346881" y="1508943"/>
+            <a:ext cx="4047698" cy="4554232"/>
+          </a:xfrm>
+        </p:spPr>
+        <p:txBody>
+          <a:bodyPr/>
+          <a:lstStyle/>
+          <a:p>
+            <a:r>
+              <a:rPr lang="en-CA" dirty="0"/>
+              <a:t>These primitive structures will be used to create more complex structures.</a:t>
+            </a:r>
+          </a:p>
+          <a:p>
+            <a:r>
+              <a:rPr lang="en-CA" dirty="0"/>
+              <a:t>These almost always correspond to a CPU/GPUs “registers”</a:t>
+            </a:r>
+          </a:p>
+        </p:txBody>
+      </p:sp>
+      <p:pic>
+        <p:nvPicPr>
+          <p:cNvPr id="4" name="Picture 3"/>
+          <p:cNvPicPr>
+            <a:picLocks noChangeAspect="1"/>
+          </p:cNvPicPr>
+          <p:nvPr/>
+        </p:nvPicPr>
+        <p:blipFill>
+          <a:blip r:embed="rId2" cstate="print"/>
+          <a:stretch>
+            <a:fillRect/>
+          </a:stretch>
+        </p:blipFill>
+        <p:spPr>
+          <a:xfrm>
+            <a:off x="4577615" y="1330881"/>
+            <a:ext cx="6776185" cy="5527119"/>
+          </a:xfrm>
+          <a:prstGeom prst="rect">
+            <a:avLst/>
+          </a:prstGeom>
+        </p:spPr>
+      </p:pic>
     </p:spTree>
     <p:extLst>
       <p:ext uri="{BB962C8B-B14F-4D97-AF65-F5344CB8AC3E}">
-        <p14:creationId xmlns:p14="http://schemas.microsoft.com/office/powerpoint/2010/main" val="3562463711"/>
+        <p14:creationId xmlns:p14="http://schemas.microsoft.com/office/powerpoint/2010/main" xmlns="" val="995191618"/>
       </p:ext>
     </p:extLst>
   </p:cSld>
@@ -4899,7 +4930,7 @@
                   <a:schemeClr val="bg1"/>
                 </a:solidFill>
               </a:rPr>
-              <a:t>Derived Types and Data Structures</a:t>
+              <a:t>Non-primitive Data structures</a:t>
             </a:r>
           </a:p>
         </p:txBody>
@@ -4914,55 +4945,135 @@
             <p:ph idx="1"/>
           </p:nvPr>
         </p:nvSpPr>
-        <p:spPr/>
-        <p:txBody>
-          <a:bodyPr/>
-          <a:lstStyle/>
-          <a:p>
-            <a:r>
-              <a:rPr lang="en-CA" dirty="0"/>
-              <a:t>As C++ is an object oriented languages and supports the concept of classes we can also use these “derived” types to create data structures.</a:t>
-            </a:r>
-          </a:p>
-          <a:p>
-            <a:r>
-              <a:rPr lang="en-CA" dirty="0"/>
-              <a:t>Using derived types will provide more flexibility and power in creating data structures but can also add complexity.</a:t>
-            </a:r>
-          </a:p>
-          <a:p>
+        <p:spPr>
+          <a:xfrm>
+            <a:off x="838200" y="1337481"/>
+            <a:ext cx="10515600" cy="5349921"/>
+          </a:xfrm>
+        </p:spPr>
+        <p:txBody>
+          <a:bodyPr>
+            <a:normAutofit lnSpcReduction="10000"/>
+          </a:bodyPr>
+          <a:lstStyle/>
+          <a:p>
+            <a:r>
+              <a:rPr lang="en-CA" dirty="0"/>
+              <a:t>The non-primitive data structures cannot be created without primitive data structures.</a:t>
+            </a:r>
+          </a:p>
+          <a:p>
+            <a:r>
+              <a:rPr lang="en-CA" dirty="0"/>
+              <a:t>The Non-primitive data structures are further divided into the following categories:</a:t>
+            </a:r>
+          </a:p>
+          <a:p>
+            <a:r>
+              <a:rPr lang="en-CA" dirty="0">
+                <a:solidFill>
+                  <a:srgbClr val="0070C0"/>
+                </a:solidFill>
+              </a:rPr>
+              <a:t>Arrays</a:t>
+            </a:r>
+            <a:r>
+              <a:rPr lang="en-CA" dirty="0"/>
+              <a:t> - </a:t>
+            </a:r>
+            <a:r>
+              <a:rPr lang="en-CA" sz="2400" dirty="0"/>
+              <a:t>a homogeneous and contiguous collection of same data types. They have a static memory allocation technique</a:t>
+            </a:r>
             <a:endParaRPr lang="en-CA" dirty="0"/>
           </a:p>
-        </p:txBody>
-      </p:sp>
-      <p:pic>
-        <p:nvPicPr>
-          <p:cNvPr id="4" name="Picture 3"/>
-          <p:cNvPicPr>
-            <a:picLocks noChangeAspect="1"/>
-          </p:cNvPicPr>
-          <p:nvPr/>
-        </p:nvPicPr>
-        <p:blipFill>
-          <a:blip r:embed="rId2"/>
-          <a:stretch>
-            <a:fillRect/>
-          </a:stretch>
-        </p:blipFill>
-        <p:spPr>
-          <a:xfrm>
-            <a:off x="1754022" y="3619500"/>
-            <a:ext cx="7810500" cy="3238500"/>
-          </a:xfrm>
-          <a:prstGeom prst="rect">
-            <a:avLst/>
-          </a:prstGeom>
-        </p:spPr>
-      </p:pic>
+          <a:p>
+            <a:r>
+              <a:rPr lang="en-CA" dirty="0">
+                <a:solidFill>
+                  <a:srgbClr val="0070C0"/>
+                </a:solidFill>
+              </a:rPr>
+              <a:t>Files </a:t>
+            </a:r>
+            <a:r>
+              <a:rPr lang="en-CA" sz="2400" dirty="0"/>
+              <a:t>- A file is a collection of records. The file data structure is primarily used for managing large amounts of data which is not in the primary storage of the system.</a:t>
+            </a:r>
+          </a:p>
+          <a:p>
+            <a:r>
+              <a:rPr lang="en-CA" dirty="0">
+                <a:solidFill>
+                  <a:srgbClr val="0070C0"/>
+                </a:solidFill>
+              </a:rPr>
+              <a:t>Lists</a:t>
+            </a:r>
+            <a:r>
+              <a:rPr lang="en-CA" dirty="0"/>
+              <a:t> - </a:t>
+            </a:r>
+            <a:r>
+              <a:rPr lang="en-CA" sz="2400" dirty="0"/>
+              <a:t>lists support dynamic memory allocation.</a:t>
+            </a:r>
+            <a:endParaRPr lang="en-CA" sz="2400" dirty="0">
+              <a:solidFill>
+                <a:srgbClr val="0070C0"/>
+              </a:solidFill>
+            </a:endParaRPr>
+          </a:p>
+          <a:p>
+            <a:pPr lvl="1"/>
+            <a:r>
+              <a:rPr lang="en-CA" dirty="0">
+                <a:solidFill>
+                  <a:srgbClr val="0070C0"/>
+                </a:solidFill>
+              </a:rPr>
+              <a:t>Linear Lists </a:t>
+            </a:r>
+            <a:r>
+              <a:rPr lang="en-CA" dirty="0"/>
+              <a:t>– stacks, queues</a:t>
+            </a:r>
+          </a:p>
+          <a:p>
+            <a:pPr lvl="2"/>
+            <a:r>
+              <a:rPr lang="en-CA" dirty="0"/>
+              <a:t>The linear lists are those which have the elements stored in a sequential order. </a:t>
+            </a:r>
+          </a:p>
+          <a:p>
+            <a:pPr lvl="1"/>
+            <a:r>
+              <a:rPr lang="en-CA" dirty="0">
+                <a:solidFill>
+                  <a:srgbClr val="0070C0"/>
+                </a:solidFill>
+              </a:rPr>
+              <a:t>Non-linear Lists </a:t>
+            </a:r>
+            <a:r>
+              <a:rPr lang="en-CA" dirty="0"/>
+              <a:t>– graphs, trees, hash based</a:t>
+            </a:r>
+          </a:p>
+          <a:p>
+            <a:pPr lvl="2"/>
+            <a:r>
+              <a:rPr lang="en-CA" dirty="0"/>
+              <a:t>non linear lists do not have elements stored in a certain manner.</a:t>
+            </a:r>
+          </a:p>
+        </p:txBody>
+      </p:sp>
     </p:spTree>
     <p:extLst>
       <p:ext uri="{BB962C8B-B14F-4D97-AF65-F5344CB8AC3E}">
-        <p14:creationId xmlns:p14="http://schemas.microsoft.com/office/powerpoint/2010/main" val="3625698372"/>
+        <p14:creationId xmlns:p14="http://schemas.microsoft.com/office/powerpoint/2010/main" xmlns="" val="3562463711"/>
       </p:ext>
     </p:extLst>
   </p:cSld>
@@ -5034,7 +5145,7 @@
         </p:nvSpPr>
         <p:spPr>
           <a:xfrm>
-            <a:off x="320040" y="1322675"/>
+            <a:off x="324016" y="1255089"/>
             <a:ext cx="11033760" cy="4611781"/>
           </a:xfrm>
         </p:spPr>
@@ -5084,15 +5195,40 @@
           <a:p>
             <a:r>
               <a:rPr lang="en-CA" dirty="0"/>
-              <a:t>There are three (3) sections – I’m teaching one of them</a:t>
+              <a:t>There are </a:t>
+            </a:r>
+            <a:r>
+              <a:rPr lang="en-CA" dirty="0" smtClean="0"/>
+              <a:t>four (4) </a:t>
+            </a:r>
+            <a:r>
+              <a:rPr lang="en-CA" dirty="0"/>
+              <a:t>sections – I’m teaching one of them</a:t>
             </a:r>
           </a:p>
           <a:p>
             <a:pPr lvl="1"/>
             <a:r>
               <a:rPr lang="en-CA" dirty="0"/>
-              <a:t>Profs. Maaroof and Haworth are teaching the other 2</a:t>
-            </a:r>
+              <a:t>Profs. </a:t>
+            </a:r>
+            <a:r>
+              <a:rPr lang="en-CA" dirty="0" err="1" smtClean="0"/>
+              <a:t>Maaroof</a:t>
+            </a:r>
+            <a:r>
+              <a:rPr lang="en-CA" dirty="0" smtClean="0"/>
+              <a:t>, Haworth, and Manning </a:t>
+            </a:r>
+            <a:r>
+              <a:rPr lang="en-CA" dirty="0"/>
+              <a:t>are teaching the other </a:t>
+            </a:r>
+            <a:r>
+              <a:rPr lang="en-CA" dirty="0" smtClean="0"/>
+              <a:t>3</a:t>
+            </a:r>
+            <a:endParaRPr lang="en-CA" dirty="0"/>
           </a:p>
           <a:p>
             <a:pPr lvl="1"/>
@@ -5120,22 +5256,45 @@
           <a:p>
             <a:r>
               <a:rPr lang="en-CA" dirty="0"/>
-              <a:t>For now, they are Wednesday’s from “12:00” – “3:00”</a:t>
-            </a:r>
+              <a:t>For now, </a:t>
+            </a:r>
+            <a:r>
+              <a:rPr lang="en-CA" dirty="0" smtClean="0"/>
+              <a:t>they are:</a:t>
+            </a:r>
+            <a:endParaRPr lang="en-CA" dirty="0"/>
           </a:p>
           <a:p>
             <a:pPr lvl="1"/>
             <a:r>
-              <a:rPr lang="en-CA" dirty="0"/>
-              <a:t>i.e. between my morning and afternoon classes</a:t>
-            </a:r>
+              <a:rPr lang="en-CA" dirty="0" smtClean="0"/>
+              <a:t>Wednesdays from “12:00” to “3:00” </a:t>
+            </a:r>
+            <a:r>
+              <a:rPr lang="en-CA" sz="2000" dirty="0" smtClean="0"/>
+              <a:t>(between </a:t>
+            </a:r>
+            <a:r>
+              <a:rPr lang="en-CA" sz="2000" dirty="0"/>
+              <a:t>my morning and afternoon </a:t>
+            </a:r>
+            <a:r>
+              <a:rPr lang="en-CA" sz="2000" dirty="0" smtClean="0"/>
+              <a:t>classes)</a:t>
+            </a:r>
+            <a:endParaRPr lang="en-CA" sz="2000" dirty="0"/>
           </a:p>
           <a:p>
             <a:pPr lvl="1"/>
             <a:r>
-              <a:rPr lang="en-CA" dirty="0"/>
-              <a:t>I’m OK to add more office hours if needed/wanted</a:t>
-            </a:r>
+              <a:rPr lang="en-CA" dirty="0" smtClean="0"/>
+              <a:t>Tuesdays from 11:00 to 12:00</a:t>
+            </a:r>
+            <a:r>
+              <a:rPr lang="en-CA" sz="2000" dirty="0" smtClean="0"/>
+              <a:t> (after my morning class)</a:t>
+            </a:r>
+            <a:endParaRPr lang="en-CA" dirty="0"/>
           </a:p>
           <a:p>
             <a:endParaRPr lang="en-CA" dirty="0"/>
@@ -5147,7 +5306,7 @@
           <p:cNvPr id="4" name="TextBox 3">
             <a:extLst>
               <a:ext uri="{FF2B5EF4-FFF2-40B4-BE49-F238E27FC236}">
-                <a16:creationId xmlns:a16="http://schemas.microsoft.com/office/drawing/2014/main" id="{AFAE8CCC-FBE4-172B-47CD-82C11B0CDE84}"/>
+                <a16:creationId xmlns:a16="http://schemas.microsoft.com/office/drawing/2014/main" xmlns="" id="{AFAE8CCC-FBE4-172B-47CD-82C11B0CDE84}"/>
               </a:ext>
             </a:extLst>
           </p:cNvPr>
@@ -5180,7 +5339,7 @@
     </p:spTree>
     <p:extLst>
       <p:ext uri="{BB962C8B-B14F-4D97-AF65-F5344CB8AC3E}">
-        <p14:creationId xmlns:p14="http://schemas.microsoft.com/office/powerpoint/2010/main" val="710590374"/>
+        <p14:creationId xmlns:p14="http://schemas.microsoft.com/office/powerpoint/2010/main" xmlns="" val="710590374"/>
       </p:ext>
     </p:extLst>
   </p:cSld>
@@ -5250,99 +5409,23 @@
             <p:ph idx="1"/>
           </p:nvPr>
         </p:nvSpPr>
-        <p:spPr>
-          <a:xfrm>
-            <a:off x="393290" y="1508943"/>
-            <a:ext cx="10960510" cy="4554232"/>
-          </a:xfrm>
-        </p:spPr>
+        <p:spPr/>
         <p:txBody>
           <a:bodyPr/>
           <a:lstStyle/>
           <a:p>
             <a:r>
-              <a:rPr lang="en-CA" b="1" dirty="0"/>
-              <a:t>Giant Note: </a:t>
-            </a:r>
-            <a:r>
-              <a:rPr lang="en-CA" dirty="0"/>
-              <a:t>Object Oriented is Not:</a:t>
-            </a:r>
-          </a:p>
-          <a:p>
-            <a:pPr lvl="1"/>
-            <a:r>
-              <a:rPr lang="en-CA" dirty="0"/>
-              <a:t>The only way to “skin a cat”</a:t>
-            </a:r>
-          </a:p>
-          <a:p>
-            <a:pPr lvl="1"/>
-            <a:r>
-              <a:rPr lang="en-CA" dirty="0"/>
-              <a:t>Is *NOT* how computers actually work</a:t>
-            </a:r>
-          </a:p>
-          <a:p>
-            <a:pPr lvl="1"/>
-            <a:r>
-              <a:rPr lang="en-CA" dirty="0"/>
-              <a:t>It’s a helpful abstraction for us humble humans</a:t>
-            </a:r>
-          </a:p>
-          <a:p>
-            <a:pPr lvl="1"/>
-            <a:r>
-              <a:rPr lang="en-CA" dirty="0"/>
-              <a:t>May not be the best way, or even a good way</a:t>
-            </a:r>
-          </a:p>
-          <a:p>
-            <a:r>
-              <a:rPr lang="en-CA" dirty="0"/>
-              <a:t>Mike Acton’s “3 big lies”:</a:t>
-            </a:r>
-          </a:p>
-          <a:p>
-            <a:pPr lvl="1"/>
-            <a:r>
-              <a:rPr lang="en-CA" dirty="0">
-                <a:hlinkClick r:id="rId3"/>
-              </a:rPr>
-              <a:t>https://cellperformance.beyond3d.com/articles/2008/03/three-big-lies.html</a:t>
-            </a:r>
-            <a:endParaRPr lang="en-CA" dirty="0"/>
-          </a:p>
-          <a:p>
-            <a:pPr lvl="1"/>
-            <a:r>
-              <a:rPr lang="en-CA" dirty="0"/>
-              <a:t>Software is the platform</a:t>
-            </a:r>
-          </a:p>
-          <a:p>
-            <a:pPr lvl="1"/>
-            <a:r>
-              <a:rPr lang="en-CA" dirty="0"/>
-              <a:t>Code should be designed around a model of the world</a:t>
-            </a:r>
-          </a:p>
-          <a:p>
-            <a:pPr lvl="1"/>
-            <a:r>
-              <a:rPr lang="en-CA" dirty="0"/>
-              <a:t>Code is more </a:t>
-            </a:r>
-            <a:r>
-              <a:rPr lang="en-CA"/>
-              <a:t>important than data</a:t>
-            </a:r>
-            <a:endParaRPr lang="en-CA" dirty="0"/>
-          </a:p>
-          <a:p>
-            <a:pPr marL="457200" lvl="1" indent="0">
-              <a:buNone/>
-            </a:pPr>
+              <a:rPr lang="en-CA" dirty="0"/>
+              <a:t>As C++ is an object oriented languages and supports the concept of classes we can also use these “derived” types to create data structures.</a:t>
+            </a:r>
+          </a:p>
+          <a:p>
+            <a:r>
+              <a:rPr lang="en-CA" dirty="0"/>
+              <a:t>Using derived types will provide more flexibility and power in creating data structures but can also add complexity.</a:t>
+            </a:r>
+          </a:p>
+          <a:p>
             <a:endParaRPr lang="en-CA" dirty="0"/>
           </a:p>
         </p:txBody>
@@ -5356,15 +5439,15 @@
           <p:nvPr/>
         </p:nvPicPr>
         <p:blipFill>
-          <a:blip r:embed="rId4"/>
+          <a:blip r:embed="rId2" cstate="print"/>
           <a:stretch>
             <a:fillRect/>
           </a:stretch>
         </p:blipFill>
         <p:spPr>
           <a:xfrm>
-            <a:off x="7627122" y="1870598"/>
-            <a:ext cx="4245593" cy="1760368"/>
+            <a:off x="1754022" y="3619500"/>
+            <a:ext cx="7810500" cy="3238500"/>
           </a:xfrm>
           <a:prstGeom prst="rect">
             <a:avLst/>
@@ -5374,7 +5457,7 @@
     </p:spTree>
     <p:extLst>
       <p:ext uri="{BB962C8B-B14F-4D97-AF65-F5344CB8AC3E}">
-        <p14:creationId xmlns:p14="http://schemas.microsoft.com/office/powerpoint/2010/main" val="857484025"/>
+        <p14:creationId xmlns:p14="http://schemas.microsoft.com/office/powerpoint/2010/main" xmlns="" val="3625698372"/>
       </p:ext>
     </p:extLst>
   </p:cSld>
@@ -5403,13 +5486,7 @@
       </p:grpSpPr>
       <p:sp>
         <p:nvSpPr>
-          <p:cNvPr id="2" name="Title 1">
-            <a:extLst>
-              <a:ext uri="{FF2B5EF4-FFF2-40B4-BE49-F238E27FC236}">
-                <a16:creationId xmlns:a16="http://schemas.microsoft.com/office/drawing/2014/main" id="{B06092A6-64C4-40B1-B90B-ADCCCB67629D}"/>
-              </a:ext>
-            </a:extLst>
-          </p:cNvPr>
+          <p:cNvPr id="2" name="Title 1"/>
           <p:cNvSpPr>
             <a:spLocks noGrp="1"/>
           </p:cNvSpPr>
@@ -5417,44 +5494,164 @@
             <p:ph type="title"/>
           </p:nvPr>
         </p:nvSpPr>
-        <p:spPr/>
+        <p:spPr>
+          <a:xfrm>
+            <a:off x="2039815" y="182245"/>
+            <a:ext cx="9710907" cy="830629"/>
+          </a:xfrm>
+        </p:spPr>
+        <p:txBody>
+          <a:bodyPr>
+            <a:normAutofit/>
+          </a:bodyPr>
+          <a:lstStyle/>
+          <a:p>
+            <a:r>
+              <a:rPr lang="en-CA" dirty="0">
+                <a:solidFill>
+                  <a:schemeClr val="bg1"/>
+                </a:solidFill>
+              </a:rPr>
+              <a:t>Derived Types and Data Structures</a:t>
+            </a:r>
+          </a:p>
+        </p:txBody>
+      </p:sp>
+      <p:sp>
+        <p:nvSpPr>
+          <p:cNvPr id="3" name="Content Placeholder 2"/>
+          <p:cNvSpPr>
+            <a:spLocks noGrp="1"/>
+          </p:cNvSpPr>
+          <p:nvPr>
+            <p:ph idx="1"/>
+          </p:nvPr>
+        </p:nvSpPr>
+        <p:spPr>
+          <a:xfrm>
+            <a:off x="393290" y="1508943"/>
+            <a:ext cx="10960510" cy="4554232"/>
+          </a:xfrm>
+        </p:spPr>
         <p:txBody>
           <a:bodyPr/>
           <a:lstStyle/>
           <a:p>
+            <a:r>
+              <a:rPr lang="en-CA" b="1" dirty="0"/>
+              <a:t>Giant Note: </a:t>
+            </a:r>
+            <a:r>
+              <a:rPr lang="en-CA" dirty="0"/>
+              <a:t>Object Oriented is Not:</a:t>
+            </a:r>
+          </a:p>
+          <a:p>
+            <a:pPr lvl="1"/>
+            <a:r>
+              <a:rPr lang="en-CA" dirty="0"/>
+              <a:t>The only way to “skin a cat”</a:t>
+            </a:r>
+          </a:p>
+          <a:p>
+            <a:pPr lvl="1"/>
+            <a:r>
+              <a:rPr lang="en-CA" dirty="0"/>
+              <a:t>Is *NOT* how computers actually work</a:t>
+            </a:r>
+          </a:p>
+          <a:p>
+            <a:pPr lvl="1"/>
+            <a:r>
+              <a:rPr lang="en-CA" dirty="0"/>
+              <a:t>It’s a helpful abstraction for us humble humans</a:t>
+            </a:r>
+          </a:p>
+          <a:p>
+            <a:pPr lvl="1"/>
+            <a:r>
+              <a:rPr lang="en-CA" dirty="0"/>
+              <a:t>May not be the best way, or even a good way</a:t>
+            </a:r>
+          </a:p>
+          <a:p>
+            <a:r>
+              <a:rPr lang="en-CA" dirty="0"/>
+              <a:t>Mike Acton’s “3 big lies”:</a:t>
+            </a:r>
+          </a:p>
+          <a:p>
+            <a:pPr lvl="1"/>
+            <a:r>
+              <a:rPr lang="en-CA" dirty="0">
+                <a:hlinkClick r:id="rId3"/>
+              </a:rPr>
+              <a:t>https://cellperformance.beyond3d.com/articles/2008/03/three-big-lies.html</a:t>
+            </a:r>
             <a:endParaRPr lang="en-CA" dirty="0"/>
           </a:p>
-        </p:txBody>
-      </p:sp>
-      <p:sp>
-        <p:nvSpPr>
-          <p:cNvPr id="3" name="Content Placeholder 2">
-            <a:extLst>
-              <a:ext uri="{FF2B5EF4-FFF2-40B4-BE49-F238E27FC236}">
-                <a16:creationId xmlns:a16="http://schemas.microsoft.com/office/drawing/2014/main" id="{9ECB68CD-19B8-438A-9D91-F26C5D653EB4}"/>
-              </a:ext>
-            </a:extLst>
-          </p:cNvPr>
-          <p:cNvSpPr>
-            <a:spLocks noGrp="1"/>
-          </p:cNvSpPr>
-          <p:nvPr>
-            <p:ph idx="1"/>
-          </p:nvPr>
-        </p:nvSpPr>
-        <p:spPr/>
-        <p:txBody>
-          <a:bodyPr/>
-          <a:lstStyle/>
-          <a:p>
+          <a:p>
+            <a:pPr lvl="1"/>
+            <a:r>
+              <a:rPr lang="en-CA" dirty="0"/>
+              <a:t>Software is the platform</a:t>
+            </a:r>
+          </a:p>
+          <a:p>
+            <a:pPr lvl="1"/>
+            <a:r>
+              <a:rPr lang="en-CA" dirty="0"/>
+              <a:t>Code should be designed around a model of the world</a:t>
+            </a:r>
+          </a:p>
+          <a:p>
+            <a:pPr lvl="1"/>
+            <a:r>
+              <a:rPr lang="en-CA" dirty="0"/>
+              <a:t>Code is more </a:t>
+            </a:r>
+            <a:r>
+              <a:rPr lang="en-CA"/>
+              <a:t>important than data</a:t>
+            </a:r>
             <a:endParaRPr lang="en-CA" dirty="0"/>
           </a:p>
-        </p:txBody>
-      </p:sp>
+          <a:p>
+            <a:pPr marL="457200" lvl="1" indent="0">
+              <a:buNone/>
+            </a:pPr>
+            <a:endParaRPr lang="en-CA" dirty="0"/>
+          </a:p>
+        </p:txBody>
+      </p:sp>
+      <p:pic>
+        <p:nvPicPr>
+          <p:cNvPr id="4" name="Picture 3"/>
+          <p:cNvPicPr>
+            <a:picLocks noChangeAspect="1"/>
+          </p:cNvPicPr>
+          <p:nvPr/>
+        </p:nvPicPr>
+        <p:blipFill>
+          <a:blip r:embed="rId4" cstate="print"/>
+          <a:stretch>
+            <a:fillRect/>
+          </a:stretch>
+        </p:blipFill>
+        <p:spPr>
+          <a:xfrm>
+            <a:off x="7627122" y="1870598"/>
+            <a:ext cx="4245593" cy="1760368"/>
+          </a:xfrm>
+          <a:prstGeom prst="rect">
+            <a:avLst/>
+          </a:prstGeom>
+        </p:spPr>
+      </p:pic>
     </p:spTree>
     <p:extLst>
       <p:ext uri="{BB962C8B-B14F-4D97-AF65-F5344CB8AC3E}">
-        <p14:creationId xmlns:p14="http://schemas.microsoft.com/office/powerpoint/2010/main" val="2256487074"/>
+        <p14:creationId xmlns:p14="http://schemas.microsoft.com/office/powerpoint/2010/main" xmlns="" val="857484025"/>
       </p:ext>
     </p:extLst>
   </p:cSld>
@@ -5551,6 +5748,10 @@
               <a:rPr lang="en-CA" sz="2800" dirty="0" err="1"/>
               <a:t>github</a:t>
             </a:r>
+            <a:r>
+              <a:rPr lang="en-CA" sz="2800" dirty="0"/>
+              <a:t/>
+            </a:r>
             <a:br>
               <a:rPr lang="en-CA" sz="2800" dirty="0"/>
             </a:br>
@@ -5612,7 +5813,7 @@
     </p:spTree>
     <p:extLst>
       <p:ext uri="{BB962C8B-B14F-4D97-AF65-F5344CB8AC3E}">
-        <p14:creationId xmlns:p14="http://schemas.microsoft.com/office/powerpoint/2010/main" val="2697823930"/>
+        <p14:creationId xmlns:p14="http://schemas.microsoft.com/office/powerpoint/2010/main" xmlns="" val="2697823930"/>
       </p:ext>
     </p:extLst>
   </p:cSld>
@@ -5759,7 +5960,7 @@
     </p:spTree>
     <p:extLst>
       <p:ext uri="{BB962C8B-B14F-4D97-AF65-F5344CB8AC3E}">
-        <p14:creationId xmlns:p14="http://schemas.microsoft.com/office/powerpoint/2010/main" val="3648319737"/>
+        <p14:creationId xmlns:p14="http://schemas.microsoft.com/office/powerpoint/2010/main" xmlns="" val="3648319737"/>
       </p:ext>
     </p:extLst>
   </p:cSld>
@@ -5942,7 +6143,7 @@
     </p:spTree>
     <p:extLst>
       <p:ext uri="{BB962C8B-B14F-4D97-AF65-F5344CB8AC3E}">
-        <p14:creationId xmlns:p14="http://schemas.microsoft.com/office/powerpoint/2010/main" val="858549414"/>
+        <p14:creationId xmlns:p14="http://schemas.microsoft.com/office/powerpoint/2010/main" xmlns="" val="858549414"/>
       </p:ext>
     </p:extLst>
   </p:cSld>
@@ -6080,7 +6281,7 @@
     </p:spTree>
     <p:extLst>
       <p:ext uri="{BB962C8B-B14F-4D97-AF65-F5344CB8AC3E}">
-        <p14:creationId xmlns:p14="http://schemas.microsoft.com/office/powerpoint/2010/main" val="3334564090"/>
+        <p14:creationId xmlns:p14="http://schemas.microsoft.com/office/powerpoint/2010/main" xmlns="" val="3334564090"/>
       </p:ext>
     </p:extLst>
   </p:cSld>
@@ -6130,13 +6331,18 @@
           <a:lstStyle/>
           <a:p>
             <a:r>
-              <a:rPr lang="en-CA" dirty="0">
+              <a:rPr lang="en-CA" dirty="0" smtClean="0">
                 <a:solidFill>
                   <a:schemeClr val="bg1"/>
                 </a:solidFill>
               </a:rPr>
-              <a:t>What you need to bring to class</a:t>
-            </a:r>
+              <a:t>Marks, etc.</a:t>
+            </a:r>
+            <a:endParaRPr lang="en-CA" dirty="0">
+              <a:solidFill>
+                <a:schemeClr val="bg1"/>
+              </a:solidFill>
+            </a:endParaRPr>
           </a:p>
         </p:txBody>
       </p:sp>
@@ -6152,76 +6358,79 @@
         </p:nvSpPr>
         <p:spPr>
           <a:xfrm>
-            <a:off x="211667" y="1271877"/>
-            <a:ext cx="10515600" cy="2724390"/>
-          </a:xfrm>
-        </p:spPr>
-        <p:txBody>
-          <a:bodyPr/>
-          <a:lstStyle/>
-          <a:p>
-            <a:r>
-              <a:rPr lang="en-CA" dirty="0"/>
-              <a:t>Visual Studio</a:t>
-            </a:r>
-          </a:p>
-          <a:p>
-            <a:r>
-              <a:rPr lang="en-CA" dirty="0"/>
-              <a:t>No textbook – we will provide internet resources</a:t>
-            </a:r>
-          </a:p>
-          <a:p>
-            <a:r>
-              <a:rPr lang="en-CA" dirty="0"/>
-              <a:t>Inquisitiveness – be prepared to ask questions</a:t>
-            </a:r>
-          </a:p>
-          <a:p>
-            <a:r>
-              <a:rPr lang="en-CA" dirty="0"/>
-              <a:t>Interest in learning</a:t>
-            </a:r>
-          </a:p>
-          <a:p>
-            <a:r>
-              <a:rPr lang="en-CA" dirty="0"/>
-              <a:t>Desire to have fun</a:t>
-            </a:r>
-          </a:p>
-          <a:p>
+            <a:off x="575733" y="1508943"/>
+            <a:ext cx="11174989" cy="5010390"/>
+          </a:xfrm>
+        </p:spPr>
+        <p:txBody>
+          <a:bodyPr>
+            <a:normAutofit/>
+          </a:bodyPr>
+          <a:lstStyle/>
+          <a:p>
+            <a:r>
+              <a:rPr lang="en-CA" dirty="0" smtClean="0"/>
+              <a:t>Taken from the Course Outline (FOL, Resources, Course Outline):</a:t>
+            </a:r>
+          </a:p>
+          <a:p>
+            <a:pPr lvl="1"/>
+            <a:r>
+              <a:rPr lang="en-CA" dirty="0" err="1" smtClean="0"/>
+              <a:t>Quizes</a:t>
+            </a:r>
+            <a:r>
+              <a:rPr lang="en-CA" dirty="0" smtClean="0"/>
+              <a:t> (16%) </a:t>
+            </a:r>
+            <a:r>
+              <a:rPr lang="en-CA" i="1" dirty="0" smtClean="0"/>
+              <a:t>(most weeks, approximately 8 of them)</a:t>
+            </a:r>
+          </a:p>
+          <a:p>
+            <a:pPr lvl="1"/>
+            <a:r>
+              <a:rPr lang="en-CA" dirty="0" smtClean="0"/>
+              <a:t>Assignments (4%) </a:t>
+            </a:r>
+            <a:r>
+              <a:rPr lang="en-CA" i="1" dirty="0" smtClean="0"/>
+              <a:t>(two, in class)</a:t>
+            </a:r>
+          </a:p>
+          <a:p>
+            <a:pPr lvl="1"/>
+            <a:r>
+              <a:rPr lang="en-CA" dirty="0" smtClean="0"/>
+              <a:t>Projects (30%) </a:t>
+            </a:r>
+            <a:r>
+              <a:rPr lang="en-CA" i="1" dirty="0" smtClean="0"/>
+              <a:t>(two)</a:t>
+            </a:r>
+          </a:p>
+          <a:p>
+            <a:pPr lvl="1"/>
+            <a:r>
+              <a:rPr lang="en-CA" dirty="0" smtClean="0"/>
+              <a:t>Mid-term exam (20%)</a:t>
+            </a:r>
+          </a:p>
+          <a:p>
+            <a:pPr lvl="1"/>
+            <a:r>
+              <a:rPr lang="en-CA" dirty="0" smtClean="0"/>
+              <a:t>Final exam (30%)</a:t>
+            </a:r>
             <a:endParaRPr lang="en-CA" dirty="0"/>
           </a:p>
         </p:txBody>
       </p:sp>
-      <p:pic>
-        <p:nvPicPr>
-          <p:cNvPr id="4" name="Picture 3"/>
-          <p:cNvPicPr>
-            <a:picLocks noChangeAspect="1"/>
-          </p:cNvPicPr>
-          <p:nvPr/>
-        </p:nvPicPr>
-        <p:blipFill>
-          <a:blip r:embed="rId2"/>
-          <a:stretch>
-            <a:fillRect/>
-          </a:stretch>
-        </p:blipFill>
-        <p:spPr>
-          <a:xfrm>
-            <a:off x="3149600" y="3606120"/>
-            <a:ext cx="9042400" cy="3251879"/>
-          </a:xfrm>
-          <a:prstGeom prst="rect">
-            <a:avLst/>
-          </a:prstGeom>
-        </p:spPr>
-      </p:pic>
     </p:spTree>
     <p:extLst>
       <p:ext uri="{BB962C8B-B14F-4D97-AF65-F5344CB8AC3E}">
-        <p14:creationId xmlns:p14="http://schemas.microsoft.com/office/powerpoint/2010/main" val="1186354266"/>
+        <p14:creationId xmlns:p14="http://schemas.microsoft.com/office/powerpoint/2010/main" xmlns="" val="3334564090"/>
       </p:ext>
     </p:extLst>
   </p:cSld>
@@ -6276,7 +6485,7 @@
                   <a:schemeClr val="bg1"/>
                 </a:solidFill>
               </a:rPr>
-              <a:t>Data Structures and Algorithms</a:t>
+              <a:t>What you need to bring to class</a:t>
             </a:r>
           </a:p>
         </p:txBody>
@@ -6293,73 +6502,76 @@
         </p:nvSpPr>
         <p:spPr>
           <a:xfrm>
-            <a:off x="491067" y="1371600"/>
-            <a:ext cx="11259655" cy="5249333"/>
-          </a:xfrm>
-        </p:spPr>
-        <p:txBody>
-          <a:bodyPr>
-            <a:normAutofit/>
-          </a:bodyPr>
-          <a:lstStyle/>
-          <a:p>
-            <a:r>
-              <a:rPr lang="en-CA" sz="3200" dirty="0"/>
-              <a:t>Some knowledge of algorithms and data structures is a necessity for any developer who wishes to become involved in many of the activities in software development such as:</a:t>
-            </a:r>
-          </a:p>
-          <a:p>
-            <a:pPr lvl="1"/>
-            <a:r>
-              <a:rPr lang="en-CA" sz="2800" dirty="0"/>
-              <a:t>Design</a:t>
-            </a:r>
-          </a:p>
-          <a:p>
-            <a:pPr lvl="1"/>
-            <a:r>
-              <a:rPr lang="en-CA" sz="2800" dirty="0"/>
-              <a:t>Implementation</a:t>
-            </a:r>
-          </a:p>
-          <a:p>
-            <a:pPr lvl="1"/>
-            <a:r>
-              <a:rPr lang="en-CA" sz="2800" dirty="0"/>
-              <a:t>Maintenance</a:t>
-            </a:r>
-          </a:p>
-          <a:p>
-            <a:pPr lvl="1"/>
-            <a:r>
-              <a:rPr lang="en-CA" sz="2800" dirty="0"/>
-              <a:t>R&amp;D</a:t>
-            </a:r>
-          </a:p>
-          <a:p>
-            <a:r>
-              <a:rPr lang="en-CA" sz="3200" dirty="0"/>
-              <a:t>There is a strong connection between data structures and algorithms.</a:t>
-            </a:r>
-          </a:p>
-          <a:p>
-            <a:r>
-              <a:rPr lang="en-CA" sz="3200" dirty="0"/>
-              <a:t>This course looks at common data structures and their supporting algorithms with a focus on implementation.</a:t>
+            <a:off x="211667" y="1271877"/>
+            <a:ext cx="10515600" cy="2724390"/>
+          </a:xfrm>
+        </p:spPr>
+        <p:txBody>
+          <a:bodyPr/>
+          <a:lstStyle/>
+          <a:p>
+            <a:r>
+              <a:rPr lang="en-CA" dirty="0"/>
+              <a:t>Visual Studio</a:t>
+            </a:r>
+          </a:p>
+          <a:p>
+            <a:r>
+              <a:rPr lang="en-CA" dirty="0"/>
+              <a:t>No textbook – we will provide internet resources</a:t>
+            </a:r>
+          </a:p>
+          <a:p>
+            <a:r>
+              <a:rPr lang="en-CA" dirty="0"/>
+              <a:t>Inquisitiveness – be prepared to ask questions</a:t>
+            </a:r>
+          </a:p>
+          <a:p>
+            <a:r>
+              <a:rPr lang="en-CA" dirty="0"/>
+              <a:t>Interest in learning</a:t>
+            </a:r>
+          </a:p>
+          <a:p>
+            <a:r>
+              <a:rPr lang="en-CA" dirty="0"/>
+              <a:t>Desire to have fun</a:t>
             </a:r>
           </a:p>
           <a:p>
             <a:endParaRPr lang="en-CA" dirty="0"/>
           </a:p>
-          <a:p>
-            <a:endParaRPr lang="en-CA" dirty="0"/>
-          </a:p>
-        </p:txBody>
-      </p:sp>
+        </p:txBody>
+      </p:sp>
+      <p:pic>
+        <p:nvPicPr>
+          <p:cNvPr id="4" name="Picture 3"/>
+          <p:cNvPicPr>
+            <a:picLocks noChangeAspect="1"/>
+          </p:cNvPicPr>
+          <p:nvPr/>
+        </p:nvPicPr>
+        <p:blipFill>
+          <a:blip r:embed="rId2" cstate="print"/>
+          <a:stretch>
+            <a:fillRect/>
+          </a:stretch>
+        </p:blipFill>
+        <p:spPr>
+          <a:xfrm>
+            <a:off x="3149600" y="3606120"/>
+            <a:ext cx="9042400" cy="3251879"/>
+          </a:xfrm>
+          <a:prstGeom prst="rect">
+            <a:avLst/>
+          </a:prstGeom>
+        </p:spPr>
+      </p:pic>
     </p:spTree>
     <p:extLst>
       <p:ext uri="{BB962C8B-B14F-4D97-AF65-F5344CB8AC3E}">
-        <p14:creationId xmlns:p14="http://schemas.microsoft.com/office/powerpoint/2010/main" val="1130834011"/>
+        <p14:creationId xmlns:p14="http://schemas.microsoft.com/office/powerpoint/2010/main" xmlns="" val="1186354266"/>
       </p:ext>
     </p:extLst>
   </p:cSld>
@@ -6388,13 +6600,7 @@
       </p:grpSpPr>
       <p:sp>
         <p:nvSpPr>
-          <p:cNvPr id="2" name="Title 1">
-            <a:extLst>
-              <a:ext uri="{FF2B5EF4-FFF2-40B4-BE49-F238E27FC236}">
-                <a16:creationId xmlns:a16="http://schemas.microsoft.com/office/drawing/2014/main" id="{558739B7-F71A-ADB9-F1AE-03098E154EC1}"/>
-              </a:ext>
-            </a:extLst>
-          </p:cNvPr>
+          <p:cNvPr id="2" name="Title 1"/>
           <p:cNvSpPr>
             <a:spLocks noGrp="1"/>
           </p:cNvSpPr>
@@ -6402,166 +6608,108 @@
             <p:ph type="title"/>
           </p:nvPr>
         </p:nvSpPr>
-        <p:spPr/>
-        <p:txBody>
-          <a:bodyPr/>
-          <a:lstStyle/>
-          <a:p>
-            <a:endParaRPr lang="en-CA"/>
-          </a:p>
-        </p:txBody>
-      </p:sp>
-      <p:sp>
-        <p:nvSpPr>
-          <p:cNvPr id="4" name="Rectangle: Rounded Corners 3">
-            <a:extLst>
-              <a:ext uri="{FF2B5EF4-FFF2-40B4-BE49-F238E27FC236}">
-                <a16:creationId xmlns:a16="http://schemas.microsoft.com/office/drawing/2014/main" id="{F13D8EC1-760D-E26C-F5E8-F8C043D073B2}"/>
-              </a:ext>
-            </a:extLst>
-          </p:cNvPr>
-          <p:cNvSpPr/>
-          <p:nvPr/>
-        </p:nvSpPr>
-        <p:spPr>
-          <a:xfrm>
-            <a:off x="717376" y="2507226"/>
-            <a:ext cx="2644877" cy="1612490"/>
-          </a:xfrm>
-          <a:prstGeom prst="roundRect">
-            <a:avLst/>
-          </a:prstGeom>
-        </p:spPr>
-        <p:style>
-          <a:lnRef idx="2">
-            <a:schemeClr val="accent1">
-              <a:shade val="15000"/>
-            </a:schemeClr>
-          </a:lnRef>
-          <a:fillRef idx="1">
-            <a:schemeClr val="accent1"/>
-          </a:fillRef>
-          <a:effectRef idx="0">
-            <a:schemeClr val="accent1"/>
-          </a:effectRef>
-          <a:fontRef idx="minor">
-            <a:schemeClr val="lt1"/>
-          </a:fontRef>
-        </p:style>
-        <p:txBody>
-          <a:bodyPr rtlCol="0" anchor="ctr"/>
-          <a:lstStyle/>
-          <a:p>
-            <a:pPr algn="ctr"/>
-            <a:r>
-              <a:rPr lang="en-CA" sz="4000" dirty="0"/>
-              <a:t>Data</a:t>
-            </a:r>
-          </a:p>
-        </p:txBody>
-      </p:sp>
-      <p:sp>
-        <p:nvSpPr>
-          <p:cNvPr id="5" name="Rectangle: Rounded Corners 4">
-            <a:extLst>
-              <a:ext uri="{FF2B5EF4-FFF2-40B4-BE49-F238E27FC236}">
-                <a16:creationId xmlns:a16="http://schemas.microsoft.com/office/drawing/2014/main" id="{DA2B35B4-5BF4-8BCA-D985-D677252606C1}"/>
-              </a:ext>
-            </a:extLst>
-          </p:cNvPr>
-          <p:cNvSpPr/>
-          <p:nvPr/>
-        </p:nvSpPr>
-        <p:spPr>
-          <a:xfrm>
-            <a:off x="8554444" y="2576051"/>
-            <a:ext cx="2644877" cy="1612490"/>
-          </a:xfrm>
-          <a:prstGeom prst="roundRect">
-            <a:avLst/>
-          </a:prstGeom>
-        </p:spPr>
-        <p:style>
-          <a:lnRef idx="2">
-            <a:schemeClr val="accent1">
-              <a:shade val="15000"/>
-            </a:schemeClr>
-          </a:lnRef>
-          <a:fillRef idx="1">
-            <a:schemeClr val="accent1"/>
-          </a:fillRef>
-          <a:effectRef idx="0">
-            <a:schemeClr val="accent1"/>
-          </a:effectRef>
-          <a:fontRef idx="minor">
-            <a:schemeClr val="lt1"/>
-          </a:fontRef>
-        </p:style>
-        <p:txBody>
-          <a:bodyPr rtlCol="0" anchor="ctr"/>
-          <a:lstStyle/>
-          <a:p>
-            <a:pPr algn="ctr"/>
-            <a:r>
-              <a:rPr lang="en-CA" sz="4000" dirty="0"/>
-              <a:t>Data</a:t>
-            </a:r>
-          </a:p>
-        </p:txBody>
-      </p:sp>
-      <p:sp>
-        <p:nvSpPr>
-          <p:cNvPr id="6" name="Arrow: Right 5">
-            <a:extLst>
-              <a:ext uri="{FF2B5EF4-FFF2-40B4-BE49-F238E27FC236}">
-                <a16:creationId xmlns:a16="http://schemas.microsoft.com/office/drawing/2014/main" id="{98CB8958-2086-E36B-43AF-AA64A2ECF1CC}"/>
-              </a:ext>
-            </a:extLst>
-          </p:cNvPr>
-          <p:cNvSpPr/>
-          <p:nvPr/>
-        </p:nvSpPr>
-        <p:spPr>
-          <a:xfrm>
-            <a:off x="3588774" y="2644877"/>
-            <a:ext cx="4739149" cy="1474839"/>
-          </a:xfrm>
-          <a:prstGeom prst="rightArrow">
-            <a:avLst/>
-          </a:prstGeom>
-        </p:spPr>
-        <p:style>
-          <a:lnRef idx="2">
-            <a:schemeClr val="accent1">
-              <a:shade val="15000"/>
-            </a:schemeClr>
-          </a:lnRef>
-          <a:fillRef idx="1">
-            <a:schemeClr val="accent1"/>
-          </a:fillRef>
-          <a:effectRef idx="0">
-            <a:schemeClr val="accent1"/>
-          </a:effectRef>
-          <a:fontRef idx="minor">
-            <a:schemeClr val="lt1"/>
-          </a:fontRef>
-        </p:style>
-        <p:txBody>
-          <a:bodyPr rtlCol="0" anchor="ctr"/>
-          <a:lstStyle/>
-          <a:p>
-            <a:pPr algn="ctr"/>
+        <p:spPr>
+          <a:xfrm>
+            <a:off x="2039815" y="182245"/>
+            <a:ext cx="9710907" cy="830629"/>
+          </a:xfrm>
+        </p:spPr>
+        <p:txBody>
+          <a:bodyPr>
+            <a:normAutofit/>
+          </a:bodyPr>
+          <a:lstStyle/>
+          <a:p>
+            <a:r>
+              <a:rPr lang="en-CA" dirty="0">
+                <a:solidFill>
+                  <a:schemeClr val="bg1"/>
+                </a:solidFill>
+              </a:rPr>
+              <a:t>Data Structures and Algorithms</a:t>
+            </a:r>
+          </a:p>
+        </p:txBody>
+      </p:sp>
+      <p:sp>
+        <p:nvSpPr>
+          <p:cNvPr id="3" name="Content Placeholder 2"/>
+          <p:cNvSpPr>
+            <a:spLocks noGrp="1"/>
+          </p:cNvSpPr>
+          <p:nvPr>
+            <p:ph idx="1"/>
+          </p:nvPr>
+        </p:nvSpPr>
+        <p:spPr>
+          <a:xfrm>
+            <a:off x="491067" y="1371600"/>
+            <a:ext cx="11259655" cy="5249333"/>
+          </a:xfrm>
+        </p:spPr>
+        <p:txBody>
+          <a:bodyPr>
+            <a:normAutofit/>
+          </a:bodyPr>
+          <a:lstStyle/>
+          <a:p>
             <a:r>
               <a:rPr lang="en-CA" sz="3200" dirty="0"/>
-              <a:t>Your code</a:t>
-            </a:r>
+              <a:t>Some knowledge of algorithms and data structures is a necessity for any developer who wishes to become involved in many of the activities in software development such as:</a:t>
+            </a:r>
+          </a:p>
+          <a:p>
+            <a:pPr lvl="1"/>
+            <a:r>
+              <a:rPr lang="en-CA" sz="2800" dirty="0"/>
+              <a:t>Design</a:t>
+            </a:r>
+          </a:p>
+          <a:p>
+            <a:pPr lvl="1"/>
+            <a:r>
+              <a:rPr lang="en-CA" sz="2800" dirty="0"/>
+              <a:t>Implementation</a:t>
+            </a:r>
+          </a:p>
+          <a:p>
+            <a:pPr lvl="1"/>
+            <a:r>
+              <a:rPr lang="en-CA" sz="2800" dirty="0"/>
+              <a:t>Maintenance</a:t>
+            </a:r>
+          </a:p>
+          <a:p>
+            <a:pPr lvl="1"/>
+            <a:r>
+              <a:rPr lang="en-CA" sz="2800" dirty="0"/>
+              <a:t>R&amp;D</a:t>
+            </a:r>
+          </a:p>
+          <a:p>
+            <a:r>
+              <a:rPr lang="en-CA" sz="3200" dirty="0"/>
+              <a:t>There is a strong connection between data structures and algorithms.</a:t>
+            </a:r>
+          </a:p>
+          <a:p>
+            <a:r>
+              <a:rPr lang="en-CA" sz="3200" dirty="0"/>
+              <a:t>This course looks at common data structures and their supporting algorithms with a focus on implementation.</a:t>
+            </a:r>
+          </a:p>
+          <a:p>
+            <a:endParaRPr lang="en-CA" dirty="0"/>
+          </a:p>
+          <a:p>
+            <a:endParaRPr lang="en-CA" dirty="0"/>
           </a:p>
         </p:txBody>
       </p:sp>
     </p:spTree>
     <p:extLst>
       <p:ext uri="{BB962C8B-B14F-4D97-AF65-F5344CB8AC3E}">
-        <p14:creationId xmlns:p14="http://schemas.microsoft.com/office/powerpoint/2010/main" val="3534032551"/>
+        <p14:creationId xmlns:p14="http://schemas.microsoft.com/office/powerpoint/2010/main" xmlns="" val="1130834011"/>
       </p:ext>
     </p:extLst>
   </p:cSld>
@@ -6614,7 +6762,7 @@
     </a:clrScheme>
     <a:fontScheme name="Office">
       <a:majorFont>
-        <a:latin typeface="Calibri Light" panose="020F0302020204030204"/>
+        <a:latin typeface="Calibri Light"/>
         <a:ea typeface=""/>
         <a:cs typeface=""/>
         <a:font script="Jpan" typeface="ＭＳ Ｐゴシック"/>
@@ -6649,7 +6797,7 @@
         <a:font script="Geor" typeface="Sylfaen"/>
       </a:majorFont>
       <a:minorFont>
-        <a:latin typeface="Calibri" panose="020F0502020204030204"/>
+        <a:latin typeface="Calibri"/>
         <a:ea typeface=""/>
         <a:cs typeface=""/>
         <a:font script="Jpan" typeface="ＭＳ Ｐゴシック"/>
@@ -6826,7 +6974,7 @@
   <a:extraClrSchemeLst/>
   <a:extLst>
     <a:ext uri="{05A4C25C-085E-4340-85A3-A5531E510DB2}">
-      <thm15:themeFamily xmlns:thm15="http://schemas.microsoft.com/office/thememl/2012/main" name="Office Theme" id="{62F939B6-93AF-4DB8-9C6B-D6C7DFDC589F}" vid="{4A3C46E8-61CC-4603-A589-7422A47A8E4A}"/>
+      <thm15:themeFamily xmlns:thm15="http://schemas.microsoft.com/office/thememl/2012/main" xmlns="" name="Office Theme" id="{62F939B6-93AF-4DB8-9C6B-D6C7DFDC589F}" vid="{4A3C46E8-61CC-4603-A589-7422A47A8E4A}"/>
     </a:ext>
   </a:extLst>
 </a:theme>
@@ -6875,7 +7023,7 @@
     </a:clrScheme>
     <a:fontScheme name="Office">
       <a:majorFont>
-        <a:latin typeface="Calibri Light" panose="020F0302020204030204"/>
+        <a:latin typeface="Calibri Light"/>
         <a:ea typeface=""/>
         <a:cs typeface=""/>
         <a:font script="Jpan" typeface="游ゴシック Light"/>
@@ -6927,7 +7075,7 @@
         <a:font script="Tfng" typeface="Ebrima"/>
       </a:majorFont>
       <a:minorFont>
-        <a:latin typeface="Calibri" panose="020F0502020204030204"/>
+        <a:latin typeface="Calibri"/>
         <a:ea typeface=""/>
         <a:cs typeface=""/>
         <a:font script="Jpan" typeface="游ゴシック"/>
@@ -7121,7 +7269,7 @@
   <a:extraClrSchemeLst/>
   <a:extLst>
     <a:ext uri="{05A4C25C-085E-4340-85A3-A5531E510DB2}">
-      <thm15:themeFamily xmlns:thm15="http://schemas.microsoft.com/office/thememl/2012/main" name="Office Theme" id="{62F939B6-93AF-4DB8-9C6B-D6C7DFDC589F}" vid="{4A3C46E8-61CC-4603-A589-7422A47A8E4A}"/>
+      <thm15:themeFamily xmlns:thm15="http://schemas.microsoft.com/office/thememl/2012/main" xmlns="" name="Office Theme" id="{62F939B6-93AF-4DB8-9C6B-D6C7DFDC589F}" vid="{4A3C46E8-61CC-4603-A589-7422A47A8E4A}"/>
     </a:ext>
   </a:extLst>
 </a:theme>

</xml_diff>